<commit_message>
clean up code and add more material into presentation
</commit_message>
<xml_diff>
--- a/ckd_presentation.pptx
+++ b/ckd_presentation.pptx
@@ -9,6 +9,12 @@
     <p:sldId id="257" r:id="rId3"/>
     <p:sldId id="258" r:id="rId4"/>
     <p:sldId id="259" r:id="rId5"/>
+    <p:sldId id="260" r:id="rId6"/>
+    <p:sldId id="261" r:id="rId7"/>
+    <p:sldId id="263" r:id="rId8"/>
+    <p:sldId id="262" r:id="rId9"/>
+    <p:sldId id="264" r:id="rId10"/>
+    <p:sldId id="265" r:id="rId11"/>
   </p:sldIdLst>
   <p:sldSz cx="12192000" cy="6858000"/>
   <p:notesSz cx="6858000" cy="9144000"/>
@@ -3390,6 +3396,132 @@
 </p:sld>
 </file>
 
+<file path=ppt/slides/slide10.xml><?xml version="1.0" encoding="utf-8"?>
+<p:sld xmlns:a="http://schemas.openxmlformats.org/drawingml/2006/main" xmlns:r="http://schemas.openxmlformats.org/officeDocument/2006/relationships" xmlns:p="http://schemas.openxmlformats.org/presentationml/2006/main">
+  <p:cSld>
+    <p:spTree>
+      <p:nvGrpSpPr>
+        <p:cNvPr id="1" name=""/>
+        <p:cNvGrpSpPr/>
+        <p:nvPr/>
+      </p:nvGrpSpPr>
+      <p:grpSpPr>
+        <a:xfrm>
+          <a:off x="0" y="0"/>
+          <a:ext cx="0" cy="0"/>
+          <a:chOff x="0" y="0"/>
+          <a:chExt cx="0" cy="0"/>
+        </a:xfrm>
+      </p:grpSpPr>
+      <p:sp>
+        <p:nvSpPr>
+          <p:cNvPr id="2" name="Title 1">
+            <a:extLst>
+              <a:ext uri="{FF2B5EF4-FFF2-40B4-BE49-F238E27FC236}">
+                <a16:creationId xmlns:a16="http://schemas.microsoft.com/office/drawing/2014/main" id="{74055439-202B-8A44-8576-A221D2D82819}"/>
+              </a:ext>
+            </a:extLst>
+          </p:cNvPr>
+          <p:cNvSpPr>
+            <a:spLocks noGrp="1"/>
+          </p:cNvSpPr>
+          <p:nvPr>
+            <p:ph type="title"/>
+          </p:nvPr>
+        </p:nvSpPr>
+        <p:spPr/>
+        <p:txBody>
+          <a:bodyPr/>
+          <a:lstStyle/>
+          <a:p>
+            <a:r>
+              <a:rPr lang="en-US" dirty="0"/>
+              <a:t>Machine Learning</a:t>
+            </a:r>
+          </a:p>
+        </p:txBody>
+      </p:sp>
+      <p:sp>
+        <p:nvSpPr>
+          <p:cNvPr id="3" name="Content Placeholder 2">
+            <a:extLst>
+              <a:ext uri="{FF2B5EF4-FFF2-40B4-BE49-F238E27FC236}">
+                <a16:creationId xmlns:a16="http://schemas.microsoft.com/office/drawing/2014/main" id="{D6E16156-797D-4F47-93CC-3BC97BCE2014}"/>
+              </a:ext>
+            </a:extLst>
+          </p:cNvPr>
+          <p:cNvSpPr>
+            <a:spLocks noGrp="1"/>
+          </p:cNvSpPr>
+          <p:nvPr>
+            <p:ph idx="1"/>
+          </p:nvPr>
+        </p:nvSpPr>
+        <p:spPr/>
+        <p:txBody>
+          <a:bodyPr/>
+          <a:lstStyle/>
+          <a:p>
+            <a:r>
+              <a:rPr lang="en-US" dirty="0"/>
+              <a:t>Several methods of machine learning was trialed</a:t>
+            </a:r>
+          </a:p>
+          <a:p>
+            <a:pPr lvl="1"/>
+            <a:r>
+              <a:rPr lang="en-US" dirty="0"/>
+              <a:t>Random Forest</a:t>
+            </a:r>
+          </a:p>
+          <a:p>
+            <a:pPr lvl="1"/>
+            <a:r>
+              <a:rPr lang="en-US" dirty="0"/>
+              <a:t>Ada Boosted Decision tree</a:t>
+            </a:r>
+          </a:p>
+          <a:p>
+            <a:pPr lvl="1"/>
+            <a:r>
+              <a:rPr lang="en-US" dirty="0"/>
+              <a:t>Ada Boosted Random Forest</a:t>
+            </a:r>
+          </a:p>
+          <a:p>
+            <a:pPr lvl="2"/>
+            <a:r>
+              <a:rPr lang="en-US" dirty="0"/>
+              <a:t>Without feature selection</a:t>
+            </a:r>
+          </a:p>
+          <a:p>
+            <a:pPr lvl="2"/>
+            <a:r>
+              <a:rPr lang="en-US" dirty="0"/>
+              <a:t>With </a:t>
+            </a:r>
+            <a:r>
+              <a:rPr lang="en-US"/>
+              <a:t>feature selection</a:t>
+            </a:r>
+            <a:endParaRPr lang="en-US" dirty="0"/>
+          </a:p>
+        </p:txBody>
+      </p:sp>
+    </p:spTree>
+    <p:extLst>
+      <p:ext uri="{BB962C8B-B14F-4D97-AF65-F5344CB8AC3E}">
+        <p14:creationId xmlns:p14="http://schemas.microsoft.com/office/powerpoint/2010/main" val="3453503053"/>
+      </p:ext>
+    </p:extLst>
+  </p:cSld>
+  <p:clrMapOvr>
+    <a:masterClrMapping/>
+  </p:clrMapOvr>
+</p:sld>
+</file>
+
 <file path=ppt/slides/slide2.xml><?xml version="1.0" encoding="utf-8"?>
 <p:sld xmlns:a="http://schemas.openxmlformats.org/drawingml/2006/main" xmlns:r="http://schemas.openxmlformats.org/officeDocument/2006/relationships" xmlns:p="http://schemas.openxmlformats.org/presentationml/2006/main">
   <p:cSld>
@@ -3485,6 +3617,12 @@
             <a:r>
               <a:rPr lang="en-US" dirty="0"/>
               <a:t>Kidney failure leads to decreased quality of life regardless of treatment options (transplant or dialysis)</a:t>
+            </a:r>
+          </a:p>
+          <a:p>
+            <a:r>
+              <a:rPr lang="en-US" dirty="0"/>
+              <a:t>Early intervention can prevent adverse outcomes</a:t>
             </a:r>
           </a:p>
         </p:txBody>
@@ -3542,10 +3680,9 @@
           <a:p>
             <a:pPr algn="ctr"/>
             <a:r>
-              <a:rPr lang="en-US"/>
+              <a:rPr lang="en-US" dirty="0"/>
               <a:t>Problem Statement</a:t>
             </a:r>
-            <a:endParaRPr lang="en-US" dirty="0"/>
           </a:p>
         </p:txBody>
       </p:sp>
@@ -3666,7 +3803,67 @@
           <a:p>
             <a:r>
               <a:rPr lang="en-US" dirty="0"/>
-              <a:t>9 sets of data covering different conditions related to CKD</a:t>
+              <a:t>Data covering different medical conditions related to CKD</a:t>
+            </a:r>
+          </a:p>
+          <a:p>
+            <a:pPr lvl="1"/>
+            <a:r>
+              <a:rPr lang="en-US" dirty="0"/>
+              <a:t>Creatinine</a:t>
+            </a:r>
+            <a:r>
+              <a:rPr lang="en-US" dirty="0">
+                <a:effectLst/>
+              </a:rPr>
+              <a:t> levels</a:t>
+            </a:r>
+          </a:p>
+          <a:p>
+            <a:pPr lvl="1"/>
+            <a:r>
+              <a:rPr lang="en-US" dirty="0"/>
+              <a:t>Blood pressure (diastolic and systolic)</a:t>
+            </a:r>
+          </a:p>
+          <a:p>
+            <a:pPr lvl="1"/>
+            <a:r>
+              <a:rPr lang="en-US" dirty="0"/>
+              <a:t>Hemoglobin levels</a:t>
+            </a:r>
+          </a:p>
+          <a:p>
+            <a:pPr lvl="1"/>
+            <a:r>
+              <a:rPr lang="en-US" dirty="0"/>
+              <a:t>Glucose levels</a:t>
+            </a:r>
+          </a:p>
+          <a:p>
+            <a:pPr lvl="1"/>
+            <a:r>
+              <a:rPr lang="en-US" dirty="0"/>
+              <a:t>Low-density lipoprotein (LDL-c) level </a:t>
+            </a:r>
+          </a:p>
+          <a:p>
+            <a:pPr lvl="1"/>
+            <a:r>
+              <a:rPr lang="en-US" dirty="0"/>
+              <a:t>Medications</a:t>
+            </a:r>
+          </a:p>
+          <a:p>
+            <a:r>
+              <a:rPr lang="en-US" dirty="0"/>
+              <a:t>Basic demographics</a:t>
+            </a:r>
+          </a:p>
+          <a:p>
+            <a:r>
+              <a:rPr lang="en-US" dirty="0"/>
+              <a:t>Eventual CKD diagnosis</a:t>
             </a:r>
           </a:p>
         </p:txBody>
@@ -3675,6 +3872,1012 @@
     <p:extLst>
       <p:ext uri="{BB962C8B-B14F-4D97-AF65-F5344CB8AC3E}">
         <p14:creationId xmlns:p14="http://schemas.microsoft.com/office/powerpoint/2010/main" val="1013713249"/>
+      </p:ext>
+    </p:extLst>
+  </p:cSld>
+  <p:clrMapOvr>
+    <a:masterClrMapping/>
+  </p:clrMapOvr>
+</p:sld>
+</file>
+
+<file path=ppt/slides/slide5.xml><?xml version="1.0" encoding="utf-8"?>
+<p:sld xmlns:a="http://schemas.openxmlformats.org/drawingml/2006/main" xmlns:r="http://schemas.openxmlformats.org/officeDocument/2006/relationships" xmlns:p="http://schemas.openxmlformats.org/presentationml/2006/main">
+  <p:cSld>
+    <p:spTree>
+      <p:nvGrpSpPr>
+        <p:cNvPr id="1" name=""/>
+        <p:cNvGrpSpPr/>
+        <p:nvPr/>
+      </p:nvGrpSpPr>
+      <p:grpSpPr>
+        <a:xfrm>
+          <a:off x="0" y="0"/>
+          <a:ext cx="0" cy="0"/>
+          <a:chOff x="0" y="0"/>
+          <a:chExt cx="0" cy="0"/>
+        </a:xfrm>
+      </p:grpSpPr>
+      <p:sp>
+        <p:nvSpPr>
+          <p:cNvPr id="2" name="Title 1">
+            <a:extLst>
+              <a:ext uri="{FF2B5EF4-FFF2-40B4-BE49-F238E27FC236}">
+                <a16:creationId xmlns:a16="http://schemas.microsoft.com/office/drawing/2014/main" id="{A22CACD0-5F16-6B4D-AF01-0FB0EAF3EA33}"/>
+              </a:ext>
+            </a:extLst>
+          </p:cNvPr>
+          <p:cNvSpPr>
+            <a:spLocks noGrp="1"/>
+          </p:cNvSpPr>
+          <p:nvPr>
+            <p:ph type="title"/>
+          </p:nvPr>
+        </p:nvSpPr>
+        <p:spPr/>
+        <p:txBody>
+          <a:bodyPr/>
+          <a:lstStyle/>
+          <a:p>
+            <a:r>
+              <a:rPr lang="en-US" dirty="0"/>
+              <a:t>Feature Engineering</a:t>
+            </a:r>
+          </a:p>
+        </p:txBody>
+      </p:sp>
+      <p:sp>
+        <p:nvSpPr>
+          <p:cNvPr id="3" name="Content Placeholder 2">
+            <a:extLst>
+              <a:ext uri="{FF2B5EF4-FFF2-40B4-BE49-F238E27FC236}">
+                <a16:creationId xmlns:a16="http://schemas.microsoft.com/office/drawing/2014/main" id="{418FE675-715F-7D4E-9CEC-47159B0A9D7C}"/>
+              </a:ext>
+            </a:extLst>
+          </p:cNvPr>
+          <p:cNvSpPr>
+            <a:spLocks noGrp="1"/>
+          </p:cNvSpPr>
+          <p:nvPr>
+            <p:ph idx="1"/>
+          </p:nvPr>
+        </p:nvSpPr>
+        <p:spPr/>
+        <p:txBody>
+          <a:bodyPr/>
+          <a:lstStyle/>
+          <a:p>
+            <a:r>
+              <a:rPr lang="en-US" dirty="0"/>
+              <a:t>Objective: Keep things simple</a:t>
+            </a:r>
+          </a:p>
+          <a:p>
+            <a:pPr lvl="1"/>
+            <a:r>
+              <a:rPr lang="en-US" dirty="0"/>
+              <a:t>Clinicians want explainable models, hence most of the feature engineering reduce complexity and improve understandability</a:t>
+            </a:r>
+          </a:p>
+          <a:p>
+            <a:r>
+              <a:rPr lang="en-US" dirty="0"/>
+              <a:t>Data was manipulated into a simple single table form</a:t>
+            </a:r>
+          </a:p>
+        </p:txBody>
+      </p:sp>
+      <p:pic>
+        <p:nvPicPr>
+          <p:cNvPr id="5" name="Picture 4" descr="Table&#10;&#10;Description automatically generated">
+            <a:extLst>
+              <a:ext uri="{FF2B5EF4-FFF2-40B4-BE49-F238E27FC236}">
+                <a16:creationId xmlns:a16="http://schemas.microsoft.com/office/drawing/2014/main" id="{AEC36C29-4116-BA46-9E55-FBC4CDF1BC5D}"/>
+              </a:ext>
+            </a:extLst>
+          </p:cNvPr>
+          <p:cNvPicPr>
+            <a:picLocks noChangeAspect="1"/>
+          </p:cNvPicPr>
+          <p:nvPr/>
+        </p:nvPicPr>
+        <p:blipFill>
+          <a:blip r:embed="rId2"/>
+          <a:stretch>
+            <a:fillRect/>
+          </a:stretch>
+        </p:blipFill>
+        <p:spPr>
+          <a:xfrm>
+            <a:off x="356091" y="3852918"/>
+            <a:ext cx="5029573" cy="2330778"/>
+          </a:xfrm>
+          <a:prstGeom prst="rect">
+            <a:avLst/>
+          </a:prstGeom>
+        </p:spPr>
+      </p:pic>
+      <p:pic>
+        <p:nvPicPr>
+          <p:cNvPr id="7" name="Picture 6" descr="Table&#10;&#10;Description automatically generated">
+            <a:extLst>
+              <a:ext uri="{FF2B5EF4-FFF2-40B4-BE49-F238E27FC236}">
+                <a16:creationId xmlns:a16="http://schemas.microsoft.com/office/drawing/2014/main" id="{CEEF8FAF-07FA-054F-B917-63533C196EBA}"/>
+              </a:ext>
+            </a:extLst>
+          </p:cNvPr>
+          <p:cNvPicPr>
+            <a:picLocks noChangeAspect="1"/>
+          </p:cNvPicPr>
+          <p:nvPr/>
+        </p:nvPicPr>
+        <p:blipFill>
+          <a:blip r:embed="rId3"/>
+          <a:stretch>
+            <a:fillRect/>
+          </a:stretch>
+        </p:blipFill>
+        <p:spPr>
+          <a:xfrm>
+            <a:off x="6448543" y="3837809"/>
+            <a:ext cx="5389232" cy="2342520"/>
+          </a:xfrm>
+          <a:prstGeom prst="rect">
+            <a:avLst/>
+          </a:prstGeom>
+        </p:spPr>
+      </p:pic>
+      <p:sp>
+        <p:nvSpPr>
+          <p:cNvPr id="10" name="Right Arrow 9">
+            <a:extLst>
+              <a:ext uri="{FF2B5EF4-FFF2-40B4-BE49-F238E27FC236}">
+                <a16:creationId xmlns:a16="http://schemas.microsoft.com/office/drawing/2014/main" id="{22518E44-C4E6-5346-B2CE-51B453C9C0CE}"/>
+              </a:ext>
+            </a:extLst>
+          </p:cNvPr>
+          <p:cNvSpPr/>
+          <p:nvPr/>
+        </p:nvSpPr>
+        <p:spPr>
+          <a:xfrm>
+            <a:off x="5696607" y="4939863"/>
+            <a:ext cx="504496" cy="283780"/>
+          </a:xfrm>
+          <a:prstGeom prst="rightArrow">
+            <a:avLst/>
+          </a:prstGeom>
+        </p:spPr>
+        <p:style>
+          <a:lnRef idx="2">
+            <a:schemeClr val="accent1">
+              <a:shade val="50000"/>
+            </a:schemeClr>
+          </a:lnRef>
+          <a:fillRef idx="1">
+            <a:schemeClr val="accent1"/>
+          </a:fillRef>
+          <a:effectRef idx="0">
+            <a:schemeClr val="accent1"/>
+          </a:effectRef>
+          <a:fontRef idx="minor">
+            <a:schemeClr val="lt1"/>
+          </a:fontRef>
+        </p:style>
+        <p:txBody>
+          <a:bodyPr rtlCol="0" anchor="ctr"/>
+          <a:lstStyle/>
+          <a:p>
+            <a:pPr algn="ctr"/>
+            <a:endParaRPr lang="en-US"/>
+          </a:p>
+        </p:txBody>
+      </p:sp>
+    </p:spTree>
+    <p:extLst>
+      <p:ext uri="{BB962C8B-B14F-4D97-AF65-F5344CB8AC3E}">
+        <p14:creationId xmlns:p14="http://schemas.microsoft.com/office/powerpoint/2010/main" val="3948476692"/>
+      </p:ext>
+    </p:extLst>
+  </p:cSld>
+  <p:clrMapOvr>
+    <a:masterClrMapping/>
+  </p:clrMapOvr>
+</p:sld>
+</file>
+
+<file path=ppt/slides/slide6.xml><?xml version="1.0" encoding="utf-8"?>
+<p:sld xmlns:a="http://schemas.openxmlformats.org/drawingml/2006/main" xmlns:r="http://schemas.openxmlformats.org/officeDocument/2006/relationships" xmlns:p="http://schemas.openxmlformats.org/presentationml/2006/main">
+  <p:cSld>
+    <p:spTree>
+      <p:nvGrpSpPr>
+        <p:cNvPr id="1" name=""/>
+        <p:cNvGrpSpPr/>
+        <p:nvPr/>
+      </p:nvGrpSpPr>
+      <p:grpSpPr>
+        <a:xfrm>
+          <a:off x="0" y="0"/>
+          <a:ext cx="0" cy="0"/>
+          <a:chOff x="0" y="0"/>
+          <a:chExt cx="0" cy="0"/>
+        </a:xfrm>
+      </p:grpSpPr>
+      <p:sp>
+        <p:nvSpPr>
+          <p:cNvPr id="2" name="Title 1">
+            <a:extLst>
+              <a:ext uri="{FF2B5EF4-FFF2-40B4-BE49-F238E27FC236}">
+                <a16:creationId xmlns:a16="http://schemas.microsoft.com/office/drawing/2014/main" id="{5C421C56-BCBC-484A-94BC-F2880B9D3B6E}"/>
+              </a:ext>
+            </a:extLst>
+          </p:cNvPr>
+          <p:cNvSpPr>
+            <a:spLocks noGrp="1"/>
+          </p:cNvSpPr>
+          <p:nvPr>
+            <p:ph type="title"/>
+          </p:nvPr>
+        </p:nvSpPr>
+        <p:spPr/>
+        <p:txBody>
+          <a:bodyPr/>
+          <a:lstStyle/>
+          <a:p>
+            <a:r>
+              <a:rPr lang="en-US" dirty="0"/>
+              <a:t>Feature Engineering Steps</a:t>
+            </a:r>
+          </a:p>
+        </p:txBody>
+      </p:sp>
+      <p:sp>
+        <p:nvSpPr>
+          <p:cNvPr id="3" name="Content Placeholder 2">
+            <a:extLst>
+              <a:ext uri="{FF2B5EF4-FFF2-40B4-BE49-F238E27FC236}">
+                <a16:creationId xmlns:a16="http://schemas.microsoft.com/office/drawing/2014/main" id="{2D9BF9CF-F11B-A44A-B687-5874C3A469EC}"/>
+              </a:ext>
+            </a:extLst>
+          </p:cNvPr>
+          <p:cNvSpPr>
+            <a:spLocks noGrp="1"/>
+          </p:cNvSpPr>
+          <p:nvPr>
+            <p:ph idx="1"/>
+          </p:nvPr>
+        </p:nvSpPr>
+        <p:spPr/>
+        <p:txBody>
+          <a:bodyPr>
+            <a:normAutofit lnSpcReduction="10000"/>
+          </a:bodyPr>
+          <a:lstStyle/>
+          <a:p>
+            <a:r>
+              <a:rPr lang="en-US" dirty="0"/>
+              <a:t>Blood pressure, creatinine, glucose, hemoglobin, and LDL levels were first merge together into one long form data table</a:t>
+            </a:r>
+          </a:p>
+          <a:p>
+            <a:pPr lvl="1"/>
+            <a:r>
+              <a:rPr lang="en-US" dirty="0"/>
+              <a:t>Some observations:</a:t>
+            </a:r>
+          </a:p>
+          <a:p>
+            <a:pPr lvl="2"/>
+            <a:r>
+              <a:rPr lang="en-US" dirty="0"/>
+              <a:t>Some independent variables were taken at different time points for each individual person</a:t>
+            </a:r>
+          </a:p>
+          <a:p>
+            <a:pPr lvl="2"/>
+            <a:r>
+              <a:rPr lang="en-US" dirty="0"/>
+              <a:t>Possibility that some measurements were not taken in a clinical setting</a:t>
+            </a:r>
+          </a:p>
+          <a:p>
+            <a:r>
+              <a:rPr lang="en-US" dirty="0"/>
+              <a:t>To further simplify the data, the number of out-of-range aka unhealthy measurements for each of the above independent variables was calculated as a ratio of number of total measurements taken</a:t>
+            </a:r>
+          </a:p>
+          <a:p>
+            <a:pPr lvl="1"/>
+            <a:r>
+              <a:rPr lang="en-US" dirty="0"/>
+              <a:t>This gives an indication of how many and how chronic the risk factors a patient has. </a:t>
+            </a:r>
+          </a:p>
+        </p:txBody>
+      </p:sp>
+    </p:spTree>
+    <p:extLst>
+      <p:ext uri="{BB962C8B-B14F-4D97-AF65-F5344CB8AC3E}">
+        <p14:creationId xmlns:p14="http://schemas.microsoft.com/office/powerpoint/2010/main" val="1073240611"/>
+      </p:ext>
+    </p:extLst>
+  </p:cSld>
+  <p:clrMapOvr>
+    <a:masterClrMapping/>
+  </p:clrMapOvr>
+</p:sld>
+</file>
+
+<file path=ppt/slides/slide7.xml><?xml version="1.0" encoding="utf-8"?>
+<p:sld xmlns:a="http://schemas.openxmlformats.org/drawingml/2006/main" xmlns:r="http://schemas.openxmlformats.org/officeDocument/2006/relationships" xmlns:p="http://schemas.openxmlformats.org/presentationml/2006/main">
+  <p:cSld>
+    <p:spTree>
+      <p:nvGrpSpPr>
+        <p:cNvPr id="1" name=""/>
+        <p:cNvGrpSpPr/>
+        <p:nvPr/>
+      </p:nvGrpSpPr>
+      <p:grpSpPr>
+        <a:xfrm>
+          <a:off x="0" y="0"/>
+          <a:ext cx="0" cy="0"/>
+          <a:chOff x="0" y="0"/>
+          <a:chExt cx="0" cy="0"/>
+        </a:xfrm>
+      </p:grpSpPr>
+      <p:sp>
+        <p:nvSpPr>
+          <p:cNvPr id="2" name="Title 1">
+            <a:extLst>
+              <a:ext uri="{FF2B5EF4-FFF2-40B4-BE49-F238E27FC236}">
+                <a16:creationId xmlns:a16="http://schemas.microsoft.com/office/drawing/2014/main" id="{5C421C56-BCBC-484A-94BC-F2880B9D3B6E}"/>
+              </a:ext>
+            </a:extLst>
+          </p:cNvPr>
+          <p:cNvSpPr>
+            <a:spLocks noGrp="1"/>
+          </p:cNvSpPr>
+          <p:nvPr>
+            <p:ph type="title"/>
+          </p:nvPr>
+        </p:nvSpPr>
+        <p:spPr/>
+        <p:txBody>
+          <a:bodyPr/>
+          <a:lstStyle/>
+          <a:p>
+            <a:r>
+              <a:rPr lang="en-US" dirty="0"/>
+              <a:t>Feature Engineering Steps</a:t>
+            </a:r>
+          </a:p>
+        </p:txBody>
+      </p:sp>
+      <p:sp>
+        <p:nvSpPr>
+          <p:cNvPr id="6" name="TextBox 5">
+            <a:extLst>
+              <a:ext uri="{FF2B5EF4-FFF2-40B4-BE49-F238E27FC236}">
+                <a16:creationId xmlns:a16="http://schemas.microsoft.com/office/drawing/2014/main" id="{927C3ECE-798F-7C48-AE08-B23D277CF0F6}"/>
+              </a:ext>
+            </a:extLst>
+          </p:cNvPr>
+          <p:cNvSpPr txBox="1"/>
+          <p:nvPr/>
+        </p:nvSpPr>
+        <p:spPr>
+          <a:xfrm>
+            <a:off x="2226310" y="1469434"/>
+            <a:ext cx="3094373" cy="369332"/>
+          </a:xfrm>
+          <a:prstGeom prst="rect">
+            <a:avLst/>
+          </a:prstGeom>
+          <a:noFill/>
+        </p:spPr>
+        <p:txBody>
+          <a:bodyPr wrap="none" rtlCol="0">
+            <a:spAutoFit/>
+          </a:bodyPr>
+          <a:lstStyle/>
+          <a:p>
+            <a:r>
+              <a:rPr lang="en-US" dirty="0"/>
+              <a:t>Patient ID #5’s creatinine levels</a:t>
+            </a:r>
+          </a:p>
+        </p:txBody>
+      </p:sp>
+      <p:sp>
+        <p:nvSpPr>
+          <p:cNvPr id="7" name="Right Arrow 6">
+            <a:extLst>
+              <a:ext uri="{FF2B5EF4-FFF2-40B4-BE49-F238E27FC236}">
+                <a16:creationId xmlns:a16="http://schemas.microsoft.com/office/drawing/2014/main" id="{A0E4D70D-BAF5-4E47-8796-498E7A13B883}"/>
+              </a:ext>
+            </a:extLst>
+          </p:cNvPr>
+          <p:cNvSpPr/>
+          <p:nvPr/>
+        </p:nvSpPr>
+        <p:spPr>
+          <a:xfrm>
+            <a:off x="5447270" y="3571082"/>
+            <a:ext cx="1297460" cy="506627"/>
+          </a:xfrm>
+          <a:prstGeom prst="rightArrow">
+            <a:avLst/>
+          </a:prstGeom>
+        </p:spPr>
+        <p:style>
+          <a:lnRef idx="2">
+            <a:schemeClr val="accent1">
+              <a:shade val="50000"/>
+            </a:schemeClr>
+          </a:lnRef>
+          <a:fillRef idx="1">
+            <a:schemeClr val="accent1"/>
+          </a:fillRef>
+          <a:effectRef idx="0">
+            <a:schemeClr val="accent1"/>
+          </a:effectRef>
+          <a:fontRef idx="minor">
+            <a:schemeClr val="lt1"/>
+          </a:fontRef>
+        </p:style>
+        <p:txBody>
+          <a:bodyPr rtlCol="0" anchor="ctr"/>
+          <a:lstStyle/>
+          <a:p>
+            <a:pPr algn="ctr"/>
+            <a:endParaRPr lang="en-US"/>
+          </a:p>
+        </p:txBody>
+      </p:sp>
+      <p:sp>
+        <p:nvSpPr>
+          <p:cNvPr id="8" name="TextBox 7">
+            <a:extLst>
+              <a:ext uri="{FF2B5EF4-FFF2-40B4-BE49-F238E27FC236}">
+                <a16:creationId xmlns:a16="http://schemas.microsoft.com/office/drawing/2014/main" id="{A0BE6B5A-1105-F245-A9D0-7262B36B1EF0}"/>
+              </a:ext>
+            </a:extLst>
+          </p:cNvPr>
+          <p:cNvSpPr txBox="1"/>
+          <p:nvPr/>
+        </p:nvSpPr>
+        <p:spPr>
+          <a:xfrm>
+            <a:off x="7056581" y="2786469"/>
+            <a:ext cx="3691738" cy="923330"/>
+          </a:xfrm>
+          <a:prstGeom prst="rect">
+            <a:avLst/>
+          </a:prstGeom>
+          <a:noFill/>
+        </p:spPr>
+        <p:txBody>
+          <a:bodyPr wrap="square" rtlCol="0">
+            <a:spAutoFit/>
+          </a:bodyPr>
+          <a:lstStyle/>
+          <a:p>
+            <a:pPr algn="ctr"/>
+            <a:r>
+              <a:rPr lang="en-US" dirty="0"/>
+              <a:t>Ratio of unhealthy measurements = </a:t>
+            </a:r>
+          </a:p>
+          <a:p>
+            <a:pPr algn="ctr"/>
+            <a:r>
+              <a:rPr lang="en-US" dirty="0"/>
+              <a:t>Number of unhealthy instances /  Total number of instances </a:t>
+            </a:r>
+          </a:p>
+        </p:txBody>
+      </p:sp>
+      <p:pic>
+        <p:nvPicPr>
+          <p:cNvPr id="12" name="Content Placeholder 11" descr="Table&#10;&#10;Description automatically generated">
+            <a:extLst>
+              <a:ext uri="{FF2B5EF4-FFF2-40B4-BE49-F238E27FC236}">
+                <a16:creationId xmlns:a16="http://schemas.microsoft.com/office/drawing/2014/main" id="{059C89DF-5809-BA44-AAF1-1DA4C0251184}"/>
+              </a:ext>
+            </a:extLst>
+          </p:cNvPr>
+          <p:cNvPicPr>
+            <a:picLocks noGrp="1" noChangeAspect="1"/>
+          </p:cNvPicPr>
+          <p:nvPr>
+            <p:ph idx="1"/>
+          </p:nvPr>
+        </p:nvPicPr>
+        <p:blipFill>
+          <a:blip r:embed="rId2"/>
+          <a:stretch>
+            <a:fillRect/>
+          </a:stretch>
+        </p:blipFill>
+        <p:spPr>
+          <a:xfrm>
+            <a:off x="2883938" y="1951146"/>
+            <a:ext cx="1663700" cy="3746500"/>
+          </a:xfrm>
+        </p:spPr>
+      </p:pic>
+      <p:sp>
+        <p:nvSpPr>
+          <p:cNvPr id="13" name="TextBox 12">
+            <a:extLst>
+              <a:ext uri="{FF2B5EF4-FFF2-40B4-BE49-F238E27FC236}">
+                <a16:creationId xmlns:a16="http://schemas.microsoft.com/office/drawing/2014/main" id="{13E5A281-F8D5-3C4A-BF2D-F1F526E97C6B}"/>
+              </a:ext>
+            </a:extLst>
+          </p:cNvPr>
+          <p:cNvSpPr txBox="1"/>
+          <p:nvPr/>
+        </p:nvSpPr>
+        <p:spPr>
+          <a:xfrm>
+            <a:off x="8461355" y="4077709"/>
+            <a:ext cx="846707" cy="369332"/>
+          </a:xfrm>
+          <a:prstGeom prst="rect">
+            <a:avLst/>
+          </a:prstGeom>
+          <a:noFill/>
+        </p:spPr>
+        <p:txBody>
+          <a:bodyPr wrap="none" rtlCol="0">
+            <a:spAutoFit/>
+          </a:bodyPr>
+          <a:lstStyle/>
+          <a:p>
+            <a:r>
+              <a:rPr lang="en-US" dirty="0"/>
+              <a:t>3/3 = </a:t>
+            </a:r>
+            <a:r>
+              <a:rPr lang="en-US" b="1" dirty="0"/>
+              <a:t>1</a:t>
+            </a:r>
+          </a:p>
+        </p:txBody>
+      </p:sp>
+      <p:sp>
+        <p:nvSpPr>
+          <p:cNvPr id="14" name="TextBox 13">
+            <a:extLst>
+              <a:ext uri="{FF2B5EF4-FFF2-40B4-BE49-F238E27FC236}">
+                <a16:creationId xmlns:a16="http://schemas.microsoft.com/office/drawing/2014/main" id="{DA3AF3DE-905E-3F49-8A49-5B67508B3AB4}"/>
+              </a:ext>
+            </a:extLst>
+          </p:cNvPr>
+          <p:cNvSpPr txBox="1"/>
+          <p:nvPr/>
+        </p:nvSpPr>
+        <p:spPr>
+          <a:xfrm>
+            <a:off x="1443681" y="6221020"/>
+            <a:ext cx="9304638" cy="369332"/>
+          </a:xfrm>
+          <a:prstGeom prst="rect">
+            <a:avLst/>
+          </a:prstGeom>
+          <a:noFill/>
+        </p:spPr>
+        <p:txBody>
+          <a:bodyPr wrap="square" rtlCol="0">
+            <a:spAutoFit/>
+          </a:bodyPr>
+          <a:lstStyle/>
+          <a:p>
+            <a:r>
+              <a:rPr lang="en-US" dirty="0"/>
+              <a:t>A creatinine level of &gt; 1.0 mg/dl</a:t>
+            </a:r>
+            <a:r>
+              <a:rPr lang="en-US" dirty="0">
+                <a:effectLst/>
+              </a:rPr>
+              <a:t> for females and &gt; 1.2 </a:t>
+            </a:r>
+            <a:r>
+              <a:rPr lang="en-US" dirty="0"/>
+              <a:t>mg/dl</a:t>
+            </a:r>
+            <a:r>
+              <a:rPr lang="en-US" dirty="0">
+                <a:effectLst/>
+              </a:rPr>
+              <a:t> for males is considered abnormal</a:t>
+            </a:r>
+            <a:endParaRPr lang="en-US" dirty="0"/>
+          </a:p>
+        </p:txBody>
+      </p:sp>
+    </p:spTree>
+    <p:extLst>
+      <p:ext uri="{BB962C8B-B14F-4D97-AF65-F5344CB8AC3E}">
+        <p14:creationId xmlns:p14="http://schemas.microsoft.com/office/powerpoint/2010/main" val="2039841290"/>
+      </p:ext>
+    </p:extLst>
+  </p:cSld>
+  <p:clrMapOvr>
+    <a:masterClrMapping/>
+  </p:clrMapOvr>
+</p:sld>
+</file>
+
+<file path=ppt/slides/slide8.xml><?xml version="1.0" encoding="utf-8"?>
+<p:sld xmlns:a="http://schemas.openxmlformats.org/drawingml/2006/main" xmlns:r="http://schemas.openxmlformats.org/officeDocument/2006/relationships" xmlns:p="http://schemas.openxmlformats.org/presentationml/2006/main">
+  <p:cSld>
+    <p:spTree>
+      <p:nvGrpSpPr>
+        <p:cNvPr id="1" name=""/>
+        <p:cNvGrpSpPr/>
+        <p:nvPr/>
+      </p:nvGrpSpPr>
+      <p:grpSpPr>
+        <a:xfrm>
+          <a:off x="0" y="0"/>
+          <a:ext cx="0" cy="0"/>
+          <a:chOff x="0" y="0"/>
+          <a:chExt cx="0" cy="0"/>
+        </a:xfrm>
+      </p:grpSpPr>
+      <p:sp>
+        <p:nvSpPr>
+          <p:cNvPr id="2" name="Title 1">
+            <a:extLst>
+              <a:ext uri="{FF2B5EF4-FFF2-40B4-BE49-F238E27FC236}">
+                <a16:creationId xmlns:a16="http://schemas.microsoft.com/office/drawing/2014/main" id="{5C421C56-BCBC-484A-94BC-F2880B9D3B6E}"/>
+              </a:ext>
+            </a:extLst>
+          </p:cNvPr>
+          <p:cNvSpPr>
+            <a:spLocks noGrp="1"/>
+          </p:cNvSpPr>
+          <p:nvPr>
+            <p:ph type="title"/>
+          </p:nvPr>
+        </p:nvSpPr>
+        <p:spPr/>
+        <p:txBody>
+          <a:bodyPr/>
+          <a:lstStyle/>
+          <a:p>
+            <a:r>
+              <a:rPr lang="en-US" dirty="0"/>
+              <a:t>Feature Engineering Steps</a:t>
+            </a:r>
+          </a:p>
+        </p:txBody>
+      </p:sp>
+      <p:sp>
+        <p:nvSpPr>
+          <p:cNvPr id="3" name="Content Placeholder 2">
+            <a:extLst>
+              <a:ext uri="{FF2B5EF4-FFF2-40B4-BE49-F238E27FC236}">
+                <a16:creationId xmlns:a16="http://schemas.microsoft.com/office/drawing/2014/main" id="{2D9BF9CF-F11B-A44A-B687-5874C3A469EC}"/>
+              </a:ext>
+            </a:extLst>
+          </p:cNvPr>
+          <p:cNvSpPr>
+            <a:spLocks noGrp="1"/>
+          </p:cNvSpPr>
+          <p:nvPr>
+            <p:ph idx="1"/>
+          </p:nvPr>
+        </p:nvSpPr>
+        <p:spPr/>
+        <p:txBody>
+          <a:bodyPr>
+            <a:normAutofit/>
+          </a:bodyPr>
+          <a:lstStyle/>
+          <a:p>
+            <a:r>
+              <a:rPr lang="en-US" dirty="0"/>
+              <a:t>As a measure of number of CKD related conditions treated, total number of unique medications per patient was calculated</a:t>
+            </a:r>
+          </a:p>
+        </p:txBody>
+      </p:sp>
+      <p:sp>
+        <p:nvSpPr>
+          <p:cNvPr id="4" name="TextBox 3">
+            <a:extLst>
+              <a:ext uri="{FF2B5EF4-FFF2-40B4-BE49-F238E27FC236}">
+                <a16:creationId xmlns:a16="http://schemas.microsoft.com/office/drawing/2014/main" id="{493E8AFE-4044-B34F-9128-AAC5107BB0EE}"/>
+              </a:ext>
+            </a:extLst>
+          </p:cNvPr>
+          <p:cNvSpPr txBox="1"/>
+          <p:nvPr/>
+        </p:nvSpPr>
+        <p:spPr>
+          <a:xfrm>
+            <a:off x="3444991" y="2856706"/>
+            <a:ext cx="2002279" cy="646331"/>
+          </a:xfrm>
+          <a:prstGeom prst="rect">
+            <a:avLst/>
+          </a:prstGeom>
+          <a:noFill/>
+        </p:spPr>
+        <p:txBody>
+          <a:bodyPr wrap="none" rtlCol="0">
+            <a:spAutoFit/>
+          </a:bodyPr>
+          <a:lstStyle/>
+          <a:p>
+            <a:r>
+              <a:rPr lang="en-US" dirty="0"/>
+              <a:t>List of medications</a:t>
+            </a:r>
+          </a:p>
+          <a:p>
+            <a:endParaRPr lang="en-US" dirty="0"/>
+          </a:p>
+        </p:txBody>
+      </p:sp>
+      <p:pic>
+        <p:nvPicPr>
+          <p:cNvPr id="6" name="Picture 5" descr="Table&#10;&#10;Description automatically generated">
+            <a:extLst>
+              <a:ext uri="{FF2B5EF4-FFF2-40B4-BE49-F238E27FC236}">
+                <a16:creationId xmlns:a16="http://schemas.microsoft.com/office/drawing/2014/main" id="{9387621E-F2D2-A343-B16D-98232BBACC66}"/>
+              </a:ext>
+            </a:extLst>
+          </p:cNvPr>
+          <p:cNvPicPr>
+            <a:picLocks noChangeAspect="1"/>
+          </p:cNvPicPr>
+          <p:nvPr/>
+        </p:nvPicPr>
+        <p:blipFill>
+          <a:blip r:embed="rId2"/>
+          <a:stretch>
+            <a:fillRect/>
+          </a:stretch>
+        </p:blipFill>
+        <p:spPr>
+          <a:xfrm>
+            <a:off x="3921382" y="3294137"/>
+            <a:ext cx="996607" cy="3017763"/>
+          </a:xfrm>
+          <a:prstGeom prst="rect">
+            <a:avLst/>
+          </a:prstGeom>
+        </p:spPr>
+      </p:pic>
+      <p:sp>
+        <p:nvSpPr>
+          <p:cNvPr id="7" name="Right Arrow 6">
+            <a:extLst>
+              <a:ext uri="{FF2B5EF4-FFF2-40B4-BE49-F238E27FC236}">
+                <a16:creationId xmlns:a16="http://schemas.microsoft.com/office/drawing/2014/main" id="{EF8D8021-E847-7344-80FE-AC1B9233CCE7}"/>
+              </a:ext>
+            </a:extLst>
+          </p:cNvPr>
+          <p:cNvSpPr/>
+          <p:nvPr/>
+        </p:nvSpPr>
+        <p:spPr>
+          <a:xfrm>
+            <a:off x="5447270" y="4001294"/>
+            <a:ext cx="1297460" cy="506627"/>
+          </a:xfrm>
+          <a:prstGeom prst="rightArrow">
+            <a:avLst/>
+          </a:prstGeom>
+        </p:spPr>
+        <p:style>
+          <a:lnRef idx="2">
+            <a:schemeClr val="accent1">
+              <a:shade val="50000"/>
+            </a:schemeClr>
+          </a:lnRef>
+          <a:fillRef idx="1">
+            <a:schemeClr val="accent1"/>
+          </a:fillRef>
+          <a:effectRef idx="0">
+            <a:schemeClr val="accent1"/>
+          </a:effectRef>
+          <a:fontRef idx="minor">
+            <a:schemeClr val="lt1"/>
+          </a:fontRef>
+        </p:style>
+        <p:txBody>
+          <a:bodyPr rtlCol="0" anchor="ctr"/>
+          <a:lstStyle/>
+          <a:p>
+            <a:pPr algn="ctr"/>
+            <a:endParaRPr lang="en-US"/>
+          </a:p>
+        </p:txBody>
+      </p:sp>
+      <p:sp>
+        <p:nvSpPr>
+          <p:cNvPr id="8" name="TextBox 7">
+            <a:extLst>
+              <a:ext uri="{FF2B5EF4-FFF2-40B4-BE49-F238E27FC236}">
+                <a16:creationId xmlns:a16="http://schemas.microsoft.com/office/drawing/2014/main" id="{6276E550-726F-D548-804C-860624D44272}"/>
+              </a:ext>
+            </a:extLst>
+          </p:cNvPr>
+          <p:cNvSpPr txBox="1"/>
+          <p:nvPr/>
+        </p:nvSpPr>
+        <p:spPr>
+          <a:xfrm>
+            <a:off x="7028983" y="3515943"/>
+            <a:ext cx="2213822" cy="1477328"/>
+          </a:xfrm>
+          <a:prstGeom prst="rect">
+            <a:avLst/>
+          </a:prstGeom>
+          <a:noFill/>
+        </p:spPr>
+        <p:txBody>
+          <a:bodyPr wrap="square" rtlCol="0">
+            <a:spAutoFit/>
+          </a:bodyPr>
+          <a:lstStyle/>
+          <a:p>
+            <a:pPr algn="ctr"/>
+            <a:r>
+              <a:rPr lang="en-US" dirty="0"/>
+              <a:t>Number of Unique Medications for Patient ID #5 </a:t>
+            </a:r>
+          </a:p>
+          <a:p>
+            <a:pPr algn="ctr"/>
+            <a:r>
+              <a:rPr lang="en-US" dirty="0"/>
+              <a:t>=</a:t>
+            </a:r>
+          </a:p>
+          <a:p>
+            <a:pPr algn="ctr"/>
+            <a:r>
+              <a:rPr lang="en-US" dirty="0"/>
+              <a:t> </a:t>
+            </a:r>
+            <a:r>
+              <a:rPr lang="en-US" b="1" dirty="0"/>
+              <a:t>3</a:t>
+            </a:r>
+          </a:p>
+        </p:txBody>
+      </p:sp>
+    </p:spTree>
+    <p:extLst>
+      <p:ext uri="{BB962C8B-B14F-4D97-AF65-F5344CB8AC3E}">
+        <p14:creationId xmlns:p14="http://schemas.microsoft.com/office/powerpoint/2010/main" val="2930044797"/>
+      </p:ext>
+    </p:extLst>
+  </p:cSld>
+  <p:clrMapOvr>
+    <a:masterClrMapping/>
+  </p:clrMapOvr>
+</p:sld>
+</file>
+
+<file path=ppt/slides/slide9.xml><?xml version="1.0" encoding="utf-8"?>
+<p:sld xmlns:a="http://schemas.openxmlformats.org/drawingml/2006/main" xmlns:r="http://schemas.openxmlformats.org/officeDocument/2006/relationships" xmlns:p="http://schemas.openxmlformats.org/presentationml/2006/main">
+  <p:cSld>
+    <p:spTree>
+      <p:nvGrpSpPr>
+        <p:cNvPr id="1" name=""/>
+        <p:cNvGrpSpPr/>
+        <p:nvPr/>
+      </p:nvGrpSpPr>
+      <p:grpSpPr>
+        <a:xfrm>
+          <a:off x="0" y="0"/>
+          <a:ext cx="0" cy="0"/>
+          <a:chOff x="0" y="0"/>
+          <a:chExt cx="0" cy="0"/>
+        </a:xfrm>
+      </p:grpSpPr>
+      <p:sp>
+        <p:nvSpPr>
+          <p:cNvPr id="2" name="Title 1">
+            <a:extLst>
+              <a:ext uri="{FF2B5EF4-FFF2-40B4-BE49-F238E27FC236}">
+                <a16:creationId xmlns:a16="http://schemas.microsoft.com/office/drawing/2014/main" id="{C91ADAD0-841E-B84D-A542-FDB06C6C719E}"/>
+              </a:ext>
+            </a:extLst>
+          </p:cNvPr>
+          <p:cNvSpPr>
+            <a:spLocks noGrp="1"/>
+          </p:cNvSpPr>
+          <p:nvPr>
+            <p:ph type="title"/>
+          </p:nvPr>
+        </p:nvSpPr>
+        <p:spPr/>
+        <p:txBody>
+          <a:bodyPr/>
+          <a:lstStyle/>
+          <a:p>
+            <a:r>
+              <a:rPr lang="en-US" dirty="0"/>
+              <a:t>Data Preparation</a:t>
+            </a:r>
+          </a:p>
+        </p:txBody>
+      </p:sp>
+      <p:sp>
+        <p:nvSpPr>
+          <p:cNvPr id="3" name="Content Placeholder 2">
+            <a:extLst>
+              <a:ext uri="{FF2B5EF4-FFF2-40B4-BE49-F238E27FC236}">
+                <a16:creationId xmlns:a16="http://schemas.microsoft.com/office/drawing/2014/main" id="{159D62D4-B575-2C4B-A15D-2D8156400036}"/>
+              </a:ext>
+            </a:extLst>
+          </p:cNvPr>
+          <p:cNvSpPr>
+            <a:spLocks noGrp="1"/>
+          </p:cNvSpPr>
+          <p:nvPr>
+            <p:ph idx="1"/>
+          </p:nvPr>
+        </p:nvSpPr>
+        <p:spPr/>
+        <p:txBody>
+          <a:bodyPr/>
+          <a:lstStyle/>
+          <a:p>
+            <a:r>
+              <a:rPr lang="en-US" dirty="0"/>
+              <a:t>In order to get the dataset ready for machine learning, the following steps were done</a:t>
+            </a:r>
+          </a:p>
+          <a:p>
+            <a:pPr lvl="1"/>
+            <a:r>
+              <a:rPr lang="en-US" dirty="0"/>
+              <a:t>Changing binary independent variables into numerical variables (1 or 0)</a:t>
+            </a:r>
+          </a:p>
+          <a:p>
+            <a:pPr lvl="2"/>
+            <a:r>
+              <a:rPr lang="en-US" dirty="0"/>
+              <a:t>Gender</a:t>
+            </a:r>
+          </a:p>
+          <a:p>
+            <a:pPr lvl="2"/>
+            <a:r>
+              <a:rPr lang="en-US" dirty="0"/>
+              <a:t>CKD stage progress</a:t>
+            </a:r>
+          </a:p>
+          <a:p>
+            <a:pPr lvl="1"/>
+            <a:r>
+              <a:rPr lang="en-US" dirty="0"/>
+              <a:t>One –hot  encoding for race (categorical data)</a:t>
+            </a:r>
+          </a:p>
+          <a:p>
+            <a:pPr lvl="2"/>
+            <a:r>
+              <a:rPr lang="en-US" dirty="0"/>
+              <a:t>‘Dummy’ encoding scheme so each category becomes a binary independent variable</a:t>
+            </a:r>
+          </a:p>
+        </p:txBody>
+      </p:sp>
+    </p:spTree>
+    <p:extLst>
+      <p:ext uri="{BB962C8B-B14F-4D97-AF65-F5344CB8AC3E}">
+        <p14:creationId xmlns:p14="http://schemas.microsoft.com/office/powerpoint/2010/main" val="2784123409"/>
       </p:ext>
     </p:extLst>
   </p:cSld>

</xml_diff>

<commit_message>
complete presentation and add environment file
</commit_message>
<xml_diff>
--- a/ckd_presentation.pptx
+++ b/ckd_presentation.pptx
@@ -4,6 +4,9 @@
   <p:sldMasterIdLst>
     <p:sldMasterId id="2147483648" r:id="rId1"/>
   </p:sldMasterIdLst>
+  <p:notesMasterIdLst>
+    <p:notesMasterId r:id="rId20"/>
+  </p:notesMasterIdLst>
   <p:sldIdLst>
     <p:sldId id="256" r:id="rId2"/>
     <p:sldId id="257" r:id="rId3"/>
@@ -15,6 +18,14 @@
     <p:sldId id="262" r:id="rId9"/>
     <p:sldId id="264" r:id="rId10"/>
     <p:sldId id="265" r:id="rId11"/>
+    <p:sldId id="266" r:id="rId12"/>
+    <p:sldId id="267" r:id="rId13"/>
+    <p:sldId id="268" r:id="rId14"/>
+    <p:sldId id="270" r:id="rId15"/>
+    <p:sldId id="269" r:id="rId16"/>
+    <p:sldId id="273" r:id="rId17"/>
+    <p:sldId id="271" r:id="rId18"/>
+    <p:sldId id="272" r:id="rId19"/>
   </p:sldIdLst>
   <p:sldSz cx="12192000" cy="6858000"/>
   <p:notesSz cx="6858000" cy="9144000"/>
@@ -114,6 +125,439 @@
     </a:lvl9pPr>
   </p:defaultTextStyle>
 </p:presentation>
+</file>
+
+<file path=ppt/notesMasters/notesMaster1.xml><?xml version="1.0" encoding="utf-8"?>
+<p:notesMaster xmlns:a="http://schemas.openxmlformats.org/drawingml/2006/main" xmlns:r="http://schemas.openxmlformats.org/officeDocument/2006/relationships" xmlns:p="http://schemas.openxmlformats.org/presentationml/2006/main">
+  <p:cSld>
+    <p:bg>
+      <p:bgRef idx="1001">
+        <a:schemeClr val="bg1"/>
+      </p:bgRef>
+    </p:bg>
+    <p:spTree>
+      <p:nvGrpSpPr>
+        <p:cNvPr id="1" name=""/>
+        <p:cNvGrpSpPr/>
+        <p:nvPr/>
+      </p:nvGrpSpPr>
+      <p:grpSpPr>
+        <a:xfrm>
+          <a:off x="0" y="0"/>
+          <a:ext cx="0" cy="0"/>
+          <a:chOff x="0" y="0"/>
+          <a:chExt cx="0" cy="0"/>
+        </a:xfrm>
+      </p:grpSpPr>
+      <p:sp>
+        <p:nvSpPr>
+          <p:cNvPr id="2" name="Header Placeholder 1"/>
+          <p:cNvSpPr>
+            <a:spLocks noGrp="1"/>
+          </p:cNvSpPr>
+          <p:nvPr>
+            <p:ph type="hdr" sz="quarter"/>
+          </p:nvPr>
+        </p:nvSpPr>
+        <p:spPr>
+          <a:xfrm>
+            <a:off x="0" y="0"/>
+            <a:ext cx="2971800" cy="458788"/>
+          </a:xfrm>
+          <a:prstGeom prst="rect">
+            <a:avLst/>
+          </a:prstGeom>
+        </p:spPr>
+        <p:txBody>
+          <a:bodyPr vert="horz" lIns="91440" tIns="45720" rIns="91440" bIns="45720" rtlCol="0"/>
+          <a:lstStyle>
+            <a:lvl1pPr algn="l">
+              <a:defRPr sz="1200"/>
+            </a:lvl1pPr>
+          </a:lstStyle>
+          <a:p>
+            <a:endParaRPr lang="en-US"/>
+          </a:p>
+        </p:txBody>
+      </p:sp>
+      <p:sp>
+        <p:nvSpPr>
+          <p:cNvPr id="3" name="Date Placeholder 2"/>
+          <p:cNvSpPr>
+            <a:spLocks noGrp="1"/>
+          </p:cNvSpPr>
+          <p:nvPr>
+            <p:ph type="dt" idx="1"/>
+          </p:nvPr>
+        </p:nvSpPr>
+        <p:spPr>
+          <a:xfrm>
+            <a:off x="3884613" y="0"/>
+            <a:ext cx="2971800" cy="458788"/>
+          </a:xfrm>
+          <a:prstGeom prst="rect">
+            <a:avLst/>
+          </a:prstGeom>
+        </p:spPr>
+        <p:txBody>
+          <a:bodyPr vert="horz" lIns="91440" tIns="45720" rIns="91440" bIns="45720" rtlCol="0"/>
+          <a:lstStyle>
+            <a:lvl1pPr algn="r">
+              <a:defRPr sz="1200"/>
+            </a:lvl1pPr>
+          </a:lstStyle>
+          <a:p>
+            <a:fld id="{3A830AF3-3D2F-3844-9D55-3646C6E65793}" type="datetimeFigureOut">
+              <a:rPr lang="en-US" smtClean="0"/>
+              <a:t>9/17/21</a:t>
+            </a:fld>
+            <a:endParaRPr lang="en-US"/>
+          </a:p>
+        </p:txBody>
+      </p:sp>
+      <p:sp>
+        <p:nvSpPr>
+          <p:cNvPr id="4" name="Slide Image Placeholder 3"/>
+          <p:cNvSpPr>
+            <a:spLocks noGrp="1" noRot="1" noChangeAspect="1"/>
+          </p:cNvSpPr>
+          <p:nvPr>
+            <p:ph type="sldImg" idx="2"/>
+          </p:nvPr>
+        </p:nvSpPr>
+        <p:spPr>
+          <a:xfrm>
+            <a:off x="685800" y="1143000"/>
+            <a:ext cx="5486400" cy="3086100"/>
+          </a:xfrm>
+          <a:prstGeom prst="rect">
+            <a:avLst/>
+          </a:prstGeom>
+          <a:noFill/>
+          <a:ln w="12700">
+            <a:solidFill>
+              <a:prstClr val="black"/>
+            </a:solidFill>
+          </a:ln>
+        </p:spPr>
+        <p:txBody>
+          <a:bodyPr vert="horz" lIns="91440" tIns="45720" rIns="91440" bIns="45720" rtlCol="0" anchor="ctr"/>
+          <a:lstStyle/>
+          <a:p>
+            <a:endParaRPr lang="en-US"/>
+          </a:p>
+        </p:txBody>
+      </p:sp>
+      <p:sp>
+        <p:nvSpPr>
+          <p:cNvPr id="5" name="Notes Placeholder 4"/>
+          <p:cNvSpPr>
+            <a:spLocks noGrp="1"/>
+          </p:cNvSpPr>
+          <p:nvPr>
+            <p:ph type="body" sz="quarter" idx="3"/>
+          </p:nvPr>
+        </p:nvSpPr>
+        <p:spPr>
+          <a:xfrm>
+            <a:off x="685800" y="4400550"/>
+            <a:ext cx="5486400" cy="3600450"/>
+          </a:xfrm>
+          <a:prstGeom prst="rect">
+            <a:avLst/>
+          </a:prstGeom>
+        </p:spPr>
+        <p:txBody>
+          <a:bodyPr vert="horz" lIns="91440" tIns="45720" rIns="91440" bIns="45720" rtlCol="0"/>
+          <a:lstStyle/>
+          <a:p>
+            <a:pPr lvl="0"/>
+            <a:r>
+              <a:rPr lang="en-US"/>
+              <a:t>Click to edit Master text styles</a:t>
+            </a:r>
+          </a:p>
+          <a:p>
+            <a:pPr lvl="1"/>
+            <a:r>
+              <a:rPr lang="en-US"/>
+              <a:t>Second level</a:t>
+            </a:r>
+          </a:p>
+          <a:p>
+            <a:pPr lvl="2"/>
+            <a:r>
+              <a:rPr lang="en-US"/>
+              <a:t>Third level</a:t>
+            </a:r>
+          </a:p>
+          <a:p>
+            <a:pPr lvl="3"/>
+            <a:r>
+              <a:rPr lang="en-US"/>
+              <a:t>Fourth level</a:t>
+            </a:r>
+          </a:p>
+          <a:p>
+            <a:pPr lvl="4"/>
+            <a:r>
+              <a:rPr lang="en-US"/>
+              <a:t>Fifth level</a:t>
+            </a:r>
+          </a:p>
+        </p:txBody>
+      </p:sp>
+      <p:sp>
+        <p:nvSpPr>
+          <p:cNvPr id="6" name="Footer Placeholder 5"/>
+          <p:cNvSpPr>
+            <a:spLocks noGrp="1"/>
+          </p:cNvSpPr>
+          <p:nvPr>
+            <p:ph type="ftr" sz="quarter" idx="4"/>
+          </p:nvPr>
+        </p:nvSpPr>
+        <p:spPr>
+          <a:xfrm>
+            <a:off x="0" y="8685213"/>
+            <a:ext cx="2971800" cy="458787"/>
+          </a:xfrm>
+          <a:prstGeom prst="rect">
+            <a:avLst/>
+          </a:prstGeom>
+        </p:spPr>
+        <p:txBody>
+          <a:bodyPr vert="horz" lIns="91440" tIns="45720" rIns="91440" bIns="45720" rtlCol="0" anchor="b"/>
+          <a:lstStyle>
+            <a:lvl1pPr algn="l">
+              <a:defRPr sz="1200"/>
+            </a:lvl1pPr>
+          </a:lstStyle>
+          <a:p>
+            <a:endParaRPr lang="en-US"/>
+          </a:p>
+        </p:txBody>
+      </p:sp>
+      <p:sp>
+        <p:nvSpPr>
+          <p:cNvPr id="7" name="Slide Number Placeholder 6"/>
+          <p:cNvSpPr>
+            <a:spLocks noGrp="1"/>
+          </p:cNvSpPr>
+          <p:nvPr>
+            <p:ph type="sldNum" sz="quarter" idx="5"/>
+          </p:nvPr>
+        </p:nvSpPr>
+        <p:spPr>
+          <a:xfrm>
+            <a:off x="3884613" y="8685213"/>
+            <a:ext cx="2971800" cy="458787"/>
+          </a:xfrm>
+          <a:prstGeom prst="rect">
+            <a:avLst/>
+          </a:prstGeom>
+        </p:spPr>
+        <p:txBody>
+          <a:bodyPr vert="horz" lIns="91440" tIns="45720" rIns="91440" bIns="45720" rtlCol="0" anchor="b"/>
+          <a:lstStyle>
+            <a:lvl1pPr algn="r">
+              <a:defRPr sz="1200"/>
+            </a:lvl1pPr>
+          </a:lstStyle>
+          <a:p>
+            <a:fld id="{EED46EB4-30CE-EF4A-A25F-4BD699280A0C}" type="slidenum">
+              <a:rPr lang="en-US" smtClean="0"/>
+              <a:t>‹#›</a:t>
+            </a:fld>
+            <a:endParaRPr lang="en-US"/>
+          </a:p>
+        </p:txBody>
+      </p:sp>
+    </p:spTree>
+    <p:extLst>
+      <p:ext uri="{BB962C8B-B14F-4D97-AF65-F5344CB8AC3E}">
+        <p14:creationId xmlns:p14="http://schemas.microsoft.com/office/powerpoint/2010/main" val="152488332"/>
+      </p:ext>
+    </p:extLst>
+  </p:cSld>
+  <p:clrMap bg1="lt1" tx1="dk1" bg2="lt2" tx2="dk2" accent1="accent1" accent2="accent2" accent3="accent3" accent4="accent4" accent5="accent5" accent6="accent6" hlink="hlink" folHlink="folHlink"/>
+  <p:notesStyle>
+    <a:lvl1pPr marL="0" algn="l" defTabSz="914400" rtl="0" eaLnBrk="1" latinLnBrk="0" hangingPunct="1">
+      <a:defRPr sz="1200" kern="1200">
+        <a:solidFill>
+          <a:schemeClr val="tx1"/>
+        </a:solidFill>
+        <a:latin typeface="+mn-lt"/>
+        <a:ea typeface="+mn-ea"/>
+        <a:cs typeface="+mn-cs"/>
+      </a:defRPr>
+    </a:lvl1pPr>
+    <a:lvl2pPr marL="457200" algn="l" defTabSz="914400" rtl="0" eaLnBrk="1" latinLnBrk="0" hangingPunct="1">
+      <a:defRPr sz="1200" kern="1200">
+        <a:solidFill>
+          <a:schemeClr val="tx1"/>
+        </a:solidFill>
+        <a:latin typeface="+mn-lt"/>
+        <a:ea typeface="+mn-ea"/>
+        <a:cs typeface="+mn-cs"/>
+      </a:defRPr>
+    </a:lvl2pPr>
+    <a:lvl3pPr marL="914400" algn="l" defTabSz="914400" rtl="0" eaLnBrk="1" latinLnBrk="0" hangingPunct="1">
+      <a:defRPr sz="1200" kern="1200">
+        <a:solidFill>
+          <a:schemeClr val="tx1"/>
+        </a:solidFill>
+        <a:latin typeface="+mn-lt"/>
+        <a:ea typeface="+mn-ea"/>
+        <a:cs typeface="+mn-cs"/>
+      </a:defRPr>
+    </a:lvl3pPr>
+    <a:lvl4pPr marL="1371600" algn="l" defTabSz="914400" rtl="0" eaLnBrk="1" latinLnBrk="0" hangingPunct="1">
+      <a:defRPr sz="1200" kern="1200">
+        <a:solidFill>
+          <a:schemeClr val="tx1"/>
+        </a:solidFill>
+        <a:latin typeface="+mn-lt"/>
+        <a:ea typeface="+mn-ea"/>
+        <a:cs typeface="+mn-cs"/>
+      </a:defRPr>
+    </a:lvl4pPr>
+    <a:lvl5pPr marL="1828800" algn="l" defTabSz="914400" rtl="0" eaLnBrk="1" latinLnBrk="0" hangingPunct="1">
+      <a:defRPr sz="1200" kern="1200">
+        <a:solidFill>
+          <a:schemeClr val="tx1"/>
+        </a:solidFill>
+        <a:latin typeface="+mn-lt"/>
+        <a:ea typeface="+mn-ea"/>
+        <a:cs typeface="+mn-cs"/>
+      </a:defRPr>
+    </a:lvl5pPr>
+    <a:lvl6pPr marL="2286000" algn="l" defTabSz="914400" rtl="0" eaLnBrk="1" latinLnBrk="0" hangingPunct="1">
+      <a:defRPr sz="1200" kern="1200">
+        <a:solidFill>
+          <a:schemeClr val="tx1"/>
+        </a:solidFill>
+        <a:latin typeface="+mn-lt"/>
+        <a:ea typeface="+mn-ea"/>
+        <a:cs typeface="+mn-cs"/>
+      </a:defRPr>
+    </a:lvl6pPr>
+    <a:lvl7pPr marL="2743200" algn="l" defTabSz="914400" rtl="0" eaLnBrk="1" latinLnBrk="0" hangingPunct="1">
+      <a:defRPr sz="1200" kern="1200">
+        <a:solidFill>
+          <a:schemeClr val="tx1"/>
+        </a:solidFill>
+        <a:latin typeface="+mn-lt"/>
+        <a:ea typeface="+mn-ea"/>
+        <a:cs typeface="+mn-cs"/>
+      </a:defRPr>
+    </a:lvl7pPr>
+    <a:lvl8pPr marL="3200400" algn="l" defTabSz="914400" rtl="0" eaLnBrk="1" latinLnBrk="0" hangingPunct="1">
+      <a:defRPr sz="1200" kern="1200">
+        <a:solidFill>
+          <a:schemeClr val="tx1"/>
+        </a:solidFill>
+        <a:latin typeface="+mn-lt"/>
+        <a:ea typeface="+mn-ea"/>
+        <a:cs typeface="+mn-cs"/>
+      </a:defRPr>
+    </a:lvl8pPr>
+    <a:lvl9pPr marL="3657600" algn="l" defTabSz="914400" rtl="0" eaLnBrk="1" latinLnBrk="0" hangingPunct="1">
+      <a:defRPr sz="1200" kern="1200">
+        <a:solidFill>
+          <a:schemeClr val="tx1"/>
+        </a:solidFill>
+        <a:latin typeface="+mn-lt"/>
+        <a:ea typeface="+mn-ea"/>
+        <a:cs typeface="+mn-cs"/>
+      </a:defRPr>
+    </a:lvl9pPr>
+  </p:notesStyle>
+</p:notesMaster>
+</file>
+
+<file path=ppt/notesSlides/notesSlide1.xml><?xml version="1.0" encoding="utf-8"?>
+<p:notes xmlns:a="http://schemas.openxmlformats.org/drawingml/2006/main" xmlns:r="http://schemas.openxmlformats.org/officeDocument/2006/relationships" xmlns:p="http://schemas.openxmlformats.org/presentationml/2006/main">
+  <p:cSld>
+    <p:spTree>
+      <p:nvGrpSpPr>
+        <p:cNvPr id="1" name=""/>
+        <p:cNvGrpSpPr/>
+        <p:nvPr/>
+      </p:nvGrpSpPr>
+      <p:grpSpPr>
+        <a:xfrm>
+          <a:off x="0" y="0"/>
+          <a:ext cx="0" cy="0"/>
+          <a:chOff x="0" y="0"/>
+          <a:chExt cx="0" cy="0"/>
+        </a:xfrm>
+      </p:grpSpPr>
+      <p:sp>
+        <p:nvSpPr>
+          <p:cNvPr id="2" name="Slide Image Placeholder 1"/>
+          <p:cNvSpPr>
+            <a:spLocks noGrp="1" noRot="1" noChangeAspect="1"/>
+          </p:cNvSpPr>
+          <p:nvPr>
+            <p:ph type="sldImg"/>
+          </p:nvPr>
+        </p:nvSpPr>
+        <p:spPr/>
+      </p:sp>
+      <p:sp>
+        <p:nvSpPr>
+          <p:cNvPr id="3" name="Notes Placeholder 2"/>
+          <p:cNvSpPr>
+            <a:spLocks noGrp="1"/>
+          </p:cNvSpPr>
+          <p:nvPr>
+            <p:ph type="body" idx="1"/>
+          </p:nvPr>
+        </p:nvSpPr>
+        <p:spPr/>
+        <p:txBody>
+          <a:bodyPr/>
+          <a:lstStyle/>
+          <a:p>
+            <a:endParaRPr lang="en-US" dirty="0"/>
+          </a:p>
+        </p:txBody>
+      </p:sp>
+      <p:sp>
+        <p:nvSpPr>
+          <p:cNvPr id="4" name="Slide Number Placeholder 3"/>
+          <p:cNvSpPr>
+            <a:spLocks noGrp="1"/>
+          </p:cNvSpPr>
+          <p:nvPr>
+            <p:ph type="sldNum" sz="quarter" idx="5"/>
+          </p:nvPr>
+        </p:nvSpPr>
+        <p:spPr/>
+        <p:txBody>
+          <a:bodyPr/>
+          <a:lstStyle/>
+          <a:p>
+            <a:fld id="{EED46EB4-30CE-EF4A-A25F-4BD699280A0C}" type="slidenum">
+              <a:rPr lang="en-US" smtClean="0"/>
+              <a:t>13</a:t>
+            </a:fld>
+            <a:endParaRPr lang="en-US"/>
+          </a:p>
+        </p:txBody>
+      </p:sp>
+    </p:spTree>
+    <p:extLst>
+      <p:ext uri="{BB962C8B-B14F-4D97-AF65-F5344CB8AC3E}">
+        <p14:creationId xmlns:p14="http://schemas.microsoft.com/office/powerpoint/2010/main" val="2284872963"/>
+      </p:ext>
+    </p:extLst>
+  </p:cSld>
+  <p:clrMapOvr>
+    <a:masterClrMapping/>
+  </p:clrMapOvr>
+</p:notes>
 </file>
 
 <file path=ppt/slideLayouts/slideLayout1.xml><?xml version="1.0" encoding="utf-8"?>
@@ -3499,13 +3943,28 @@
             <a:pPr lvl="2"/>
             <a:r>
               <a:rPr lang="en-US" dirty="0"/>
-              <a:t>With </a:t>
-            </a:r>
-            <a:r>
-              <a:rPr lang="en-US"/>
-              <a:t>feature selection</a:t>
-            </a:r>
-            <a:endParaRPr lang="en-US" dirty="0"/>
+              <a:t>With feature selection</a:t>
+            </a:r>
+          </a:p>
+          <a:p>
+            <a:r>
+              <a:rPr lang="en-US" dirty="0"/>
+              <a:t>All are ensemble methods</a:t>
+            </a:r>
+          </a:p>
+          <a:p>
+            <a:pPr lvl="1"/>
+            <a:r>
+              <a:rPr lang="en-US" dirty="0"/>
+              <a:t>Data does not to be scaled</a:t>
+            </a:r>
+          </a:p>
+          <a:p>
+            <a:pPr lvl="1"/>
+            <a:r>
+              <a:rPr lang="en-US" dirty="0"/>
+              <a:t>Helps to aggregate weak models through bagging or boosting to create a stronger model</a:t>
+            </a:r>
           </a:p>
         </p:txBody>
       </p:sp>
@@ -3513,6 +3972,2917 @@
     <p:extLst>
       <p:ext uri="{BB962C8B-B14F-4D97-AF65-F5344CB8AC3E}">
         <p14:creationId xmlns:p14="http://schemas.microsoft.com/office/powerpoint/2010/main" val="3453503053"/>
+      </p:ext>
+    </p:extLst>
+  </p:cSld>
+  <p:clrMapOvr>
+    <a:masterClrMapping/>
+  </p:clrMapOvr>
+</p:sld>
+</file>
+
+<file path=ppt/slides/slide11.xml><?xml version="1.0" encoding="utf-8"?>
+<p:sld xmlns:a="http://schemas.openxmlformats.org/drawingml/2006/main" xmlns:r="http://schemas.openxmlformats.org/officeDocument/2006/relationships" xmlns:p="http://schemas.openxmlformats.org/presentationml/2006/main">
+  <p:cSld>
+    <p:bg>
+      <p:bgPr>
+        <a:solidFill>
+          <a:schemeClr val="bg1"/>
+        </a:solidFill>
+        <a:effectLst/>
+      </p:bgPr>
+    </p:bg>
+    <p:spTree>
+      <p:nvGrpSpPr>
+        <p:cNvPr id="1" name=""/>
+        <p:cNvGrpSpPr/>
+        <p:nvPr/>
+      </p:nvGrpSpPr>
+      <p:grpSpPr>
+        <a:xfrm>
+          <a:off x="0" y="0"/>
+          <a:ext cx="0" cy="0"/>
+          <a:chOff x="0" y="0"/>
+          <a:chExt cx="0" cy="0"/>
+        </a:xfrm>
+      </p:grpSpPr>
+      <p:sp useBgFill="1">
+        <p:nvSpPr>
+          <p:cNvPr id="15" name="Rectangle 14">
+            <a:extLst>
+              <a:ext uri="{FF2B5EF4-FFF2-40B4-BE49-F238E27FC236}">
+                <a16:creationId xmlns:a16="http://schemas.microsoft.com/office/drawing/2014/main" id="{0550F5B9-399F-4FAD-AE6C-ED65F9A43A74}"/>
+              </a:ext>
+              <a:ext uri="{C183D7F6-B498-43B3-948B-1728B52AA6E4}">
+                <adec:decorative xmlns:adec="http://schemas.microsoft.com/office/drawing/2017/decorative" val="1"/>
+              </a:ext>
+            </a:extLst>
+          </p:cNvPr>
+          <p:cNvSpPr>
+            <a:spLocks noGrp="1" noRot="1" noChangeAspect="1" noMove="1" noResize="1" noEditPoints="1" noAdjustHandles="1" noChangeArrowheads="1" noChangeShapeType="1" noTextEdit="1"/>
+          </p:cNvSpPr>
+          <p:nvPr>
+            <p:extLst>
+              <p:ext uri="{386F3935-93C4-4BCD-93E2-E3B085C9AB24}">
+                <p16:designElem xmlns:p16="http://schemas.microsoft.com/office/powerpoint/2015/main" val="1"/>
+              </p:ext>
+            </p:extLst>
+          </p:nvPr>
+        </p:nvSpPr>
+        <p:spPr>
+          <a:xfrm>
+            <a:off x="0" y="0"/>
+            <a:ext cx="12192000" cy="6858000"/>
+          </a:xfrm>
+          <a:prstGeom prst="rect">
+            <a:avLst/>
+          </a:prstGeom>
+          <a:ln>
+            <a:noFill/>
+          </a:ln>
+        </p:spPr>
+        <p:style>
+          <a:lnRef idx="2">
+            <a:schemeClr val="accent1">
+              <a:shade val="50000"/>
+            </a:schemeClr>
+          </a:lnRef>
+          <a:fillRef idx="1">
+            <a:schemeClr val="accent1"/>
+          </a:fillRef>
+          <a:effectRef idx="0">
+            <a:schemeClr val="accent1"/>
+          </a:effectRef>
+          <a:fontRef idx="minor">
+            <a:schemeClr val="lt1"/>
+          </a:fontRef>
+        </p:style>
+        <p:txBody>
+          <a:bodyPr rtlCol="0" anchor="ctr"/>
+          <a:lstStyle/>
+          <a:p>
+            <a:pPr algn="ctr"/>
+            <a:endParaRPr lang="en-US"/>
+          </a:p>
+        </p:txBody>
+      </p:sp>
+      <p:sp useBgFill="1">
+        <p:nvSpPr>
+          <p:cNvPr id="17" name="Rectangle 16">
+            <a:extLst>
+              <a:ext uri="{FF2B5EF4-FFF2-40B4-BE49-F238E27FC236}">
+                <a16:creationId xmlns:a16="http://schemas.microsoft.com/office/drawing/2014/main" id="{C062E60F-5CD4-4268-8359-8076634680E5}"/>
+              </a:ext>
+              <a:ext uri="{C183D7F6-B498-43B3-948B-1728B52AA6E4}">
+                <adec:decorative xmlns:adec="http://schemas.microsoft.com/office/drawing/2017/decorative" val="1"/>
+              </a:ext>
+            </a:extLst>
+          </p:cNvPr>
+          <p:cNvSpPr>
+            <a:spLocks noGrp="1" noRot="1" noChangeAspect="1" noMove="1" noResize="1" noEditPoints="1" noAdjustHandles="1" noChangeArrowheads="1" noChangeShapeType="1" noTextEdit="1"/>
+          </p:cNvSpPr>
+          <p:nvPr>
+            <p:extLst>
+              <p:ext uri="{386F3935-93C4-4BCD-93E2-E3B085C9AB24}">
+                <p16:designElem xmlns:p16="http://schemas.microsoft.com/office/powerpoint/2015/main" val="1"/>
+              </p:ext>
+            </p:extLst>
+          </p:nvPr>
+        </p:nvSpPr>
+        <p:spPr>
+          <a:xfrm>
+            <a:off x="554416" y="288350"/>
+            <a:ext cx="11167447" cy="2089317"/>
+          </a:xfrm>
+          <a:prstGeom prst="rect">
+            <a:avLst/>
+          </a:prstGeom>
+          <a:ln w="12700">
+            <a:solidFill>
+              <a:srgbClr val="DEDEDE"/>
+            </a:solidFill>
+          </a:ln>
+          <a:effectLst>
+            <a:outerShdw blurRad="50800" dist="38100" dir="2700000" algn="tl" rotWithShape="0">
+              <a:schemeClr val="bg2">
+                <a:lumMod val="85000"/>
+                <a:alpha val="50000"/>
+              </a:schemeClr>
+            </a:outerShdw>
+          </a:effectLst>
+        </p:spPr>
+        <p:style>
+          <a:lnRef idx="2">
+            <a:schemeClr val="accent1">
+              <a:shade val="50000"/>
+            </a:schemeClr>
+          </a:lnRef>
+          <a:fillRef idx="1">
+            <a:schemeClr val="accent1"/>
+          </a:fillRef>
+          <a:effectRef idx="0">
+            <a:schemeClr val="accent1"/>
+          </a:effectRef>
+          <a:fontRef idx="minor">
+            <a:schemeClr val="lt1"/>
+          </a:fontRef>
+        </p:style>
+        <p:txBody>
+          <a:bodyPr rtlCol="0" anchor="ctr"/>
+          <a:lstStyle/>
+          <a:p>
+            <a:pPr marL="0" marR="0" lvl="0" indent="0" algn="ctr" defTabSz="914400" rtl="0" eaLnBrk="1" fontAlgn="auto" latinLnBrk="0" hangingPunct="1">
+              <a:lnSpc>
+                <a:spcPct val="100000"/>
+              </a:lnSpc>
+              <a:spcBef>
+                <a:spcPts val="0"/>
+              </a:spcBef>
+              <a:spcAft>
+                <a:spcPts val="0"/>
+              </a:spcAft>
+              <a:buClrTx/>
+              <a:buSzTx/>
+              <a:buFontTx/>
+              <a:buNone/>
+              <a:tabLst/>
+              <a:defRPr/>
+            </a:pPr>
+            <a:endParaRPr kumimoji="0" lang="en-US" sz="1800" b="0" i="0" u="none" strike="noStrike" kern="1200" cap="none" spc="0" normalizeH="0" baseline="0" noProof="0">
+              <a:ln>
+                <a:noFill/>
+              </a:ln>
+              <a:solidFill>
+                <a:prstClr val="white"/>
+              </a:solidFill>
+              <a:effectLst/>
+              <a:uLnTx/>
+              <a:uFillTx/>
+              <a:latin typeface="Calibri" panose="020F0502020204030204"/>
+              <a:ea typeface="+mn-ea"/>
+              <a:cs typeface="+mn-cs"/>
+            </a:endParaRPr>
+          </a:p>
+        </p:txBody>
+      </p:sp>
+      <p:sp>
+        <p:nvSpPr>
+          <p:cNvPr id="2" name="Title 1">
+            <a:extLst>
+              <a:ext uri="{FF2B5EF4-FFF2-40B4-BE49-F238E27FC236}">
+                <a16:creationId xmlns:a16="http://schemas.microsoft.com/office/drawing/2014/main" id="{F8DE49E6-5E2F-2A4F-8AFA-F2316DB397E3}"/>
+              </a:ext>
+            </a:extLst>
+          </p:cNvPr>
+          <p:cNvSpPr>
+            <a:spLocks noGrp="1"/>
+          </p:cNvSpPr>
+          <p:nvPr>
+            <p:ph type="title"/>
+          </p:nvPr>
+        </p:nvSpPr>
+        <p:spPr>
+          <a:xfrm>
+            <a:off x="841248" y="510047"/>
+            <a:ext cx="3300984" cy="1645920"/>
+          </a:xfrm>
+        </p:spPr>
+        <p:txBody>
+          <a:bodyPr>
+            <a:normAutofit/>
+          </a:bodyPr>
+          <a:lstStyle/>
+          <a:p>
+            <a:r>
+              <a:rPr lang="en-US" sz="2800"/>
+              <a:t>Random Forest: Results</a:t>
+            </a:r>
+          </a:p>
+        </p:txBody>
+      </p:sp>
+      <p:sp>
+        <p:nvSpPr>
+          <p:cNvPr id="19" name="Rectangle 18">
+            <a:extLst>
+              <a:ext uri="{FF2B5EF4-FFF2-40B4-BE49-F238E27FC236}">
+                <a16:creationId xmlns:a16="http://schemas.microsoft.com/office/drawing/2014/main" id="{BB341EC3-1810-4D33-BA3F-E2D0AA0ECFB6}"/>
+              </a:ext>
+              <a:ext uri="{C183D7F6-B498-43B3-948B-1728B52AA6E4}">
+                <adec:decorative xmlns:adec="http://schemas.microsoft.com/office/drawing/2017/decorative" val="1"/>
+              </a:ext>
+            </a:extLst>
+          </p:cNvPr>
+          <p:cNvSpPr>
+            <a:spLocks noGrp="1" noRot="1" noChangeAspect="1" noMove="1" noResize="1" noEditPoints="1" noAdjustHandles="1" noChangeArrowheads="1" noChangeShapeType="1" noTextEdit="1"/>
+          </p:cNvSpPr>
+          <p:nvPr>
+            <p:extLst>
+              <p:ext uri="{386F3935-93C4-4BCD-93E2-E3B085C9AB24}">
+                <p16:designElem xmlns:p16="http://schemas.microsoft.com/office/powerpoint/2015/main" val="1"/>
+              </p:ext>
+            </p:extLst>
+          </p:nvPr>
+        </p:nvSpPr>
+        <p:spPr>
+          <a:xfrm>
+            <a:off x="490408" y="980964"/>
+            <a:ext cx="128016" cy="704088"/>
+          </a:xfrm>
+          <a:prstGeom prst="rect">
+            <a:avLst/>
+          </a:prstGeom>
+          <a:solidFill>
+            <a:schemeClr val="accent2"/>
+          </a:solidFill>
+          <a:ln>
+            <a:noFill/>
+          </a:ln>
+        </p:spPr>
+        <p:style>
+          <a:lnRef idx="2">
+            <a:schemeClr val="accent1">
+              <a:shade val="50000"/>
+            </a:schemeClr>
+          </a:lnRef>
+          <a:fillRef idx="1">
+            <a:schemeClr val="accent1"/>
+          </a:fillRef>
+          <a:effectRef idx="0">
+            <a:schemeClr val="accent1"/>
+          </a:effectRef>
+          <a:fontRef idx="minor">
+            <a:schemeClr val="lt1"/>
+          </a:fontRef>
+        </p:style>
+        <p:txBody>
+          <a:bodyPr rtlCol="0" anchor="ctr"/>
+          <a:lstStyle/>
+          <a:p>
+            <a:pPr marL="0" marR="0" lvl="0" indent="0" algn="ctr" defTabSz="914400" rtl="0" eaLnBrk="1" fontAlgn="auto" latinLnBrk="0" hangingPunct="1">
+              <a:lnSpc>
+                <a:spcPct val="100000"/>
+              </a:lnSpc>
+              <a:spcBef>
+                <a:spcPts val="0"/>
+              </a:spcBef>
+              <a:spcAft>
+                <a:spcPts val="0"/>
+              </a:spcAft>
+              <a:buClrTx/>
+              <a:buSzTx/>
+              <a:buFontTx/>
+              <a:buNone/>
+              <a:tabLst/>
+              <a:defRPr/>
+            </a:pPr>
+            <a:endParaRPr kumimoji="0" lang="en-US" sz="1800" b="0" i="0" u="none" strike="noStrike" kern="1200" cap="none" spc="0" normalizeH="0" baseline="0" noProof="0" dirty="0">
+              <a:ln>
+                <a:noFill/>
+              </a:ln>
+              <a:solidFill>
+                <a:prstClr val="white"/>
+              </a:solidFill>
+              <a:effectLst/>
+              <a:uLnTx/>
+              <a:uFillTx/>
+              <a:latin typeface="Calibri" panose="020F0502020204030204"/>
+              <a:ea typeface="+mn-ea"/>
+              <a:cs typeface="+mn-cs"/>
+            </a:endParaRPr>
+          </a:p>
+        </p:txBody>
+      </p:sp>
+      <p:sp>
+        <p:nvSpPr>
+          <p:cNvPr id="21" name="Rectangle 20">
+            <a:extLst>
+              <a:ext uri="{FF2B5EF4-FFF2-40B4-BE49-F238E27FC236}">
+                <a16:creationId xmlns:a16="http://schemas.microsoft.com/office/drawing/2014/main" id="{10127CDE-2B99-47A8-BB3C-7D17519105E0}"/>
+              </a:ext>
+              <a:ext uri="{C183D7F6-B498-43B3-948B-1728B52AA6E4}">
+                <adec:decorative xmlns:adec="http://schemas.microsoft.com/office/drawing/2017/decorative" val="1"/>
+              </a:ext>
+            </a:extLst>
+          </p:cNvPr>
+          <p:cNvSpPr>
+            <a:spLocks noGrp="1" noRot="1" noChangeAspect="1" noMove="1" noResize="1" noEditPoints="1" noAdjustHandles="1" noChangeArrowheads="1" noChangeShapeType="1" noTextEdit="1"/>
+          </p:cNvSpPr>
+          <p:nvPr>
+            <p:extLst>
+              <p:ext uri="{386F3935-93C4-4BCD-93E2-E3B085C9AB24}">
+                <p16:designElem xmlns:p16="http://schemas.microsoft.com/office/powerpoint/2015/main" val="1"/>
+              </p:ext>
+            </p:extLst>
+          </p:nvPr>
+        </p:nvSpPr>
+        <p:spPr>
+          <a:xfrm rot="5400000">
+            <a:off x="3610864" y="1323863"/>
+            <a:ext cx="1463040" cy="18288"/>
+          </a:xfrm>
+          <a:prstGeom prst="rect">
+            <a:avLst/>
+          </a:prstGeom>
+          <a:solidFill>
+            <a:srgbClr val="D5D5D5"/>
+          </a:solidFill>
+          <a:ln w="3175">
+            <a:noFill/>
+          </a:ln>
+          <a:effectLst/>
+        </p:spPr>
+        <p:style>
+          <a:lnRef idx="2">
+            <a:schemeClr val="accent1">
+              <a:shade val="50000"/>
+            </a:schemeClr>
+          </a:lnRef>
+          <a:fillRef idx="1">
+            <a:schemeClr val="accent1"/>
+          </a:fillRef>
+          <a:effectRef idx="0">
+            <a:schemeClr val="accent1"/>
+          </a:effectRef>
+          <a:fontRef idx="minor">
+            <a:schemeClr val="lt1"/>
+          </a:fontRef>
+        </p:style>
+        <p:txBody>
+          <a:bodyPr rtlCol="0" anchor="ctr"/>
+          <a:lstStyle/>
+          <a:p>
+            <a:pPr marL="0" marR="0" lvl="0" indent="0" algn="ctr" defTabSz="914400" rtl="0" eaLnBrk="1" fontAlgn="auto" latinLnBrk="0" hangingPunct="1">
+              <a:lnSpc>
+                <a:spcPct val="100000"/>
+              </a:lnSpc>
+              <a:spcBef>
+                <a:spcPts val="0"/>
+              </a:spcBef>
+              <a:spcAft>
+                <a:spcPts val="0"/>
+              </a:spcAft>
+              <a:buClrTx/>
+              <a:buSzTx/>
+              <a:buFontTx/>
+              <a:buNone/>
+              <a:tabLst/>
+              <a:defRPr/>
+            </a:pPr>
+            <a:endParaRPr kumimoji="0" lang="en-US" sz="1800" b="0" i="0" u="none" strike="noStrike" kern="1200" cap="none" spc="0" normalizeH="0" baseline="0" noProof="0">
+              <a:ln>
+                <a:noFill/>
+              </a:ln>
+              <a:solidFill>
+                <a:prstClr val="white"/>
+              </a:solidFill>
+              <a:effectLst/>
+              <a:uLnTx/>
+              <a:uFillTx/>
+              <a:latin typeface="Calibri" panose="020F0502020204030204"/>
+              <a:ea typeface="+mn-ea"/>
+              <a:cs typeface="+mn-cs"/>
+            </a:endParaRPr>
+          </a:p>
+        </p:txBody>
+      </p:sp>
+      <p:sp>
+        <p:nvSpPr>
+          <p:cNvPr id="3" name="Content Placeholder 2">
+            <a:extLst>
+              <a:ext uri="{FF2B5EF4-FFF2-40B4-BE49-F238E27FC236}">
+                <a16:creationId xmlns:a16="http://schemas.microsoft.com/office/drawing/2014/main" id="{F9967194-2198-1C49-ADD6-E4938B694EEE}"/>
+              </a:ext>
+            </a:extLst>
+          </p:cNvPr>
+          <p:cNvSpPr>
+            <a:spLocks noGrp="1"/>
+          </p:cNvSpPr>
+          <p:nvPr>
+            <p:ph idx="1"/>
+          </p:nvPr>
+        </p:nvSpPr>
+        <p:spPr>
+          <a:xfrm>
+            <a:off x="4581144" y="510047"/>
+            <a:ext cx="6858000" cy="1645920"/>
+          </a:xfrm>
+        </p:spPr>
+        <p:txBody>
+          <a:bodyPr anchor="ctr">
+            <a:normAutofit/>
+          </a:bodyPr>
+          <a:lstStyle/>
+          <a:p>
+            <a:pPr marL="0" indent="0">
+              <a:buNone/>
+            </a:pPr>
+            <a:r>
+              <a:rPr lang="en-US" sz="1500"/>
+              <a:t>ROCAUC score: 0.629</a:t>
+            </a:r>
+          </a:p>
+          <a:p>
+            <a:pPr marL="0" indent="0">
+              <a:buNone/>
+            </a:pPr>
+            <a:r>
+              <a:rPr lang="en-US" sz="1500"/>
+              <a:t>Accuracy score: 0.72 </a:t>
+            </a:r>
+          </a:p>
+          <a:p>
+            <a:pPr marL="0" indent="0">
+              <a:buNone/>
+            </a:pPr>
+            <a:r>
+              <a:rPr lang="en-US" sz="1500"/>
+              <a:t>F1 score: 0.461 </a:t>
+            </a:r>
+          </a:p>
+          <a:p>
+            <a:pPr marL="0" indent="0">
+              <a:buNone/>
+            </a:pPr>
+            <a:r>
+              <a:rPr lang="en-US" sz="1500"/>
+              <a:t>RF train accuracy: 1.000 </a:t>
+            </a:r>
+          </a:p>
+          <a:p>
+            <a:pPr marL="0" indent="0">
+              <a:buNone/>
+            </a:pPr>
+            <a:r>
+              <a:rPr lang="en-US" sz="1500"/>
+              <a:t>RF test accuracy: 0.720</a:t>
+            </a:r>
+          </a:p>
+        </p:txBody>
+      </p:sp>
+      <p:pic>
+        <p:nvPicPr>
+          <p:cNvPr id="8" name="Picture 7" descr="Chart, treemap chart&#10;&#10;Description automatically generated">
+            <a:extLst>
+              <a:ext uri="{FF2B5EF4-FFF2-40B4-BE49-F238E27FC236}">
+                <a16:creationId xmlns:a16="http://schemas.microsoft.com/office/drawing/2014/main" id="{7216CA39-6FBA-1347-8388-249BF69DAA44}"/>
+              </a:ext>
+            </a:extLst>
+          </p:cNvPr>
+          <p:cNvPicPr>
+            <a:picLocks noChangeAspect="1"/>
+          </p:cNvPicPr>
+          <p:nvPr/>
+        </p:nvPicPr>
+        <p:blipFill>
+          <a:blip r:embed="rId2"/>
+          <a:stretch>
+            <a:fillRect/>
+          </a:stretch>
+        </p:blipFill>
+        <p:spPr>
+          <a:xfrm>
+            <a:off x="557784" y="3041625"/>
+            <a:ext cx="3584448" cy="2768985"/>
+          </a:xfrm>
+          <a:prstGeom prst="rect">
+            <a:avLst/>
+          </a:prstGeom>
+        </p:spPr>
+      </p:pic>
+      <p:pic>
+        <p:nvPicPr>
+          <p:cNvPr id="6" name="Picture 5" descr="Chart, bar chart, funnel chart&#10;&#10;Description automatically generated">
+            <a:extLst>
+              <a:ext uri="{FF2B5EF4-FFF2-40B4-BE49-F238E27FC236}">
+                <a16:creationId xmlns:a16="http://schemas.microsoft.com/office/drawing/2014/main" id="{B4A25EE4-8DD6-8249-A197-CEFA79DDB8BA}"/>
+              </a:ext>
+            </a:extLst>
+          </p:cNvPr>
+          <p:cNvPicPr>
+            <a:picLocks noChangeAspect="1"/>
+          </p:cNvPicPr>
+          <p:nvPr/>
+        </p:nvPicPr>
+        <p:blipFill>
+          <a:blip r:embed="rId3"/>
+          <a:stretch>
+            <a:fillRect/>
+          </a:stretch>
+        </p:blipFill>
+        <p:spPr>
+          <a:xfrm>
+            <a:off x="7854696" y="3256691"/>
+            <a:ext cx="3584448" cy="2338851"/>
+          </a:xfrm>
+          <a:prstGeom prst="rect">
+            <a:avLst/>
+          </a:prstGeom>
+        </p:spPr>
+      </p:pic>
+      <p:pic>
+        <p:nvPicPr>
+          <p:cNvPr id="10" name="Picture 9" descr="Table&#10;&#10;Description automatically generated">
+            <a:extLst>
+              <a:ext uri="{FF2B5EF4-FFF2-40B4-BE49-F238E27FC236}">
+                <a16:creationId xmlns:a16="http://schemas.microsoft.com/office/drawing/2014/main" id="{F3184727-AB69-D34B-BC35-38E2116008D4}"/>
+              </a:ext>
+            </a:extLst>
+          </p:cNvPr>
+          <p:cNvPicPr>
+            <a:picLocks noChangeAspect="1"/>
+          </p:cNvPicPr>
+          <p:nvPr/>
+        </p:nvPicPr>
+        <p:blipFill>
+          <a:blip r:embed="rId4"/>
+          <a:stretch>
+            <a:fillRect/>
+          </a:stretch>
+        </p:blipFill>
+        <p:spPr>
+          <a:xfrm>
+            <a:off x="4142232" y="3883969"/>
+            <a:ext cx="3584448" cy="1084294"/>
+          </a:xfrm>
+          <a:prstGeom prst="rect">
+            <a:avLst/>
+          </a:prstGeom>
+        </p:spPr>
+      </p:pic>
+    </p:spTree>
+    <p:extLst>
+      <p:ext uri="{BB962C8B-B14F-4D97-AF65-F5344CB8AC3E}">
+        <p14:creationId xmlns:p14="http://schemas.microsoft.com/office/powerpoint/2010/main" val="2997189024"/>
+      </p:ext>
+    </p:extLst>
+  </p:cSld>
+  <p:clrMapOvr>
+    <a:masterClrMapping/>
+  </p:clrMapOvr>
+</p:sld>
+</file>
+
+<file path=ppt/slides/slide12.xml><?xml version="1.0" encoding="utf-8"?>
+<p:sld xmlns:a="http://schemas.openxmlformats.org/drawingml/2006/main" xmlns:r="http://schemas.openxmlformats.org/officeDocument/2006/relationships" xmlns:p="http://schemas.openxmlformats.org/presentationml/2006/main">
+  <p:cSld>
+    <p:bg>
+      <p:bgPr>
+        <a:solidFill>
+          <a:schemeClr val="bg1"/>
+        </a:solidFill>
+        <a:effectLst/>
+      </p:bgPr>
+    </p:bg>
+    <p:spTree>
+      <p:nvGrpSpPr>
+        <p:cNvPr id="1" name=""/>
+        <p:cNvGrpSpPr/>
+        <p:nvPr/>
+      </p:nvGrpSpPr>
+      <p:grpSpPr>
+        <a:xfrm>
+          <a:off x="0" y="0"/>
+          <a:ext cx="0" cy="0"/>
+          <a:chOff x="0" y="0"/>
+          <a:chExt cx="0" cy="0"/>
+        </a:xfrm>
+      </p:grpSpPr>
+      <p:sp useBgFill="1">
+        <p:nvSpPr>
+          <p:cNvPr id="14" name="Rectangle 13">
+            <a:extLst>
+              <a:ext uri="{FF2B5EF4-FFF2-40B4-BE49-F238E27FC236}">
+                <a16:creationId xmlns:a16="http://schemas.microsoft.com/office/drawing/2014/main" id="{0550F5B9-399F-4FAD-AE6C-ED65F9A43A74}"/>
+              </a:ext>
+              <a:ext uri="{C183D7F6-B498-43B3-948B-1728B52AA6E4}">
+                <adec:decorative xmlns:adec="http://schemas.microsoft.com/office/drawing/2017/decorative" val="1"/>
+              </a:ext>
+            </a:extLst>
+          </p:cNvPr>
+          <p:cNvSpPr>
+            <a:spLocks noGrp="1" noRot="1" noChangeAspect="1" noMove="1" noResize="1" noEditPoints="1" noAdjustHandles="1" noChangeArrowheads="1" noChangeShapeType="1" noTextEdit="1"/>
+          </p:cNvSpPr>
+          <p:nvPr>
+            <p:extLst>
+              <p:ext uri="{386F3935-93C4-4BCD-93E2-E3B085C9AB24}">
+                <p16:designElem xmlns:p16="http://schemas.microsoft.com/office/powerpoint/2015/main" val="1"/>
+              </p:ext>
+            </p:extLst>
+          </p:nvPr>
+        </p:nvSpPr>
+        <p:spPr>
+          <a:xfrm>
+            <a:off x="0" y="0"/>
+            <a:ext cx="12192000" cy="6858000"/>
+          </a:xfrm>
+          <a:prstGeom prst="rect">
+            <a:avLst/>
+          </a:prstGeom>
+          <a:ln>
+            <a:noFill/>
+          </a:ln>
+        </p:spPr>
+        <p:style>
+          <a:lnRef idx="2">
+            <a:schemeClr val="accent1">
+              <a:shade val="50000"/>
+            </a:schemeClr>
+          </a:lnRef>
+          <a:fillRef idx="1">
+            <a:schemeClr val="accent1"/>
+          </a:fillRef>
+          <a:effectRef idx="0">
+            <a:schemeClr val="accent1"/>
+          </a:effectRef>
+          <a:fontRef idx="minor">
+            <a:schemeClr val="lt1"/>
+          </a:fontRef>
+        </p:style>
+        <p:txBody>
+          <a:bodyPr rtlCol="0" anchor="ctr"/>
+          <a:lstStyle/>
+          <a:p>
+            <a:pPr algn="ctr"/>
+            <a:endParaRPr lang="en-US"/>
+          </a:p>
+        </p:txBody>
+      </p:sp>
+      <p:sp useBgFill="1">
+        <p:nvSpPr>
+          <p:cNvPr id="16" name="Rectangle 15">
+            <a:extLst>
+              <a:ext uri="{FF2B5EF4-FFF2-40B4-BE49-F238E27FC236}">
+                <a16:creationId xmlns:a16="http://schemas.microsoft.com/office/drawing/2014/main" id="{C062E60F-5CD4-4268-8359-8076634680E5}"/>
+              </a:ext>
+              <a:ext uri="{C183D7F6-B498-43B3-948B-1728B52AA6E4}">
+                <adec:decorative xmlns:adec="http://schemas.microsoft.com/office/drawing/2017/decorative" val="1"/>
+              </a:ext>
+            </a:extLst>
+          </p:cNvPr>
+          <p:cNvSpPr>
+            <a:spLocks noGrp="1" noRot="1" noChangeAspect="1" noMove="1" noResize="1" noEditPoints="1" noAdjustHandles="1" noChangeArrowheads="1" noChangeShapeType="1" noTextEdit="1"/>
+          </p:cNvSpPr>
+          <p:nvPr>
+            <p:extLst>
+              <p:ext uri="{386F3935-93C4-4BCD-93E2-E3B085C9AB24}">
+                <p16:designElem xmlns:p16="http://schemas.microsoft.com/office/powerpoint/2015/main" val="1"/>
+              </p:ext>
+            </p:extLst>
+          </p:nvPr>
+        </p:nvSpPr>
+        <p:spPr>
+          <a:xfrm>
+            <a:off x="554416" y="288350"/>
+            <a:ext cx="11167447" cy="2089317"/>
+          </a:xfrm>
+          <a:prstGeom prst="rect">
+            <a:avLst/>
+          </a:prstGeom>
+          <a:ln w="12700">
+            <a:solidFill>
+              <a:srgbClr val="DEDEDE"/>
+            </a:solidFill>
+          </a:ln>
+          <a:effectLst>
+            <a:outerShdw blurRad="50800" dist="38100" dir="2700000" algn="tl" rotWithShape="0">
+              <a:schemeClr val="bg2">
+                <a:lumMod val="85000"/>
+                <a:alpha val="50000"/>
+              </a:schemeClr>
+            </a:outerShdw>
+          </a:effectLst>
+        </p:spPr>
+        <p:style>
+          <a:lnRef idx="2">
+            <a:schemeClr val="accent1">
+              <a:shade val="50000"/>
+            </a:schemeClr>
+          </a:lnRef>
+          <a:fillRef idx="1">
+            <a:schemeClr val="accent1"/>
+          </a:fillRef>
+          <a:effectRef idx="0">
+            <a:schemeClr val="accent1"/>
+          </a:effectRef>
+          <a:fontRef idx="minor">
+            <a:schemeClr val="lt1"/>
+          </a:fontRef>
+        </p:style>
+        <p:txBody>
+          <a:bodyPr rtlCol="0" anchor="ctr"/>
+          <a:lstStyle/>
+          <a:p>
+            <a:pPr marL="0" marR="0" lvl="0" indent="0" algn="ctr" defTabSz="914400" rtl="0" eaLnBrk="1" fontAlgn="auto" latinLnBrk="0" hangingPunct="1">
+              <a:lnSpc>
+                <a:spcPct val="100000"/>
+              </a:lnSpc>
+              <a:spcBef>
+                <a:spcPts val="0"/>
+              </a:spcBef>
+              <a:spcAft>
+                <a:spcPts val="0"/>
+              </a:spcAft>
+              <a:buClrTx/>
+              <a:buSzTx/>
+              <a:buFontTx/>
+              <a:buNone/>
+              <a:tabLst/>
+              <a:defRPr/>
+            </a:pPr>
+            <a:endParaRPr kumimoji="0" lang="en-US" sz="1800" b="0" i="0" u="none" strike="noStrike" kern="1200" cap="none" spc="0" normalizeH="0" baseline="0" noProof="0">
+              <a:ln>
+                <a:noFill/>
+              </a:ln>
+              <a:solidFill>
+                <a:prstClr val="white"/>
+              </a:solidFill>
+              <a:effectLst/>
+              <a:uLnTx/>
+              <a:uFillTx/>
+              <a:latin typeface="Calibri" panose="020F0502020204030204"/>
+              <a:ea typeface="+mn-ea"/>
+              <a:cs typeface="+mn-cs"/>
+            </a:endParaRPr>
+          </a:p>
+        </p:txBody>
+      </p:sp>
+      <p:sp>
+        <p:nvSpPr>
+          <p:cNvPr id="2" name="Title 1">
+            <a:extLst>
+              <a:ext uri="{FF2B5EF4-FFF2-40B4-BE49-F238E27FC236}">
+                <a16:creationId xmlns:a16="http://schemas.microsoft.com/office/drawing/2014/main" id="{6235F2AE-5BA0-544E-A4B2-80BCD39247E3}"/>
+              </a:ext>
+            </a:extLst>
+          </p:cNvPr>
+          <p:cNvSpPr>
+            <a:spLocks noGrp="1"/>
+          </p:cNvSpPr>
+          <p:nvPr>
+            <p:ph type="title"/>
+          </p:nvPr>
+        </p:nvSpPr>
+        <p:spPr>
+          <a:xfrm>
+            <a:off x="841248" y="510047"/>
+            <a:ext cx="3300984" cy="1645920"/>
+          </a:xfrm>
+        </p:spPr>
+        <p:txBody>
+          <a:bodyPr>
+            <a:normAutofit/>
+          </a:bodyPr>
+          <a:lstStyle/>
+          <a:p>
+            <a:r>
+              <a:rPr lang="en-US" sz="2800"/>
+              <a:t>Ada Boosted Decision Tree: Results</a:t>
+            </a:r>
+          </a:p>
+        </p:txBody>
+      </p:sp>
+      <p:sp>
+        <p:nvSpPr>
+          <p:cNvPr id="18" name="Rectangle 17">
+            <a:extLst>
+              <a:ext uri="{FF2B5EF4-FFF2-40B4-BE49-F238E27FC236}">
+                <a16:creationId xmlns:a16="http://schemas.microsoft.com/office/drawing/2014/main" id="{BB341EC3-1810-4D33-BA3F-E2D0AA0ECFB6}"/>
+              </a:ext>
+              <a:ext uri="{C183D7F6-B498-43B3-948B-1728B52AA6E4}">
+                <adec:decorative xmlns:adec="http://schemas.microsoft.com/office/drawing/2017/decorative" val="1"/>
+              </a:ext>
+            </a:extLst>
+          </p:cNvPr>
+          <p:cNvSpPr>
+            <a:spLocks noGrp="1" noRot="1" noChangeAspect="1" noMove="1" noResize="1" noEditPoints="1" noAdjustHandles="1" noChangeArrowheads="1" noChangeShapeType="1" noTextEdit="1"/>
+          </p:cNvSpPr>
+          <p:nvPr>
+            <p:extLst>
+              <p:ext uri="{386F3935-93C4-4BCD-93E2-E3B085C9AB24}">
+                <p16:designElem xmlns:p16="http://schemas.microsoft.com/office/powerpoint/2015/main" val="1"/>
+              </p:ext>
+            </p:extLst>
+          </p:nvPr>
+        </p:nvSpPr>
+        <p:spPr>
+          <a:xfrm>
+            <a:off x="490408" y="980964"/>
+            <a:ext cx="128016" cy="704088"/>
+          </a:xfrm>
+          <a:prstGeom prst="rect">
+            <a:avLst/>
+          </a:prstGeom>
+          <a:solidFill>
+            <a:schemeClr val="accent2"/>
+          </a:solidFill>
+          <a:ln>
+            <a:noFill/>
+          </a:ln>
+        </p:spPr>
+        <p:style>
+          <a:lnRef idx="2">
+            <a:schemeClr val="accent1">
+              <a:shade val="50000"/>
+            </a:schemeClr>
+          </a:lnRef>
+          <a:fillRef idx="1">
+            <a:schemeClr val="accent1"/>
+          </a:fillRef>
+          <a:effectRef idx="0">
+            <a:schemeClr val="accent1"/>
+          </a:effectRef>
+          <a:fontRef idx="minor">
+            <a:schemeClr val="lt1"/>
+          </a:fontRef>
+        </p:style>
+        <p:txBody>
+          <a:bodyPr rtlCol="0" anchor="ctr"/>
+          <a:lstStyle/>
+          <a:p>
+            <a:pPr marL="0" marR="0" lvl="0" indent="0" algn="ctr" defTabSz="914400" rtl="0" eaLnBrk="1" fontAlgn="auto" latinLnBrk="0" hangingPunct="1">
+              <a:lnSpc>
+                <a:spcPct val="100000"/>
+              </a:lnSpc>
+              <a:spcBef>
+                <a:spcPts val="0"/>
+              </a:spcBef>
+              <a:spcAft>
+                <a:spcPts val="0"/>
+              </a:spcAft>
+              <a:buClrTx/>
+              <a:buSzTx/>
+              <a:buFontTx/>
+              <a:buNone/>
+              <a:tabLst/>
+              <a:defRPr/>
+            </a:pPr>
+            <a:endParaRPr kumimoji="0" lang="en-US" sz="1800" b="0" i="0" u="none" strike="noStrike" kern="1200" cap="none" spc="0" normalizeH="0" baseline="0" noProof="0" dirty="0">
+              <a:ln>
+                <a:noFill/>
+              </a:ln>
+              <a:solidFill>
+                <a:prstClr val="white"/>
+              </a:solidFill>
+              <a:effectLst/>
+              <a:uLnTx/>
+              <a:uFillTx/>
+              <a:latin typeface="Calibri" panose="020F0502020204030204"/>
+              <a:ea typeface="+mn-ea"/>
+              <a:cs typeface="+mn-cs"/>
+            </a:endParaRPr>
+          </a:p>
+        </p:txBody>
+      </p:sp>
+      <p:sp>
+        <p:nvSpPr>
+          <p:cNvPr id="20" name="Rectangle 19">
+            <a:extLst>
+              <a:ext uri="{FF2B5EF4-FFF2-40B4-BE49-F238E27FC236}">
+                <a16:creationId xmlns:a16="http://schemas.microsoft.com/office/drawing/2014/main" id="{10127CDE-2B99-47A8-BB3C-7D17519105E0}"/>
+              </a:ext>
+              <a:ext uri="{C183D7F6-B498-43B3-948B-1728B52AA6E4}">
+                <adec:decorative xmlns:adec="http://schemas.microsoft.com/office/drawing/2017/decorative" val="1"/>
+              </a:ext>
+            </a:extLst>
+          </p:cNvPr>
+          <p:cNvSpPr>
+            <a:spLocks noGrp="1" noRot="1" noChangeAspect="1" noMove="1" noResize="1" noEditPoints="1" noAdjustHandles="1" noChangeArrowheads="1" noChangeShapeType="1" noTextEdit="1"/>
+          </p:cNvSpPr>
+          <p:nvPr>
+            <p:extLst>
+              <p:ext uri="{386F3935-93C4-4BCD-93E2-E3B085C9AB24}">
+                <p16:designElem xmlns:p16="http://schemas.microsoft.com/office/powerpoint/2015/main" val="1"/>
+              </p:ext>
+            </p:extLst>
+          </p:nvPr>
+        </p:nvSpPr>
+        <p:spPr>
+          <a:xfrm rot="5400000">
+            <a:off x="3610864" y="1323863"/>
+            <a:ext cx="1463040" cy="18288"/>
+          </a:xfrm>
+          <a:prstGeom prst="rect">
+            <a:avLst/>
+          </a:prstGeom>
+          <a:solidFill>
+            <a:srgbClr val="D5D5D5"/>
+          </a:solidFill>
+          <a:ln w="3175">
+            <a:noFill/>
+          </a:ln>
+          <a:effectLst/>
+        </p:spPr>
+        <p:style>
+          <a:lnRef idx="2">
+            <a:schemeClr val="accent1">
+              <a:shade val="50000"/>
+            </a:schemeClr>
+          </a:lnRef>
+          <a:fillRef idx="1">
+            <a:schemeClr val="accent1"/>
+          </a:fillRef>
+          <a:effectRef idx="0">
+            <a:schemeClr val="accent1"/>
+          </a:effectRef>
+          <a:fontRef idx="minor">
+            <a:schemeClr val="lt1"/>
+          </a:fontRef>
+        </p:style>
+        <p:txBody>
+          <a:bodyPr rtlCol="0" anchor="ctr"/>
+          <a:lstStyle/>
+          <a:p>
+            <a:pPr marL="0" marR="0" lvl="0" indent="0" algn="ctr" defTabSz="914400" rtl="0" eaLnBrk="1" fontAlgn="auto" latinLnBrk="0" hangingPunct="1">
+              <a:lnSpc>
+                <a:spcPct val="100000"/>
+              </a:lnSpc>
+              <a:spcBef>
+                <a:spcPts val="0"/>
+              </a:spcBef>
+              <a:spcAft>
+                <a:spcPts val="0"/>
+              </a:spcAft>
+              <a:buClrTx/>
+              <a:buSzTx/>
+              <a:buFontTx/>
+              <a:buNone/>
+              <a:tabLst/>
+              <a:defRPr/>
+            </a:pPr>
+            <a:endParaRPr kumimoji="0" lang="en-US" sz="1800" b="0" i="0" u="none" strike="noStrike" kern="1200" cap="none" spc="0" normalizeH="0" baseline="0" noProof="0">
+              <a:ln>
+                <a:noFill/>
+              </a:ln>
+              <a:solidFill>
+                <a:prstClr val="white"/>
+              </a:solidFill>
+              <a:effectLst/>
+              <a:uLnTx/>
+              <a:uFillTx/>
+              <a:latin typeface="Calibri" panose="020F0502020204030204"/>
+              <a:ea typeface="+mn-ea"/>
+              <a:cs typeface="+mn-cs"/>
+            </a:endParaRPr>
+          </a:p>
+        </p:txBody>
+      </p:sp>
+      <p:sp>
+        <p:nvSpPr>
+          <p:cNvPr id="3" name="Content Placeholder 2">
+            <a:extLst>
+              <a:ext uri="{FF2B5EF4-FFF2-40B4-BE49-F238E27FC236}">
+                <a16:creationId xmlns:a16="http://schemas.microsoft.com/office/drawing/2014/main" id="{3D540BE5-DFB7-6E42-8989-D58AC406291F}"/>
+              </a:ext>
+            </a:extLst>
+          </p:cNvPr>
+          <p:cNvSpPr>
+            <a:spLocks noGrp="1"/>
+          </p:cNvSpPr>
+          <p:nvPr>
+            <p:ph idx="1"/>
+          </p:nvPr>
+        </p:nvSpPr>
+        <p:spPr>
+          <a:xfrm>
+            <a:off x="4581144" y="510047"/>
+            <a:ext cx="6858000" cy="1645920"/>
+          </a:xfrm>
+        </p:spPr>
+        <p:txBody>
+          <a:bodyPr anchor="ctr">
+            <a:normAutofit/>
+          </a:bodyPr>
+          <a:lstStyle/>
+          <a:p>
+            <a:pPr marL="0" indent="0">
+              <a:buNone/>
+            </a:pPr>
+            <a:r>
+              <a:rPr lang="en-US" sz="1500" dirty="0"/>
+              <a:t>ROCAUC score: 0.692 </a:t>
+            </a:r>
+          </a:p>
+          <a:p>
+            <a:pPr marL="0" indent="0">
+              <a:buNone/>
+            </a:pPr>
+            <a:r>
+              <a:rPr lang="en-US" sz="1500" dirty="0"/>
+              <a:t>Accuracy score: 0.747 </a:t>
+            </a:r>
+          </a:p>
+          <a:p>
+            <a:pPr marL="0" indent="0">
+              <a:buNone/>
+            </a:pPr>
+            <a:r>
+              <a:rPr lang="en-US" sz="1500" dirty="0"/>
+              <a:t>F1 score: 0.578 </a:t>
+            </a:r>
+          </a:p>
+          <a:p>
+            <a:pPr marL="0" indent="0">
+              <a:buNone/>
+            </a:pPr>
+            <a:r>
+              <a:rPr lang="en-US" sz="1500" dirty="0"/>
+              <a:t>train accuracy: 1.000 </a:t>
+            </a:r>
+          </a:p>
+          <a:p>
+            <a:pPr marL="0" indent="0">
+              <a:buNone/>
+            </a:pPr>
+            <a:r>
+              <a:rPr lang="en-US" sz="1500" dirty="0"/>
+              <a:t>test accuracy: 0.747</a:t>
+            </a:r>
+          </a:p>
+        </p:txBody>
+      </p:sp>
+      <p:pic>
+        <p:nvPicPr>
+          <p:cNvPr id="7" name="Picture 6" descr="Chart, treemap chart&#10;&#10;Description automatically generated">
+            <a:extLst>
+              <a:ext uri="{FF2B5EF4-FFF2-40B4-BE49-F238E27FC236}">
+                <a16:creationId xmlns:a16="http://schemas.microsoft.com/office/drawing/2014/main" id="{BC0B579D-F67D-754C-874F-CE28FE93E828}"/>
+              </a:ext>
+            </a:extLst>
+          </p:cNvPr>
+          <p:cNvPicPr>
+            <a:picLocks noChangeAspect="1"/>
+          </p:cNvPicPr>
+          <p:nvPr/>
+        </p:nvPicPr>
+        <p:blipFill>
+          <a:blip r:embed="rId2"/>
+          <a:stretch>
+            <a:fillRect/>
+          </a:stretch>
+        </p:blipFill>
+        <p:spPr>
+          <a:xfrm>
+            <a:off x="557784" y="2934092"/>
+            <a:ext cx="3584448" cy="2984052"/>
+          </a:xfrm>
+          <a:prstGeom prst="rect">
+            <a:avLst/>
+          </a:prstGeom>
+        </p:spPr>
+      </p:pic>
+      <p:pic>
+        <p:nvPicPr>
+          <p:cNvPr id="9" name="Picture 8" descr="Chart, bar chart&#10;&#10;Description automatically generated">
+            <a:extLst>
+              <a:ext uri="{FF2B5EF4-FFF2-40B4-BE49-F238E27FC236}">
+                <a16:creationId xmlns:a16="http://schemas.microsoft.com/office/drawing/2014/main" id="{DCA3A7C3-B57F-FA45-B9F4-BD2F66A3F40A}"/>
+              </a:ext>
+            </a:extLst>
+          </p:cNvPr>
+          <p:cNvPicPr>
+            <a:picLocks noChangeAspect="1"/>
+          </p:cNvPicPr>
+          <p:nvPr/>
+        </p:nvPicPr>
+        <p:blipFill>
+          <a:blip r:embed="rId3"/>
+          <a:stretch>
+            <a:fillRect/>
+          </a:stretch>
+        </p:blipFill>
+        <p:spPr>
+          <a:xfrm>
+            <a:off x="8137415" y="3288055"/>
+            <a:ext cx="3584448" cy="2276124"/>
+          </a:xfrm>
+          <a:prstGeom prst="rect">
+            <a:avLst/>
+          </a:prstGeom>
+        </p:spPr>
+      </p:pic>
+      <p:pic>
+        <p:nvPicPr>
+          <p:cNvPr id="5" name="Picture 4" descr="Table&#10;&#10;Description automatically generated">
+            <a:extLst>
+              <a:ext uri="{FF2B5EF4-FFF2-40B4-BE49-F238E27FC236}">
+                <a16:creationId xmlns:a16="http://schemas.microsoft.com/office/drawing/2014/main" id="{C3700A68-E062-D546-ADA0-E4832A9E4761}"/>
+              </a:ext>
+            </a:extLst>
+          </p:cNvPr>
+          <p:cNvPicPr>
+            <a:picLocks noChangeAspect="1"/>
+          </p:cNvPicPr>
+          <p:nvPr/>
+        </p:nvPicPr>
+        <p:blipFill>
+          <a:blip r:embed="rId4"/>
+          <a:stretch>
+            <a:fillRect/>
+          </a:stretch>
+        </p:blipFill>
+        <p:spPr>
+          <a:xfrm>
+            <a:off x="4465322" y="3875008"/>
+            <a:ext cx="3584448" cy="1102217"/>
+          </a:xfrm>
+          <a:prstGeom prst="rect">
+            <a:avLst/>
+          </a:prstGeom>
+        </p:spPr>
+      </p:pic>
+    </p:spTree>
+    <p:extLst>
+      <p:ext uri="{BB962C8B-B14F-4D97-AF65-F5344CB8AC3E}">
+        <p14:creationId xmlns:p14="http://schemas.microsoft.com/office/powerpoint/2010/main" val="3021456042"/>
+      </p:ext>
+    </p:extLst>
+  </p:cSld>
+  <p:clrMapOvr>
+    <a:masterClrMapping/>
+  </p:clrMapOvr>
+</p:sld>
+</file>
+
+<file path=ppt/slides/slide13.xml><?xml version="1.0" encoding="utf-8"?>
+<p:sld xmlns:a="http://schemas.openxmlformats.org/drawingml/2006/main" xmlns:r="http://schemas.openxmlformats.org/officeDocument/2006/relationships" xmlns:p="http://schemas.openxmlformats.org/presentationml/2006/main">
+  <p:cSld>
+    <p:bg>
+      <p:bgPr>
+        <a:solidFill>
+          <a:schemeClr val="bg1"/>
+        </a:solidFill>
+        <a:effectLst/>
+      </p:bgPr>
+    </p:bg>
+    <p:spTree>
+      <p:nvGrpSpPr>
+        <p:cNvPr id="1" name=""/>
+        <p:cNvGrpSpPr/>
+        <p:nvPr/>
+      </p:nvGrpSpPr>
+      <p:grpSpPr>
+        <a:xfrm>
+          <a:off x="0" y="0"/>
+          <a:ext cx="0" cy="0"/>
+          <a:chOff x="0" y="0"/>
+          <a:chExt cx="0" cy="0"/>
+        </a:xfrm>
+      </p:grpSpPr>
+      <p:sp useBgFill="1">
+        <p:nvSpPr>
+          <p:cNvPr id="14" name="Rectangle 13">
+            <a:extLst>
+              <a:ext uri="{FF2B5EF4-FFF2-40B4-BE49-F238E27FC236}">
+                <a16:creationId xmlns:a16="http://schemas.microsoft.com/office/drawing/2014/main" id="{0550F5B9-399F-4FAD-AE6C-ED65F9A43A74}"/>
+              </a:ext>
+              <a:ext uri="{C183D7F6-B498-43B3-948B-1728B52AA6E4}">
+                <adec:decorative xmlns:adec="http://schemas.microsoft.com/office/drawing/2017/decorative" val="1"/>
+              </a:ext>
+            </a:extLst>
+          </p:cNvPr>
+          <p:cNvSpPr>
+            <a:spLocks noGrp="1" noRot="1" noChangeAspect="1" noMove="1" noResize="1" noEditPoints="1" noAdjustHandles="1" noChangeArrowheads="1" noChangeShapeType="1" noTextEdit="1"/>
+          </p:cNvSpPr>
+          <p:nvPr>
+            <p:extLst>
+              <p:ext uri="{386F3935-93C4-4BCD-93E2-E3B085C9AB24}">
+                <p16:designElem xmlns:p16="http://schemas.microsoft.com/office/powerpoint/2015/main" val="1"/>
+              </p:ext>
+            </p:extLst>
+          </p:nvPr>
+        </p:nvSpPr>
+        <p:spPr>
+          <a:xfrm>
+            <a:off x="0" y="0"/>
+            <a:ext cx="12192000" cy="6858000"/>
+          </a:xfrm>
+          <a:prstGeom prst="rect">
+            <a:avLst/>
+          </a:prstGeom>
+          <a:ln>
+            <a:noFill/>
+          </a:ln>
+        </p:spPr>
+        <p:style>
+          <a:lnRef idx="2">
+            <a:schemeClr val="accent1">
+              <a:shade val="50000"/>
+            </a:schemeClr>
+          </a:lnRef>
+          <a:fillRef idx="1">
+            <a:schemeClr val="accent1"/>
+          </a:fillRef>
+          <a:effectRef idx="0">
+            <a:schemeClr val="accent1"/>
+          </a:effectRef>
+          <a:fontRef idx="minor">
+            <a:schemeClr val="lt1"/>
+          </a:fontRef>
+        </p:style>
+        <p:txBody>
+          <a:bodyPr rtlCol="0" anchor="ctr"/>
+          <a:lstStyle/>
+          <a:p>
+            <a:pPr algn="ctr"/>
+            <a:endParaRPr lang="en-US"/>
+          </a:p>
+        </p:txBody>
+      </p:sp>
+      <p:sp useBgFill="1">
+        <p:nvSpPr>
+          <p:cNvPr id="16" name="Rectangle 15">
+            <a:extLst>
+              <a:ext uri="{FF2B5EF4-FFF2-40B4-BE49-F238E27FC236}">
+                <a16:creationId xmlns:a16="http://schemas.microsoft.com/office/drawing/2014/main" id="{C062E60F-5CD4-4268-8359-8076634680E5}"/>
+              </a:ext>
+              <a:ext uri="{C183D7F6-B498-43B3-948B-1728B52AA6E4}">
+                <adec:decorative xmlns:adec="http://schemas.microsoft.com/office/drawing/2017/decorative" val="1"/>
+              </a:ext>
+            </a:extLst>
+          </p:cNvPr>
+          <p:cNvSpPr>
+            <a:spLocks noGrp="1" noRot="1" noChangeAspect="1" noMove="1" noResize="1" noEditPoints="1" noAdjustHandles="1" noChangeArrowheads="1" noChangeShapeType="1" noTextEdit="1"/>
+          </p:cNvSpPr>
+          <p:nvPr>
+            <p:extLst>
+              <p:ext uri="{386F3935-93C4-4BCD-93E2-E3B085C9AB24}">
+                <p16:designElem xmlns:p16="http://schemas.microsoft.com/office/powerpoint/2015/main" val="1"/>
+              </p:ext>
+            </p:extLst>
+          </p:nvPr>
+        </p:nvSpPr>
+        <p:spPr>
+          <a:xfrm>
+            <a:off x="554416" y="288350"/>
+            <a:ext cx="11167447" cy="2089317"/>
+          </a:xfrm>
+          <a:prstGeom prst="rect">
+            <a:avLst/>
+          </a:prstGeom>
+          <a:ln w="12700">
+            <a:solidFill>
+              <a:srgbClr val="DEDEDE"/>
+            </a:solidFill>
+          </a:ln>
+          <a:effectLst>
+            <a:outerShdw blurRad="50800" dist="38100" dir="2700000" algn="tl" rotWithShape="0">
+              <a:schemeClr val="bg2">
+                <a:lumMod val="85000"/>
+                <a:alpha val="50000"/>
+              </a:schemeClr>
+            </a:outerShdw>
+          </a:effectLst>
+        </p:spPr>
+        <p:style>
+          <a:lnRef idx="2">
+            <a:schemeClr val="accent1">
+              <a:shade val="50000"/>
+            </a:schemeClr>
+          </a:lnRef>
+          <a:fillRef idx="1">
+            <a:schemeClr val="accent1"/>
+          </a:fillRef>
+          <a:effectRef idx="0">
+            <a:schemeClr val="accent1"/>
+          </a:effectRef>
+          <a:fontRef idx="minor">
+            <a:schemeClr val="lt1"/>
+          </a:fontRef>
+        </p:style>
+        <p:txBody>
+          <a:bodyPr rtlCol="0" anchor="ctr"/>
+          <a:lstStyle/>
+          <a:p>
+            <a:pPr marL="0" marR="0" lvl="0" indent="0" algn="ctr" defTabSz="914400" rtl="0" eaLnBrk="1" fontAlgn="auto" latinLnBrk="0" hangingPunct="1">
+              <a:lnSpc>
+                <a:spcPct val="100000"/>
+              </a:lnSpc>
+              <a:spcBef>
+                <a:spcPts val="0"/>
+              </a:spcBef>
+              <a:spcAft>
+                <a:spcPts val="0"/>
+              </a:spcAft>
+              <a:buClrTx/>
+              <a:buSzTx/>
+              <a:buFontTx/>
+              <a:buNone/>
+              <a:tabLst/>
+              <a:defRPr/>
+            </a:pPr>
+            <a:endParaRPr kumimoji="0" lang="en-US" sz="1800" b="0" i="0" u="none" strike="noStrike" kern="1200" cap="none" spc="0" normalizeH="0" baseline="0" noProof="0">
+              <a:ln>
+                <a:noFill/>
+              </a:ln>
+              <a:solidFill>
+                <a:prstClr val="white"/>
+              </a:solidFill>
+              <a:effectLst/>
+              <a:uLnTx/>
+              <a:uFillTx/>
+              <a:latin typeface="Calibri" panose="020F0502020204030204"/>
+              <a:ea typeface="+mn-ea"/>
+              <a:cs typeface="+mn-cs"/>
+            </a:endParaRPr>
+          </a:p>
+        </p:txBody>
+      </p:sp>
+      <p:sp>
+        <p:nvSpPr>
+          <p:cNvPr id="2" name="Title 1">
+            <a:extLst>
+              <a:ext uri="{FF2B5EF4-FFF2-40B4-BE49-F238E27FC236}">
+                <a16:creationId xmlns:a16="http://schemas.microsoft.com/office/drawing/2014/main" id="{CF8425C3-3139-574A-A306-6FBA5F6A5005}"/>
+              </a:ext>
+            </a:extLst>
+          </p:cNvPr>
+          <p:cNvSpPr>
+            <a:spLocks noGrp="1"/>
+          </p:cNvSpPr>
+          <p:nvPr>
+            <p:ph type="title"/>
+          </p:nvPr>
+        </p:nvSpPr>
+        <p:spPr>
+          <a:xfrm>
+            <a:off x="841248" y="510047"/>
+            <a:ext cx="3300984" cy="1645920"/>
+          </a:xfrm>
+        </p:spPr>
+        <p:txBody>
+          <a:bodyPr>
+            <a:normAutofit/>
+          </a:bodyPr>
+          <a:lstStyle/>
+          <a:p>
+            <a:r>
+              <a:rPr lang="en-US" sz="2800" dirty="0"/>
+              <a:t>Ada Boosted Random Forest: Results</a:t>
+            </a:r>
+            <a:br>
+              <a:rPr lang="en-US" sz="2800" dirty="0"/>
+            </a:br>
+            <a:r>
+              <a:rPr lang="en-US" sz="2800" dirty="0"/>
+              <a:t>Without Feature Selection</a:t>
+            </a:r>
+          </a:p>
+        </p:txBody>
+      </p:sp>
+      <p:sp>
+        <p:nvSpPr>
+          <p:cNvPr id="18" name="Rectangle 17">
+            <a:extLst>
+              <a:ext uri="{FF2B5EF4-FFF2-40B4-BE49-F238E27FC236}">
+                <a16:creationId xmlns:a16="http://schemas.microsoft.com/office/drawing/2014/main" id="{BB341EC3-1810-4D33-BA3F-E2D0AA0ECFB6}"/>
+              </a:ext>
+              <a:ext uri="{C183D7F6-B498-43B3-948B-1728B52AA6E4}">
+                <adec:decorative xmlns:adec="http://schemas.microsoft.com/office/drawing/2017/decorative" val="1"/>
+              </a:ext>
+            </a:extLst>
+          </p:cNvPr>
+          <p:cNvSpPr>
+            <a:spLocks noGrp="1" noRot="1" noChangeAspect="1" noMove="1" noResize="1" noEditPoints="1" noAdjustHandles="1" noChangeArrowheads="1" noChangeShapeType="1" noTextEdit="1"/>
+          </p:cNvSpPr>
+          <p:nvPr>
+            <p:extLst>
+              <p:ext uri="{386F3935-93C4-4BCD-93E2-E3B085C9AB24}">
+                <p16:designElem xmlns:p16="http://schemas.microsoft.com/office/powerpoint/2015/main" val="1"/>
+              </p:ext>
+            </p:extLst>
+          </p:nvPr>
+        </p:nvSpPr>
+        <p:spPr>
+          <a:xfrm>
+            <a:off x="490408" y="980964"/>
+            <a:ext cx="128016" cy="704088"/>
+          </a:xfrm>
+          <a:prstGeom prst="rect">
+            <a:avLst/>
+          </a:prstGeom>
+          <a:solidFill>
+            <a:schemeClr val="accent2"/>
+          </a:solidFill>
+          <a:ln>
+            <a:noFill/>
+          </a:ln>
+        </p:spPr>
+        <p:style>
+          <a:lnRef idx="2">
+            <a:schemeClr val="accent1">
+              <a:shade val="50000"/>
+            </a:schemeClr>
+          </a:lnRef>
+          <a:fillRef idx="1">
+            <a:schemeClr val="accent1"/>
+          </a:fillRef>
+          <a:effectRef idx="0">
+            <a:schemeClr val="accent1"/>
+          </a:effectRef>
+          <a:fontRef idx="minor">
+            <a:schemeClr val="lt1"/>
+          </a:fontRef>
+        </p:style>
+        <p:txBody>
+          <a:bodyPr rtlCol="0" anchor="ctr"/>
+          <a:lstStyle/>
+          <a:p>
+            <a:pPr marL="0" marR="0" lvl="0" indent="0" algn="ctr" defTabSz="914400" rtl="0" eaLnBrk="1" fontAlgn="auto" latinLnBrk="0" hangingPunct="1">
+              <a:lnSpc>
+                <a:spcPct val="100000"/>
+              </a:lnSpc>
+              <a:spcBef>
+                <a:spcPts val="0"/>
+              </a:spcBef>
+              <a:spcAft>
+                <a:spcPts val="0"/>
+              </a:spcAft>
+              <a:buClrTx/>
+              <a:buSzTx/>
+              <a:buFontTx/>
+              <a:buNone/>
+              <a:tabLst/>
+              <a:defRPr/>
+            </a:pPr>
+            <a:endParaRPr kumimoji="0" lang="en-US" sz="1800" b="0" i="0" u="none" strike="noStrike" kern="1200" cap="none" spc="0" normalizeH="0" baseline="0" noProof="0" dirty="0">
+              <a:ln>
+                <a:noFill/>
+              </a:ln>
+              <a:solidFill>
+                <a:prstClr val="white"/>
+              </a:solidFill>
+              <a:effectLst/>
+              <a:uLnTx/>
+              <a:uFillTx/>
+              <a:latin typeface="Calibri" panose="020F0502020204030204"/>
+              <a:ea typeface="+mn-ea"/>
+              <a:cs typeface="+mn-cs"/>
+            </a:endParaRPr>
+          </a:p>
+        </p:txBody>
+      </p:sp>
+      <p:sp>
+        <p:nvSpPr>
+          <p:cNvPr id="20" name="Rectangle 19">
+            <a:extLst>
+              <a:ext uri="{FF2B5EF4-FFF2-40B4-BE49-F238E27FC236}">
+                <a16:creationId xmlns:a16="http://schemas.microsoft.com/office/drawing/2014/main" id="{10127CDE-2B99-47A8-BB3C-7D17519105E0}"/>
+              </a:ext>
+              <a:ext uri="{C183D7F6-B498-43B3-948B-1728B52AA6E4}">
+                <adec:decorative xmlns:adec="http://schemas.microsoft.com/office/drawing/2017/decorative" val="1"/>
+              </a:ext>
+            </a:extLst>
+          </p:cNvPr>
+          <p:cNvSpPr>
+            <a:spLocks noGrp="1" noRot="1" noChangeAspect="1" noMove="1" noResize="1" noEditPoints="1" noAdjustHandles="1" noChangeArrowheads="1" noChangeShapeType="1" noTextEdit="1"/>
+          </p:cNvSpPr>
+          <p:nvPr>
+            <p:extLst>
+              <p:ext uri="{386F3935-93C4-4BCD-93E2-E3B085C9AB24}">
+                <p16:designElem xmlns:p16="http://schemas.microsoft.com/office/powerpoint/2015/main" val="1"/>
+              </p:ext>
+            </p:extLst>
+          </p:nvPr>
+        </p:nvSpPr>
+        <p:spPr>
+          <a:xfrm rot="5400000">
+            <a:off x="3610864" y="1323863"/>
+            <a:ext cx="1463040" cy="18288"/>
+          </a:xfrm>
+          <a:prstGeom prst="rect">
+            <a:avLst/>
+          </a:prstGeom>
+          <a:solidFill>
+            <a:srgbClr val="D5D5D5"/>
+          </a:solidFill>
+          <a:ln w="3175">
+            <a:noFill/>
+          </a:ln>
+          <a:effectLst/>
+        </p:spPr>
+        <p:style>
+          <a:lnRef idx="2">
+            <a:schemeClr val="accent1">
+              <a:shade val="50000"/>
+            </a:schemeClr>
+          </a:lnRef>
+          <a:fillRef idx="1">
+            <a:schemeClr val="accent1"/>
+          </a:fillRef>
+          <a:effectRef idx="0">
+            <a:schemeClr val="accent1"/>
+          </a:effectRef>
+          <a:fontRef idx="minor">
+            <a:schemeClr val="lt1"/>
+          </a:fontRef>
+        </p:style>
+        <p:txBody>
+          <a:bodyPr rtlCol="0" anchor="ctr"/>
+          <a:lstStyle/>
+          <a:p>
+            <a:pPr marL="0" marR="0" lvl="0" indent="0" algn="ctr" defTabSz="914400" rtl="0" eaLnBrk="1" fontAlgn="auto" latinLnBrk="0" hangingPunct="1">
+              <a:lnSpc>
+                <a:spcPct val="100000"/>
+              </a:lnSpc>
+              <a:spcBef>
+                <a:spcPts val="0"/>
+              </a:spcBef>
+              <a:spcAft>
+                <a:spcPts val="0"/>
+              </a:spcAft>
+              <a:buClrTx/>
+              <a:buSzTx/>
+              <a:buFontTx/>
+              <a:buNone/>
+              <a:tabLst/>
+              <a:defRPr/>
+            </a:pPr>
+            <a:endParaRPr kumimoji="0" lang="en-US" sz="1800" b="0" i="0" u="none" strike="noStrike" kern="1200" cap="none" spc="0" normalizeH="0" baseline="0" noProof="0">
+              <a:ln>
+                <a:noFill/>
+              </a:ln>
+              <a:solidFill>
+                <a:prstClr val="white"/>
+              </a:solidFill>
+              <a:effectLst/>
+              <a:uLnTx/>
+              <a:uFillTx/>
+              <a:latin typeface="Calibri" panose="020F0502020204030204"/>
+              <a:ea typeface="+mn-ea"/>
+              <a:cs typeface="+mn-cs"/>
+            </a:endParaRPr>
+          </a:p>
+        </p:txBody>
+      </p:sp>
+      <p:sp>
+        <p:nvSpPr>
+          <p:cNvPr id="3" name="Content Placeholder 2">
+            <a:extLst>
+              <a:ext uri="{FF2B5EF4-FFF2-40B4-BE49-F238E27FC236}">
+                <a16:creationId xmlns:a16="http://schemas.microsoft.com/office/drawing/2014/main" id="{C0A60ACC-94B8-984D-BF1E-E553CAEE24F0}"/>
+              </a:ext>
+            </a:extLst>
+          </p:cNvPr>
+          <p:cNvSpPr>
+            <a:spLocks noGrp="1"/>
+          </p:cNvSpPr>
+          <p:nvPr>
+            <p:ph idx="1"/>
+          </p:nvPr>
+        </p:nvSpPr>
+        <p:spPr>
+          <a:xfrm>
+            <a:off x="4581144" y="510047"/>
+            <a:ext cx="6858000" cy="1645920"/>
+          </a:xfrm>
+        </p:spPr>
+        <p:txBody>
+          <a:bodyPr anchor="ctr">
+            <a:normAutofit/>
+          </a:bodyPr>
+          <a:lstStyle/>
+          <a:p>
+            <a:pPr marL="0" indent="0">
+              <a:buNone/>
+            </a:pPr>
+            <a:r>
+              <a:rPr lang="en-US" sz="1500" dirty="0"/>
+              <a:t>ROCAUC score: 0.684 </a:t>
+            </a:r>
+          </a:p>
+          <a:p>
+            <a:pPr marL="0" indent="0">
+              <a:buNone/>
+            </a:pPr>
+            <a:r>
+              <a:rPr lang="en-US" sz="1500" dirty="0"/>
+              <a:t>Accuracy score: 0.72 </a:t>
+            </a:r>
+          </a:p>
+          <a:p>
+            <a:pPr marL="0" indent="0">
+              <a:buNone/>
+            </a:pPr>
+            <a:r>
+              <a:rPr lang="en-US" sz="1500" dirty="0"/>
+              <a:t>F1 score: 0.5714 </a:t>
+            </a:r>
+          </a:p>
+          <a:p>
+            <a:pPr marL="0" indent="0">
+              <a:buNone/>
+            </a:pPr>
+            <a:r>
+              <a:rPr lang="en-US" sz="1500" dirty="0"/>
+              <a:t>train accuracy: 0.996 </a:t>
+            </a:r>
+          </a:p>
+          <a:p>
+            <a:pPr marL="0" indent="0">
+              <a:buNone/>
+            </a:pPr>
+            <a:r>
+              <a:rPr lang="en-US" sz="1500" dirty="0"/>
+              <a:t>test accuracy: 0.720</a:t>
+            </a:r>
+          </a:p>
+        </p:txBody>
+      </p:sp>
+      <p:pic>
+        <p:nvPicPr>
+          <p:cNvPr id="5" name="Picture 4" descr="Chart, treemap chart&#10;&#10;Description automatically generated">
+            <a:extLst>
+              <a:ext uri="{FF2B5EF4-FFF2-40B4-BE49-F238E27FC236}">
+                <a16:creationId xmlns:a16="http://schemas.microsoft.com/office/drawing/2014/main" id="{04F16C9B-E8DF-6F48-8645-DEE6BA5C3277}"/>
+              </a:ext>
+            </a:extLst>
+          </p:cNvPr>
+          <p:cNvPicPr>
+            <a:picLocks noChangeAspect="1"/>
+          </p:cNvPicPr>
+          <p:nvPr/>
+        </p:nvPicPr>
+        <p:blipFill>
+          <a:blip r:embed="rId3"/>
+          <a:stretch>
+            <a:fillRect/>
+          </a:stretch>
+        </p:blipFill>
+        <p:spPr>
+          <a:xfrm>
+            <a:off x="557784" y="2960975"/>
+            <a:ext cx="3584448" cy="2930286"/>
+          </a:xfrm>
+          <a:prstGeom prst="rect">
+            <a:avLst/>
+          </a:prstGeom>
+        </p:spPr>
+      </p:pic>
+      <p:pic>
+        <p:nvPicPr>
+          <p:cNvPr id="9" name="Picture 8" descr="Chart, bar chart&#10;&#10;Description automatically generated">
+            <a:extLst>
+              <a:ext uri="{FF2B5EF4-FFF2-40B4-BE49-F238E27FC236}">
+                <a16:creationId xmlns:a16="http://schemas.microsoft.com/office/drawing/2014/main" id="{3437D003-0666-2241-B2F7-8DA330813266}"/>
+              </a:ext>
+            </a:extLst>
+          </p:cNvPr>
+          <p:cNvPicPr>
+            <a:picLocks noChangeAspect="1"/>
+          </p:cNvPicPr>
+          <p:nvPr/>
+        </p:nvPicPr>
+        <p:blipFill>
+          <a:blip r:embed="rId4"/>
+          <a:stretch>
+            <a:fillRect/>
+          </a:stretch>
+        </p:blipFill>
+        <p:spPr>
+          <a:xfrm>
+            <a:off x="8137415" y="3225328"/>
+            <a:ext cx="3584448" cy="2401579"/>
+          </a:xfrm>
+          <a:prstGeom prst="rect">
+            <a:avLst/>
+          </a:prstGeom>
+        </p:spPr>
+      </p:pic>
+      <p:pic>
+        <p:nvPicPr>
+          <p:cNvPr id="7" name="Picture 6" descr="Table&#10;&#10;Description automatically generated">
+            <a:extLst>
+              <a:ext uri="{FF2B5EF4-FFF2-40B4-BE49-F238E27FC236}">
+                <a16:creationId xmlns:a16="http://schemas.microsoft.com/office/drawing/2014/main" id="{F86B5D90-2E59-BF43-9E65-E2E11102208A}"/>
+              </a:ext>
+            </a:extLst>
+          </p:cNvPr>
+          <p:cNvPicPr>
+            <a:picLocks noChangeAspect="1"/>
+          </p:cNvPicPr>
+          <p:nvPr/>
+        </p:nvPicPr>
+        <p:blipFill>
+          <a:blip r:embed="rId5"/>
+          <a:stretch>
+            <a:fillRect/>
+          </a:stretch>
+        </p:blipFill>
+        <p:spPr>
+          <a:xfrm>
+            <a:off x="4425696" y="3870528"/>
+            <a:ext cx="3584448" cy="1111178"/>
+          </a:xfrm>
+          <a:prstGeom prst="rect">
+            <a:avLst/>
+          </a:prstGeom>
+        </p:spPr>
+      </p:pic>
+    </p:spTree>
+    <p:extLst>
+      <p:ext uri="{BB962C8B-B14F-4D97-AF65-F5344CB8AC3E}">
+        <p14:creationId xmlns:p14="http://schemas.microsoft.com/office/powerpoint/2010/main" val="1439601374"/>
+      </p:ext>
+    </p:extLst>
+  </p:cSld>
+  <p:clrMapOvr>
+    <a:masterClrMapping/>
+  </p:clrMapOvr>
+</p:sld>
+</file>
+
+<file path=ppt/slides/slide14.xml><?xml version="1.0" encoding="utf-8"?>
+<p:sld xmlns:a="http://schemas.openxmlformats.org/drawingml/2006/main" xmlns:r="http://schemas.openxmlformats.org/officeDocument/2006/relationships" xmlns:p="http://schemas.openxmlformats.org/presentationml/2006/main">
+  <p:cSld>
+    <p:bg>
+      <p:bgPr>
+        <a:solidFill>
+          <a:schemeClr val="bg1"/>
+        </a:solidFill>
+        <a:effectLst/>
+      </p:bgPr>
+    </p:bg>
+    <p:spTree>
+      <p:nvGrpSpPr>
+        <p:cNvPr id="1" name=""/>
+        <p:cNvGrpSpPr/>
+        <p:nvPr/>
+      </p:nvGrpSpPr>
+      <p:grpSpPr>
+        <a:xfrm>
+          <a:off x="0" y="0"/>
+          <a:ext cx="0" cy="0"/>
+          <a:chOff x="0" y="0"/>
+          <a:chExt cx="0" cy="0"/>
+        </a:xfrm>
+      </p:grpSpPr>
+      <p:sp useBgFill="1">
+        <p:nvSpPr>
+          <p:cNvPr id="17" name="Rectangle 16">
+            <a:extLst>
+              <a:ext uri="{FF2B5EF4-FFF2-40B4-BE49-F238E27FC236}">
+                <a16:creationId xmlns:a16="http://schemas.microsoft.com/office/drawing/2014/main" id="{0550F5B9-399F-4FAD-AE6C-ED65F9A43A74}"/>
+              </a:ext>
+              <a:ext uri="{C183D7F6-B498-43B3-948B-1728B52AA6E4}">
+                <adec:decorative xmlns:adec="http://schemas.microsoft.com/office/drawing/2017/decorative" val="1"/>
+              </a:ext>
+            </a:extLst>
+          </p:cNvPr>
+          <p:cNvSpPr>
+            <a:spLocks noGrp="1" noRot="1" noChangeAspect="1" noMove="1" noResize="1" noEditPoints="1" noAdjustHandles="1" noChangeArrowheads="1" noChangeShapeType="1" noTextEdit="1"/>
+          </p:cNvSpPr>
+          <p:nvPr>
+            <p:extLst>
+              <p:ext uri="{386F3935-93C4-4BCD-93E2-E3B085C9AB24}">
+                <p16:designElem xmlns:p16="http://schemas.microsoft.com/office/powerpoint/2015/main" val="1"/>
+              </p:ext>
+            </p:extLst>
+          </p:nvPr>
+        </p:nvSpPr>
+        <p:spPr>
+          <a:xfrm>
+            <a:off x="0" y="0"/>
+            <a:ext cx="12192000" cy="6858000"/>
+          </a:xfrm>
+          <a:prstGeom prst="rect">
+            <a:avLst/>
+          </a:prstGeom>
+          <a:ln>
+            <a:noFill/>
+          </a:ln>
+        </p:spPr>
+        <p:style>
+          <a:lnRef idx="2">
+            <a:schemeClr val="accent1">
+              <a:shade val="50000"/>
+            </a:schemeClr>
+          </a:lnRef>
+          <a:fillRef idx="1">
+            <a:schemeClr val="accent1"/>
+          </a:fillRef>
+          <a:effectRef idx="0">
+            <a:schemeClr val="accent1"/>
+          </a:effectRef>
+          <a:fontRef idx="minor">
+            <a:schemeClr val="lt1"/>
+          </a:fontRef>
+        </p:style>
+        <p:txBody>
+          <a:bodyPr rtlCol="0" anchor="ctr"/>
+          <a:lstStyle/>
+          <a:p>
+            <a:pPr algn="ctr"/>
+            <a:endParaRPr lang="en-US"/>
+          </a:p>
+        </p:txBody>
+      </p:sp>
+      <p:sp useBgFill="1">
+        <p:nvSpPr>
+          <p:cNvPr id="19" name="Rectangle 18">
+            <a:extLst>
+              <a:ext uri="{FF2B5EF4-FFF2-40B4-BE49-F238E27FC236}">
+                <a16:creationId xmlns:a16="http://schemas.microsoft.com/office/drawing/2014/main" id="{C062E60F-5CD4-4268-8359-8076634680E5}"/>
+              </a:ext>
+              <a:ext uri="{C183D7F6-B498-43B3-948B-1728B52AA6E4}">
+                <adec:decorative xmlns:adec="http://schemas.microsoft.com/office/drawing/2017/decorative" val="1"/>
+              </a:ext>
+            </a:extLst>
+          </p:cNvPr>
+          <p:cNvSpPr>
+            <a:spLocks noGrp="1" noRot="1" noChangeAspect="1" noMove="1" noResize="1" noEditPoints="1" noAdjustHandles="1" noChangeArrowheads="1" noChangeShapeType="1" noTextEdit="1"/>
+          </p:cNvSpPr>
+          <p:nvPr>
+            <p:extLst>
+              <p:ext uri="{386F3935-93C4-4BCD-93E2-E3B085C9AB24}">
+                <p16:designElem xmlns:p16="http://schemas.microsoft.com/office/powerpoint/2015/main" val="1"/>
+              </p:ext>
+            </p:extLst>
+          </p:nvPr>
+        </p:nvSpPr>
+        <p:spPr>
+          <a:xfrm>
+            <a:off x="554416" y="288350"/>
+            <a:ext cx="11167447" cy="2089317"/>
+          </a:xfrm>
+          <a:prstGeom prst="rect">
+            <a:avLst/>
+          </a:prstGeom>
+          <a:ln w="12700">
+            <a:solidFill>
+              <a:srgbClr val="DEDEDE"/>
+            </a:solidFill>
+          </a:ln>
+          <a:effectLst>
+            <a:outerShdw blurRad="50800" dist="38100" dir="2700000" algn="tl" rotWithShape="0">
+              <a:schemeClr val="bg2">
+                <a:lumMod val="85000"/>
+                <a:alpha val="50000"/>
+              </a:schemeClr>
+            </a:outerShdw>
+          </a:effectLst>
+        </p:spPr>
+        <p:style>
+          <a:lnRef idx="2">
+            <a:schemeClr val="accent1">
+              <a:shade val="50000"/>
+            </a:schemeClr>
+          </a:lnRef>
+          <a:fillRef idx="1">
+            <a:schemeClr val="accent1"/>
+          </a:fillRef>
+          <a:effectRef idx="0">
+            <a:schemeClr val="accent1"/>
+          </a:effectRef>
+          <a:fontRef idx="minor">
+            <a:schemeClr val="lt1"/>
+          </a:fontRef>
+        </p:style>
+        <p:txBody>
+          <a:bodyPr rtlCol="0" anchor="ctr"/>
+          <a:lstStyle/>
+          <a:p>
+            <a:pPr marL="0" marR="0" lvl="0" indent="0" algn="ctr" defTabSz="914400" rtl="0" eaLnBrk="1" fontAlgn="auto" latinLnBrk="0" hangingPunct="1">
+              <a:lnSpc>
+                <a:spcPct val="100000"/>
+              </a:lnSpc>
+              <a:spcBef>
+                <a:spcPts val="0"/>
+              </a:spcBef>
+              <a:spcAft>
+                <a:spcPts val="0"/>
+              </a:spcAft>
+              <a:buClrTx/>
+              <a:buSzTx/>
+              <a:buFontTx/>
+              <a:buNone/>
+              <a:tabLst/>
+              <a:defRPr/>
+            </a:pPr>
+            <a:endParaRPr kumimoji="0" lang="en-US" sz="1800" b="0" i="0" u="none" strike="noStrike" kern="1200" cap="none" spc="0" normalizeH="0" baseline="0" noProof="0">
+              <a:ln>
+                <a:noFill/>
+              </a:ln>
+              <a:solidFill>
+                <a:prstClr val="white"/>
+              </a:solidFill>
+              <a:effectLst/>
+              <a:uLnTx/>
+              <a:uFillTx/>
+              <a:latin typeface="Calibri" panose="020F0502020204030204"/>
+              <a:ea typeface="+mn-ea"/>
+              <a:cs typeface="+mn-cs"/>
+            </a:endParaRPr>
+          </a:p>
+        </p:txBody>
+      </p:sp>
+      <p:sp>
+        <p:nvSpPr>
+          <p:cNvPr id="2" name="Title 1">
+            <a:extLst>
+              <a:ext uri="{FF2B5EF4-FFF2-40B4-BE49-F238E27FC236}">
+                <a16:creationId xmlns:a16="http://schemas.microsoft.com/office/drawing/2014/main" id="{CF8425C3-3139-574A-A306-6FBA5F6A5005}"/>
+              </a:ext>
+            </a:extLst>
+          </p:cNvPr>
+          <p:cNvSpPr>
+            <a:spLocks noGrp="1"/>
+          </p:cNvSpPr>
+          <p:nvPr>
+            <p:ph type="title"/>
+          </p:nvPr>
+        </p:nvSpPr>
+        <p:spPr>
+          <a:xfrm>
+            <a:off x="841248" y="510047"/>
+            <a:ext cx="3300984" cy="1645920"/>
+          </a:xfrm>
+        </p:spPr>
+        <p:txBody>
+          <a:bodyPr>
+            <a:normAutofit/>
+          </a:bodyPr>
+          <a:lstStyle/>
+          <a:p>
+            <a:r>
+              <a:rPr lang="en-US" sz="2800" dirty="0"/>
+              <a:t>Ada Boosted Random Forest: Results</a:t>
+            </a:r>
+            <a:br>
+              <a:rPr lang="en-US" sz="2800" dirty="0"/>
+            </a:br>
+            <a:r>
+              <a:rPr lang="en-US" sz="2800" dirty="0"/>
+              <a:t>With Feature Selection</a:t>
+            </a:r>
+          </a:p>
+        </p:txBody>
+      </p:sp>
+      <p:sp>
+        <p:nvSpPr>
+          <p:cNvPr id="21" name="Rectangle 20">
+            <a:extLst>
+              <a:ext uri="{FF2B5EF4-FFF2-40B4-BE49-F238E27FC236}">
+                <a16:creationId xmlns:a16="http://schemas.microsoft.com/office/drawing/2014/main" id="{BB341EC3-1810-4D33-BA3F-E2D0AA0ECFB6}"/>
+              </a:ext>
+              <a:ext uri="{C183D7F6-B498-43B3-948B-1728B52AA6E4}">
+                <adec:decorative xmlns:adec="http://schemas.microsoft.com/office/drawing/2017/decorative" val="1"/>
+              </a:ext>
+            </a:extLst>
+          </p:cNvPr>
+          <p:cNvSpPr>
+            <a:spLocks noGrp="1" noRot="1" noChangeAspect="1" noMove="1" noResize="1" noEditPoints="1" noAdjustHandles="1" noChangeArrowheads="1" noChangeShapeType="1" noTextEdit="1"/>
+          </p:cNvSpPr>
+          <p:nvPr>
+            <p:extLst>
+              <p:ext uri="{386F3935-93C4-4BCD-93E2-E3B085C9AB24}">
+                <p16:designElem xmlns:p16="http://schemas.microsoft.com/office/powerpoint/2015/main" val="1"/>
+              </p:ext>
+            </p:extLst>
+          </p:nvPr>
+        </p:nvSpPr>
+        <p:spPr>
+          <a:xfrm>
+            <a:off x="490408" y="980964"/>
+            <a:ext cx="128016" cy="704088"/>
+          </a:xfrm>
+          <a:prstGeom prst="rect">
+            <a:avLst/>
+          </a:prstGeom>
+          <a:solidFill>
+            <a:schemeClr val="accent2"/>
+          </a:solidFill>
+          <a:ln>
+            <a:noFill/>
+          </a:ln>
+        </p:spPr>
+        <p:style>
+          <a:lnRef idx="2">
+            <a:schemeClr val="accent1">
+              <a:shade val="50000"/>
+            </a:schemeClr>
+          </a:lnRef>
+          <a:fillRef idx="1">
+            <a:schemeClr val="accent1"/>
+          </a:fillRef>
+          <a:effectRef idx="0">
+            <a:schemeClr val="accent1"/>
+          </a:effectRef>
+          <a:fontRef idx="minor">
+            <a:schemeClr val="lt1"/>
+          </a:fontRef>
+        </p:style>
+        <p:txBody>
+          <a:bodyPr rtlCol="0" anchor="ctr"/>
+          <a:lstStyle/>
+          <a:p>
+            <a:pPr marL="0" marR="0" lvl="0" indent="0" algn="ctr" defTabSz="914400" rtl="0" eaLnBrk="1" fontAlgn="auto" latinLnBrk="0" hangingPunct="1">
+              <a:lnSpc>
+                <a:spcPct val="100000"/>
+              </a:lnSpc>
+              <a:spcBef>
+                <a:spcPts val="0"/>
+              </a:spcBef>
+              <a:spcAft>
+                <a:spcPts val="0"/>
+              </a:spcAft>
+              <a:buClrTx/>
+              <a:buSzTx/>
+              <a:buFontTx/>
+              <a:buNone/>
+              <a:tabLst/>
+              <a:defRPr/>
+            </a:pPr>
+            <a:endParaRPr kumimoji="0" lang="en-US" sz="1800" b="0" i="0" u="none" strike="noStrike" kern="1200" cap="none" spc="0" normalizeH="0" baseline="0" noProof="0" dirty="0">
+              <a:ln>
+                <a:noFill/>
+              </a:ln>
+              <a:solidFill>
+                <a:prstClr val="white"/>
+              </a:solidFill>
+              <a:effectLst/>
+              <a:uLnTx/>
+              <a:uFillTx/>
+              <a:latin typeface="Calibri" panose="020F0502020204030204"/>
+              <a:ea typeface="+mn-ea"/>
+              <a:cs typeface="+mn-cs"/>
+            </a:endParaRPr>
+          </a:p>
+        </p:txBody>
+      </p:sp>
+      <p:sp>
+        <p:nvSpPr>
+          <p:cNvPr id="23" name="Rectangle 22">
+            <a:extLst>
+              <a:ext uri="{FF2B5EF4-FFF2-40B4-BE49-F238E27FC236}">
+                <a16:creationId xmlns:a16="http://schemas.microsoft.com/office/drawing/2014/main" id="{10127CDE-2B99-47A8-BB3C-7D17519105E0}"/>
+              </a:ext>
+              <a:ext uri="{C183D7F6-B498-43B3-948B-1728B52AA6E4}">
+                <adec:decorative xmlns:adec="http://schemas.microsoft.com/office/drawing/2017/decorative" val="1"/>
+              </a:ext>
+            </a:extLst>
+          </p:cNvPr>
+          <p:cNvSpPr>
+            <a:spLocks noGrp="1" noRot="1" noChangeAspect="1" noMove="1" noResize="1" noEditPoints="1" noAdjustHandles="1" noChangeArrowheads="1" noChangeShapeType="1" noTextEdit="1"/>
+          </p:cNvSpPr>
+          <p:nvPr>
+            <p:extLst>
+              <p:ext uri="{386F3935-93C4-4BCD-93E2-E3B085C9AB24}">
+                <p16:designElem xmlns:p16="http://schemas.microsoft.com/office/powerpoint/2015/main" val="1"/>
+              </p:ext>
+            </p:extLst>
+          </p:nvPr>
+        </p:nvSpPr>
+        <p:spPr>
+          <a:xfrm rot="5400000">
+            <a:off x="3610864" y="1323863"/>
+            <a:ext cx="1463040" cy="18288"/>
+          </a:xfrm>
+          <a:prstGeom prst="rect">
+            <a:avLst/>
+          </a:prstGeom>
+          <a:solidFill>
+            <a:srgbClr val="D5D5D5"/>
+          </a:solidFill>
+          <a:ln w="3175">
+            <a:noFill/>
+          </a:ln>
+          <a:effectLst/>
+        </p:spPr>
+        <p:style>
+          <a:lnRef idx="2">
+            <a:schemeClr val="accent1">
+              <a:shade val="50000"/>
+            </a:schemeClr>
+          </a:lnRef>
+          <a:fillRef idx="1">
+            <a:schemeClr val="accent1"/>
+          </a:fillRef>
+          <a:effectRef idx="0">
+            <a:schemeClr val="accent1"/>
+          </a:effectRef>
+          <a:fontRef idx="minor">
+            <a:schemeClr val="lt1"/>
+          </a:fontRef>
+        </p:style>
+        <p:txBody>
+          <a:bodyPr rtlCol="0" anchor="ctr"/>
+          <a:lstStyle/>
+          <a:p>
+            <a:pPr marL="0" marR="0" lvl="0" indent="0" algn="ctr" defTabSz="914400" rtl="0" eaLnBrk="1" fontAlgn="auto" latinLnBrk="0" hangingPunct="1">
+              <a:lnSpc>
+                <a:spcPct val="100000"/>
+              </a:lnSpc>
+              <a:spcBef>
+                <a:spcPts val="0"/>
+              </a:spcBef>
+              <a:spcAft>
+                <a:spcPts val="0"/>
+              </a:spcAft>
+              <a:buClrTx/>
+              <a:buSzTx/>
+              <a:buFontTx/>
+              <a:buNone/>
+              <a:tabLst/>
+              <a:defRPr/>
+            </a:pPr>
+            <a:endParaRPr kumimoji="0" lang="en-US" sz="1800" b="0" i="0" u="none" strike="noStrike" kern="1200" cap="none" spc="0" normalizeH="0" baseline="0" noProof="0">
+              <a:ln>
+                <a:noFill/>
+              </a:ln>
+              <a:solidFill>
+                <a:prstClr val="white"/>
+              </a:solidFill>
+              <a:effectLst/>
+              <a:uLnTx/>
+              <a:uFillTx/>
+              <a:latin typeface="Calibri" panose="020F0502020204030204"/>
+              <a:ea typeface="+mn-ea"/>
+              <a:cs typeface="+mn-cs"/>
+            </a:endParaRPr>
+          </a:p>
+        </p:txBody>
+      </p:sp>
+      <p:sp>
+        <p:nvSpPr>
+          <p:cNvPr id="3" name="Content Placeholder 2">
+            <a:extLst>
+              <a:ext uri="{FF2B5EF4-FFF2-40B4-BE49-F238E27FC236}">
+                <a16:creationId xmlns:a16="http://schemas.microsoft.com/office/drawing/2014/main" id="{C0A60ACC-94B8-984D-BF1E-E553CAEE24F0}"/>
+              </a:ext>
+            </a:extLst>
+          </p:cNvPr>
+          <p:cNvSpPr>
+            <a:spLocks noGrp="1"/>
+          </p:cNvSpPr>
+          <p:nvPr>
+            <p:ph idx="1"/>
+          </p:nvPr>
+        </p:nvSpPr>
+        <p:spPr>
+          <a:xfrm>
+            <a:off x="4581144" y="510047"/>
+            <a:ext cx="6858000" cy="1645920"/>
+          </a:xfrm>
+        </p:spPr>
+        <p:txBody>
+          <a:bodyPr anchor="ctr">
+            <a:normAutofit/>
+          </a:bodyPr>
+          <a:lstStyle/>
+          <a:p>
+            <a:pPr marL="0" indent="0">
+              <a:buNone/>
+            </a:pPr>
+            <a:r>
+              <a:rPr lang="en-US" sz="1500" dirty="0"/>
+              <a:t>ROCAUC score: 0.632 </a:t>
+            </a:r>
+          </a:p>
+          <a:p>
+            <a:pPr marL="0" indent="0">
+              <a:buNone/>
+            </a:pPr>
+            <a:r>
+              <a:rPr lang="en-US" sz="1500" dirty="0"/>
+              <a:t>Accuracy score: 0.68 </a:t>
+            </a:r>
+          </a:p>
+          <a:p>
+            <a:pPr marL="0" indent="0">
+              <a:buNone/>
+            </a:pPr>
+            <a:r>
+              <a:rPr lang="en-US" sz="1500" dirty="0"/>
+              <a:t>F1 score: 0.5 </a:t>
+            </a:r>
+          </a:p>
+          <a:p>
+            <a:pPr marL="0" indent="0">
+              <a:buNone/>
+            </a:pPr>
+            <a:r>
+              <a:rPr lang="en-US" sz="1500" dirty="0"/>
+              <a:t>train accuracy: 1.000 </a:t>
+            </a:r>
+          </a:p>
+          <a:p>
+            <a:pPr marL="0" indent="0">
+              <a:buNone/>
+            </a:pPr>
+            <a:r>
+              <a:rPr lang="en-US" sz="1500" dirty="0"/>
+              <a:t>test accuracy: 0.680</a:t>
+            </a:r>
+          </a:p>
+        </p:txBody>
+      </p:sp>
+      <p:pic>
+        <p:nvPicPr>
+          <p:cNvPr id="12" name="Picture 11" descr="Chart, treemap chart&#10;&#10;Description automatically generated">
+            <a:extLst>
+              <a:ext uri="{FF2B5EF4-FFF2-40B4-BE49-F238E27FC236}">
+                <a16:creationId xmlns:a16="http://schemas.microsoft.com/office/drawing/2014/main" id="{CBF47DBB-7672-0843-B535-8D17138E5D28}"/>
+              </a:ext>
+            </a:extLst>
+          </p:cNvPr>
+          <p:cNvPicPr>
+            <a:picLocks noChangeAspect="1"/>
+          </p:cNvPicPr>
+          <p:nvPr/>
+        </p:nvPicPr>
+        <p:blipFill>
+          <a:blip r:embed="rId2"/>
+          <a:stretch>
+            <a:fillRect/>
+          </a:stretch>
+        </p:blipFill>
+        <p:spPr>
+          <a:xfrm>
+            <a:off x="557784" y="2969936"/>
+            <a:ext cx="3584448" cy="2912363"/>
+          </a:xfrm>
+          <a:prstGeom prst="rect">
+            <a:avLst/>
+          </a:prstGeom>
+        </p:spPr>
+      </p:pic>
+      <p:pic>
+        <p:nvPicPr>
+          <p:cNvPr id="6" name="Picture 5" descr="Chart, bar chart&#10;&#10;Description automatically generated">
+            <a:extLst>
+              <a:ext uri="{FF2B5EF4-FFF2-40B4-BE49-F238E27FC236}">
+                <a16:creationId xmlns:a16="http://schemas.microsoft.com/office/drawing/2014/main" id="{FDAD0FC1-1D02-3449-9E2F-9E137794F481}"/>
+              </a:ext>
+            </a:extLst>
+          </p:cNvPr>
+          <p:cNvPicPr>
+            <a:picLocks noChangeAspect="1"/>
+          </p:cNvPicPr>
+          <p:nvPr/>
+        </p:nvPicPr>
+        <p:blipFill>
+          <a:blip r:embed="rId3"/>
+          <a:stretch>
+            <a:fillRect/>
+          </a:stretch>
+        </p:blipFill>
+        <p:spPr>
+          <a:xfrm>
+            <a:off x="8247888" y="2969936"/>
+            <a:ext cx="3584448" cy="2356774"/>
+          </a:xfrm>
+          <a:prstGeom prst="rect">
+            <a:avLst/>
+          </a:prstGeom>
+        </p:spPr>
+      </p:pic>
+      <p:pic>
+        <p:nvPicPr>
+          <p:cNvPr id="10" name="Picture 9" descr="Table&#10;&#10;Description automatically generated">
+            <a:extLst>
+              <a:ext uri="{FF2B5EF4-FFF2-40B4-BE49-F238E27FC236}">
+                <a16:creationId xmlns:a16="http://schemas.microsoft.com/office/drawing/2014/main" id="{7CED64D4-FE64-CA45-B80D-256B8730394F}"/>
+              </a:ext>
+            </a:extLst>
+          </p:cNvPr>
+          <p:cNvPicPr>
+            <a:picLocks noChangeAspect="1"/>
+          </p:cNvPicPr>
+          <p:nvPr/>
+        </p:nvPicPr>
+        <p:blipFill>
+          <a:blip r:embed="rId4"/>
+          <a:stretch>
+            <a:fillRect/>
+          </a:stretch>
+        </p:blipFill>
+        <p:spPr>
+          <a:xfrm>
+            <a:off x="4303776" y="3533539"/>
+            <a:ext cx="3584448" cy="1084294"/>
+          </a:xfrm>
+          <a:prstGeom prst="rect">
+            <a:avLst/>
+          </a:prstGeom>
+        </p:spPr>
+      </p:pic>
+    </p:spTree>
+    <p:extLst>
+      <p:ext uri="{BB962C8B-B14F-4D97-AF65-F5344CB8AC3E}">
+        <p14:creationId xmlns:p14="http://schemas.microsoft.com/office/powerpoint/2010/main" val="620613443"/>
+      </p:ext>
+    </p:extLst>
+  </p:cSld>
+  <p:clrMapOvr>
+    <a:masterClrMapping/>
+  </p:clrMapOvr>
+</p:sld>
+</file>
+
+<file path=ppt/slides/slide15.xml><?xml version="1.0" encoding="utf-8"?>
+<p:sld xmlns:a="http://schemas.openxmlformats.org/drawingml/2006/main" xmlns:r="http://schemas.openxmlformats.org/officeDocument/2006/relationships" xmlns:p="http://schemas.openxmlformats.org/presentationml/2006/main">
+  <p:cSld>
+    <p:spTree>
+      <p:nvGrpSpPr>
+        <p:cNvPr id="1" name=""/>
+        <p:cNvGrpSpPr/>
+        <p:nvPr/>
+      </p:nvGrpSpPr>
+      <p:grpSpPr>
+        <a:xfrm>
+          <a:off x="0" y="0"/>
+          <a:ext cx="0" cy="0"/>
+          <a:chOff x="0" y="0"/>
+          <a:chExt cx="0" cy="0"/>
+        </a:xfrm>
+      </p:grpSpPr>
+      <p:sp>
+        <p:nvSpPr>
+          <p:cNvPr id="2" name="Title 1">
+            <a:extLst>
+              <a:ext uri="{FF2B5EF4-FFF2-40B4-BE49-F238E27FC236}">
+                <a16:creationId xmlns:a16="http://schemas.microsoft.com/office/drawing/2014/main" id="{CB103459-9175-C548-BC56-74FC8A061644}"/>
+              </a:ext>
+            </a:extLst>
+          </p:cNvPr>
+          <p:cNvSpPr>
+            <a:spLocks noGrp="1"/>
+          </p:cNvSpPr>
+          <p:nvPr>
+            <p:ph type="title"/>
+          </p:nvPr>
+        </p:nvSpPr>
+        <p:spPr/>
+        <p:txBody>
+          <a:bodyPr/>
+          <a:lstStyle/>
+          <a:p>
+            <a:r>
+              <a:rPr lang="en-US" dirty="0"/>
+              <a:t>Discussion</a:t>
+            </a:r>
+          </a:p>
+        </p:txBody>
+      </p:sp>
+      <p:sp>
+        <p:nvSpPr>
+          <p:cNvPr id="3" name="Content Placeholder 2">
+            <a:extLst>
+              <a:ext uri="{FF2B5EF4-FFF2-40B4-BE49-F238E27FC236}">
+                <a16:creationId xmlns:a16="http://schemas.microsoft.com/office/drawing/2014/main" id="{E5134591-7079-DF49-B788-8B23651B781A}"/>
+              </a:ext>
+            </a:extLst>
+          </p:cNvPr>
+          <p:cNvSpPr>
+            <a:spLocks noGrp="1"/>
+          </p:cNvSpPr>
+          <p:nvPr>
+            <p:ph idx="1"/>
+          </p:nvPr>
+        </p:nvSpPr>
+        <p:spPr/>
+        <p:txBody>
+          <a:bodyPr/>
+          <a:lstStyle/>
+          <a:p>
+            <a:r>
+              <a:rPr lang="en-US" dirty="0"/>
+              <a:t>Ada Boosted Decision Tree and Ada Boosted Random Forest without feature selection had the highest accuracy and F1 score</a:t>
+            </a:r>
+          </a:p>
+          <a:p>
+            <a:r>
+              <a:rPr lang="en-US" dirty="0"/>
+              <a:t>In this particular scenario, looking at the confusion matrix was particularly useful</a:t>
+            </a:r>
+          </a:p>
+          <a:p>
+            <a:pPr lvl="1"/>
+            <a:r>
+              <a:rPr lang="en-US" dirty="0"/>
+              <a:t>Ada Boosted Random Forest without feature selection is the best model among the 4 reported</a:t>
+            </a:r>
+          </a:p>
+          <a:p>
+            <a:pPr lvl="1"/>
+            <a:r>
+              <a:rPr lang="en-US" dirty="0"/>
+              <a:t>Least false negatives predicted</a:t>
+            </a:r>
+          </a:p>
+          <a:p>
+            <a:pPr lvl="2"/>
+            <a:r>
+              <a:rPr lang="en-US" dirty="0"/>
+              <a:t>Predictive tool for encompassing more potential CKD patients for further clinical evaluation</a:t>
+            </a:r>
+          </a:p>
+          <a:p>
+            <a:pPr lvl="2"/>
+            <a:r>
+              <a:rPr lang="en-US" dirty="0"/>
+              <a:t>Better to have a false positive than false negative as early medical intervention in CKD is crucial</a:t>
+            </a:r>
+          </a:p>
+          <a:p>
+            <a:endParaRPr lang="en-US" dirty="0"/>
+          </a:p>
+        </p:txBody>
+      </p:sp>
+    </p:spTree>
+    <p:extLst>
+      <p:ext uri="{BB962C8B-B14F-4D97-AF65-F5344CB8AC3E}">
+        <p14:creationId xmlns:p14="http://schemas.microsoft.com/office/powerpoint/2010/main" val="218698708"/>
+      </p:ext>
+    </p:extLst>
+  </p:cSld>
+  <p:clrMapOvr>
+    <a:masterClrMapping/>
+  </p:clrMapOvr>
+</p:sld>
+</file>
+
+<file path=ppt/slides/slide16.xml><?xml version="1.0" encoding="utf-8"?>
+<p:sld xmlns:a="http://schemas.openxmlformats.org/drawingml/2006/main" xmlns:r="http://schemas.openxmlformats.org/officeDocument/2006/relationships" xmlns:p="http://schemas.openxmlformats.org/presentationml/2006/main">
+  <p:cSld>
+    <p:spTree>
+      <p:nvGrpSpPr>
+        <p:cNvPr id="1" name=""/>
+        <p:cNvGrpSpPr/>
+        <p:nvPr/>
+      </p:nvGrpSpPr>
+      <p:grpSpPr>
+        <a:xfrm>
+          <a:off x="0" y="0"/>
+          <a:ext cx="0" cy="0"/>
+          <a:chOff x="0" y="0"/>
+          <a:chExt cx="0" cy="0"/>
+        </a:xfrm>
+      </p:grpSpPr>
+      <p:sp>
+        <p:nvSpPr>
+          <p:cNvPr id="2" name="Title 1">
+            <a:extLst>
+              <a:ext uri="{FF2B5EF4-FFF2-40B4-BE49-F238E27FC236}">
+                <a16:creationId xmlns:a16="http://schemas.microsoft.com/office/drawing/2014/main" id="{862FADEE-3EF5-9648-942B-6DEBDCDD54A7}"/>
+              </a:ext>
+            </a:extLst>
+          </p:cNvPr>
+          <p:cNvSpPr>
+            <a:spLocks noGrp="1"/>
+          </p:cNvSpPr>
+          <p:nvPr>
+            <p:ph type="title"/>
+          </p:nvPr>
+        </p:nvSpPr>
+        <p:spPr/>
+        <p:txBody>
+          <a:bodyPr/>
+          <a:lstStyle/>
+          <a:p>
+            <a:r>
+              <a:rPr lang="en-US" dirty="0"/>
+              <a:t>Discussion</a:t>
+            </a:r>
+          </a:p>
+        </p:txBody>
+      </p:sp>
+      <p:sp>
+        <p:nvSpPr>
+          <p:cNvPr id="3" name="Content Placeholder 2">
+            <a:extLst>
+              <a:ext uri="{FF2B5EF4-FFF2-40B4-BE49-F238E27FC236}">
+                <a16:creationId xmlns:a16="http://schemas.microsoft.com/office/drawing/2014/main" id="{C708A9AA-6BAB-0244-9FD4-BE53594CEA7D}"/>
+              </a:ext>
+            </a:extLst>
+          </p:cNvPr>
+          <p:cNvSpPr>
+            <a:spLocks noGrp="1"/>
+          </p:cNvSpPr>
+          <p:nvPr>
+            <p:ph idx="1"/>
+          </p:nvPr>
+        </p:nvSpPr>
+        <p:spPr/>
+        <p:txBody>
+          <a:bodyPr/>
+          <a:lstStyle/>
+          <a:p>
+            <a:r>
+              <a:rPr lang="en-US" dirty="0"/>
+              <a:t>Ada Boosted Random Forest also showed age together with blood pressure as the top 3 features of importance when predicting CKD</a:t>
+            </a:r>
+          </a:p>
+          <a:p>
+            <a:pPr lvl="1"/>
+            <a:r>
+              <a:rPr lang="en-US" dirty="0"/>
+              <a:t>In line with our knowledge of CKD</a:t>
+            </a:r>
+          </a:p>
+          <a:p>
+            <a:r>
+              <a:rPr lang="en-US" dirty="0"/>
+              <a:t>Interestingly, hemoglobin and LDL levels had low importance</a:t>
+            </a:r>
+          </a:p>
+          <a:p>
+            <a:pPr lvl="1"/>
+            <a:r>
+              <a:rPr lang="en-US" dirty="0"/>
+              <a:t>Low hemoglobin levels is something that results from suffering from CKD</a:t>
+            </a:r>
+          </a:p>
+          <a:p>
+            <a:pPr lvl="1"/>
+            <a:r>
+              <a:rPr lang="en-US" dirty="0"/>
+              <a:t>CKD patients are more prone to cardiovascular disease which is associated with high LDL levels, but LDL levels have weak association with CKD</a:t>
+            </a:r>
+            <a:r>
+              <a:rPr lang="en-US" baseline="30000" dirty="0"/>
+              <a:t>1</a:t>
+            </a:r>
+          </a:p>
+          <a:p>
+            <a:pPr lvl="1"/>
+            <a:endParaRPr lang="en-US" dirty="0"/>
+          </a:p>
+        </p:txBody>
+      </p:sp>
+      <p:sp>
+        <p:nvSpPr>
+          <p:cNvPr id="4" name="TextBox 3">
+            <a:extLst>
+              <a:ext uri="{FF2B5EF4-FFF2-40B4-BE49-F238E27FC236}">
+                <a16:creationId xmlns:a16="http://schemas.microsoft.com/office/drawing/2014/main" id="{08F30E6A-C3F4-FF4E-BB1B-FC7DED694275}"/>
+              </a:ext>
+            </a:extLst>
+          </p:cNvPr>
+          <p:cNvSpPr txBox="1"/>
+          <p:nvPr/>
+        </p:nvSpPr>
+        <p:spPr>
+          <a:xfrm>
+            <a:off x="0" y="6497255"/>
+            <a:ext cx="12192000" cy="400110"/>
+          </a:xfrm>
+          <a:prstGeom prst="rect">
+            <a:avLst/>
+          </a:prstGeom>
+          <a:noFill/>
+        </p:spPr>
+        <p:txBody>
+          <a:bodyPr wrap="square" rtlCol="0">
+            <a:spAutoFit/>
+          </a:bodyPr>
+          <a:lstStyle/>
+          <a:p>
+            <a:r>
+              <a:rPr lang="en-US" sz="1000" dirty="0"/>
+              <a:t>1: Reiss, A. B., </a:t>
+            </a:r>
+            <a:r>
+              <a:rPr lang="en-US" sz="1000" dirty="0" err="1"/>
+              <a:t>Voloshyna</a:t>
+            </a:r>
+            <a:r>
+              <a:rPr lang="en-US" sz="1000" dirty="0"/>
+              <a:t>, I., De Leon, J., Miyawaki, N., &amp; </a:t>
+            </a:r>
+            <a:r>
+              <a:rPr lang="en-US" sz="1000" dirty="0" err="1"/>
+              <a:t>Mattana</a:t>
+            </a:r>
+            <a:r>
+              <a:rPr lang="en-US" sz="1000" dirty="0"/>
+              <a:t>, J. (2015). Cholesterol Metabolism in CKD. </a:t>
+            </a:r>
+            <a:r>
+              <a:rPr lang="en-US" sz="1000" i="1" dirty="0"/>
+              <a:t>American journal of kidney diseases : the official journal of the National Kidney Foundation</a:t>
+            </a:r>
+            <a:r>
+              <a:rPr lang="en-US" sz="1000" dirty="0"/>
+              <a:t>, </a:t>
+            </a:r>
+            <a:r>
+              <a:rPr lang="en-US" sz="1000" i="1" dirty="0"/>
+              <a:t>66</a:t>
+            </a:r>
+            <a:r>
+              <a:rPr lang="en-US" sz="1000" dirty="0"/>
+              <a:t>(6), 1071–1082. https://</a:t>
+            </a:r>
+            <a:r>
+              <a:rPr lang="en-US" sz="1000" dirty="0" err="1"/>
+              <a:t>doi.org</a:t>
+            </a:r>
+            <a:r>
+              <a:rPr lang="en-US" sz="1000" dirty="0"/>
+              <a:t>/10.1053/j.ajkd.2015.06.028</a:t>
+            </a:r>
+          </a:p>
+        </p:txBody>
+      </p:sp>
+    </p:spTree>
+    <p:extLst>
+      <p:ext uri="{BB962C8B-B14F-4D97-AF65-F5344CB8AC3E}">
+        <p14:creationId xmlns:p14="http://schemas.microsoft.com/office/powerpoint/2010/main" val="39324609"/>
+      </p:ext>
+    </p:extLst>
+  </p:cSld>
+  <p:clrMapOvr>
+    <a:masterClrMapping/>
+  </p:clrMapOvr>
+</p:sld>
+</file>
+
+<file path=ppt/slides/slide17.xml><?xml version="1.0" encoding="utf-8"?>
+<p:sld xmlns:a="http://schemas.openxmlformats.org/drawingml/2006/main" xmlns:r="http://schemas.openxmlformats.org/officeDocument/2006/relationships" xmlns:p="http://schemas.openxmlformats.org/presentationml/2006/main">
+  <p:cSld>
+    <p:spTree>
+      <p:nvGrpSpPr>
+        <p:cNvPr id="1" name=""/>
+        <p:cNvGrpSpPr/>
+        <p:nvPr/>
+      </p:nvGrpSpPr>
+      <p:grpSpPr>
+        <a:xfrm>
+          <a:off x="0" y="0"/>
+          <a:ext cx="0" cy="0"/>
+          <a:chOff x="0" y="0"/>
+          <a:chExt cx="0" cy="0"/>
+        </a:xfrm>
+      </p:grpSpPr>
+      <p:sp>
+        <p:nvSpPr>
+          <p:cNvPr id="2" name="Title 1">
+            <a:extLst>
+              <a:ext uri="{FF2B5EF4-FFF2-40B4-BE49-F238E27FC236}">
+                <a16:creationId xmlns:a16="http://schemas.microsoft.com/office/drawing/2014/main" id="{5DB34C96-0557-7E42-8373-4998667F7822}"/>
+              </a:ext>
+            </a:extLst>
+          </p:cNvPr>
+          <p:cNvSpPr>
+            <a:spLocks noGrp="1"/>
+          </p:cNvSpPr>
+          <p:nvPr>
+            <p:ph type="title"/>
+          </p:nvPr>
+        </p:nvSpPr>
+        <p:spPr/>
+        <p:txBody>
+          <a:bodyPr/>
+          <a:lstStyle/>
+          <a:p>
+            <a:r>
+              <a:rPr lang="en-US" dirty="0"/>
+              <a:t>Flaws</a:t>
+            </a:r>
+          </a:p>
+        </p:txBody>
+      </p:sp>
+      <p:sp>
+        <p:nvSpPr>
+          <p:cNvPr id="3" name="Content Placeholder 2">
+            <a:extLst>
+              <a:ext uri="{FF2B5EF4-FFF2-40B4-BE49-F238E27FC236}">
+                <a16:creationId xmlns:a16="http://schemas.microsoft.com/office/drawing/2014/main" id="{754B1334-848B-724F-9211-761B5827C22B}"/>
+              </a:ext>
+            </a:extLst>
+          </p:cNvPr>
+          <p:cNvSpPr>
+            <a:spLocks noGrp="1"/>
+          </p:cNvSpPr>
+          <p:nvPr>
+            <p:ph idx="1"/>
+          </p:nvPr>
+        </p:nvSpPr>
+        <p:spPr/>
+        <p:txBody>
+          <a:bodyPr/>
+          <a:lstStyle/>
+          <a:p>
+            <a:r>
+              <a:rPr lang="en-US" dirty="0"/>
+              <a:t>Loss of information occurred when data was compressed to simplify data</a:t>
+            </a:r>
+          </a:p>
+          <a:p>
+            <a:r>
+              <a:rPr lang="en-US" dirty="0"/>
+              <a:t>Only 3 types of ML models were trialed</a:t>
+            </a:r>
+          </a:p>
+          <a:p>
+            <a:r>
+              <a:rPr lang="en-US" dirty="0"/>
+              <a:t>Other types of feature engineering could be trialed</a:t>
+            </a:r>
+          </a:p>
+        </p:txBody>
+      </p:sp>
+    </p:spTree>
+    <p:extLst>
+      <p:ext uri="{BB962C8B-B14F-4D97-AF65-F5344CB8AC3E}">
+        <p14:creationId xmlns:p14="http://schemas.microsoft.com/office/powerpoint/2010/main" val="561940526"/>
+      </p:ext>
+    </p:extLst>
+  </p:cSld>
+  <p:clrMapOvr>
+    <a:masterClrMapping/>
+  </p:clrMapOvr>
+</p:sld>
+</file>
+
+<file path=ppt/slides/slide18.xml><?xml version="1.0" encoding="utf-8"?>
+<p:sld xmlns:a="http://schemas.openxmlformats.org/drawingml/2006/main" xmlns:r="http://schemas.openxmlformats.org/officeDocument/2006/relationships" xmlns:p="http://schemas.openxmlformats.org/presentationml/2006/main">
+  <p:cSld>
+    <p:spTree>
+      <p:nvGrpSpPr>
+        <p:cNvPr id="1" name=""/>
+        <p:cNvGrpSpPr/>
+        <p:nvPr/>
+      </p:nvGrpSpPr>
+      <p:grpSpPr>
+        <a:xfrm>
+          <a:off x="0" y="0"/>
+          <a:ext cx="0" cy="0"/>
+          <a:chOff x="0" y="0"/>
+          <a:chExt cx="0" cy="0"/>
+        </a:xfrm>
+      </p:grpSpPr>
+      <p:sp>
+        <p:nvSpPr>
+          <p:cNvPr id="2" name="Title 1">
+            <a:extLst>
+              <a:ext uri="{FF2B5EF4-FFF2-40B4-BE49-F238E27FC236}">
+                <a16:creationId xmlns:a16="http://schemas.microsoft.com/office/drawing/2014/main" id="{1DA33728-EBEA-514C-B950-ADB77F53BE9D}"/>
+              </a:ext>
+            </a:extLst>
+          </p:cNvPr>
+          <p:cNvSpPr>
+            <a:spLocks noGrp="1"/>
+          </p:cNvSpPr>
+          <p:nvPr>
+            <p:ph type="title"/>
+          </p:nvPr>
+        </p:nvSpPr>
+        <p:spPr/>
+        <p:txBody>
+          <a:bodyPr/>
+          <a:lstStyle/>
+          <a:p>
+            <a:r>
+              <a:rPr lang="en-US" dirty="0"/>
+              <a:t>Future Steps</a:t>
+            </a:r>
+          </a:p>
+        </p:txBody>
+      </p:sp>
+      <p:sp>
+        <p:nvSpPr>
+          <p:cNvPr id="3" name="Content Placeholder 2">
+            <a:extLst>
+              <a:ext uri="{FF2B5EF4-FFF2-40B4-BE49-F238E27FC236}">
+                <a16:creationId xmlns:a16="http://schemas.microsoft.com/office/drawing/2014/main" id="{16B54704-9FCB-AB4E-8B13-5E016CDB012C}"/>
+              </a:ext>
+            </a:extLst>
+          </p:cNvPr>
+          <p:cNvSpPr>
+            <a:spLocks noGrp="1"/>
+          </p:cNvSpPr>
+          <p:nvPr>
+            <p:ph idx="1"/>
+          </p:nvPr>
+        </p:nvSpPr>
+        <p:spPr/>
+        <p:txBody>
+          <a:bodyPr/>
+          <a:lstStyle/>
+          <a:p>
+            <a:r>
+              <a:rPr lang="en-US" dirty="0"/>
+              <a:t>Trial more feature engineering methods</a:t>
+            </a:r>
+          </a:p>
+          <a:p>
+            <a:pPr lvl="1"/>
+            <a:r>
+              <a:rPr lang="en-US" dirty="0"/>
+              <a:t>Integrate time data better</a:t>
+            </a:r>
+          </a:p>
+          <a:p>
+            <a:pPr lvl="1"/>
+            <a:r>
+              <a:rPr lang="en-US" dirty="0"/>
+              <a:t>Integrate medications data better</a:t>
+            </a:r>
+          </a:p>
+          <a:p>
+            <a:pPr lvl="2"/>
+            <a:r>
+              <a:rPr lang="en-US" dirty="0"/>
+              <a:t>Calculate number of medications in each medicine class</a:t>
+            </a:r>
+          </a:p>
+          <a:p>
+            <a:r>
+              <a:rPr lang="en-US" dirty="0"/>
+              <a:t>Further research CKD disease development and risk factors</a:t>
+            </a:r>
+          </a:p>
+          <a:p>
+            <a:r>
+              <a:rPr lang="en-US" dirty="0"/>
+              <a:t>Try other machine </a:t>
+            </a:r>
+            <a:r>
+              <a:rPr lang="en-US"/>
+              <a:t>learning algorithms</a:t>
+            </a:r>
+            <a:endParaRPr lang="en-US" dirty="0"/>
+          </a:p>
+        </p:txBody>
+      </p:sp>
+      <p:sp>
+        <p:nvSpPr>
+          <p:cNvPr id="4" name="TextBox 3">
+            <a:extLst>
+              <a:ext uri="{FF2B5EF4-FFF2-40B4-BE49-F238E27FC236}">
+                <a16:creationId xmlns:a16="http://schemas.microsoft.com/office/drawing/2014/main" id="{F3E4620B-2817-2E45-8DAB-1785CDB8F3DB}"/>
+              </a:ext>
+            </a:extLst>
+          </p:cNvPr>
+          <p:cNvSpPr txBox="1"/>
+          <p:nvPr/>
+        </p:nvSpPr>
+        <p:spPr>
+          <a:xfrm>
+            <a:off x="8204886" y="3188043"/>
+            <a:ext cx="184731" cy="369332"/>
+          </a:xfrm>
+          <a:prstGeom prst="rect">
+            <a:avLst/>
+          </a:prstGeom>
+          <a:noFill/>
+        </p:spPr>
+        <p:txBody>
+          <a:bodyPr wrap="none" rtlCol="0">
+            <a:spAutoFit/>
+          </a:bodyPr>
+          <a:lstStyle/>
+          <a:p>
+            <a:endParaRPr lang="en-US" dirty="0"/>
+          </a:p>
+        </p:txBody>
+      </p:sp>
+    </p:spTree>
+    <p:extLst>
+      <p:ext uri="{BB962C8B-B14F-4D97-AF65-F5344CB8AC3E}">
+        <p14:creationId xmlns:p14="http://schemas.microsoft.com/office/powerpoint/2010/main" val="4156489799"/>
       </p:ext>
     </p:extLst>
   </p:cSld>
@@ -5180,4 +8550,299 @@
     </a:ext>
   </a:extLst>
 </a:theme>
+</file>
+
+<file path=ppt/theme/theme2.xml><?xml version="1.0" encoding="utf-8"?>
+<a:theme xmlns:a="http://schemas.openxmlformats.org/drawingml/2006/main" name="Office Theme">
+  <a:themeElements>
+    <a:clrScheme name="Office">
+      <a:dk1>
+        <a:sysClr val="windowText" lastClr="000000"/>
+      </a:dk1>
+      <a:lt1>
+        <a:sysClr val="window" lastClr="FFFFFF"/>
+      </a:lt1>
+      <a:dk2>
+        <a:srgbClr val="44546A"/>
+      </a:dk2>
+      <a:lt2>
+        <a:srgbClr val="E7E6E6"/>
+      </a:lt2>
+      <a:accent1>
+        <a:srgbClr val="4472C4"/>
+      </a:accent1>
+      <a:accent2>
+        <a:srgbClr val="ED7D31"/>
+      </a:accent2>
+      <a:accent3>
+        <a:srgbClr val="A5A5A5"/>
+      </a:accent3>
+      <a:accent4>
+        <a:srgbClr val="FFC000"/>
+      </a:accent4>
+      <a:accent5>
+        <a:srgbClr val="5B9BD5"/>
+      </a:accent5>
+      <a:accent6>
+        <a:srgbClr val="70AD47"/>
+      </a:accent6>
+      <a:hlink>
+        <a:srgbClr val="0563C1"/>
+      </a:hlink>
+      <a:folHlink>
+        <a:srgbClr val="954F72"/>
+      </a:folHlink>
+    </a:clrScheme>
+    <a:fontScheme name="Office">
+      <a:majorFont>
+        <a:latin typeface="Calibri Light" panose="020F0302020204030204"/>
+        <a:ea typeface=""/>
+        <a:cs typeface=""/>
+        <a:font script="Jpan" typeface="游ゴシック Light"/>
+        <a:font script="Hang" typeface="맑은 고딕"/>
+        <a:font script="Hans" typeface="等线 Light"/>
+        <a:font script="Hant" typeface="新細明體"/>
+        <a:font script="Arab" typeface="Times New Roman"/>
+        <a:font script="Hebr" typeface="Times New Roman"/>
+        <a:font script="Thai" typeface="Angsana New"/>
+        <a:font script="Ethi" typeface="Nyala"/>
+        <a:font script="Beng" typeface="Vrinda"/>
+        <a:font script="Gujr" typeface="Shruti"/>
+        <a:font script="Khmr" typeface="MoolBoran"/>
+        <a:font script="Knda" typeface="Tunga"/>
+        <a:font script="Guru" typeface="Raavi"/>
+        <a:font script="Cans" typeface="Euphemia"/>
+        <a:font script="Cher" typeface="Plantagenet Cherokee"/>
+        <a:font script="Yiii" typeface="Microsoft Yi Baiti"/>
+        <a:font script="Tibt" typeface="Microsoft Himalaya"/>
+        <a:font script="Thaa" typeface="MV Boli"/>
+        <a:font script="Deva" typeface="Mangal"/>
+        <a:font script="Telu" typeface="Gautami"/>
+        <a:font script="Taml" typeface="Latha"/>
+        <a:font script="Syrc" typeface="Estrangelo Edessa"/>
+        <a:font script="Orya" typeface="Kalinga"/>
+        <a:font script="Mlym" typeface="Kartika"/>
+        <a:font script="Laoo" typeface="DokChampa"/>
+        <a:font script="Sinh" typeface="Iskoola Pota"/>
+        <a:font script="Mong" typeface="Mongolian Baiti"/>
+        <a:font script="Viet" typeface="Times New Roman"/>
+        <a:font script="Uigh" typeface="Microsoft Uighur"/>
+        <a:font script="Geor" typeface="Sylfaen"/>
+        <a:font script="Armn" typeface="Arial"/>
+        <a:font script="Bugi" typeface="Leelawadee UI"/>
+        <a:font script="Bopo" typeface="Microsoft JhengHei"/>
+        <a:font script="Java" typeface="Javanese Text"/>
+        <a:font script="Lisu" typeface="Segoe UI"/>
+        <a:font script="Mymr" typeface="Myanmar Text"/>
+        <a:font script="Nkoo" typeface="Ebrima"/>
+        <a:font script="Olck" typeface="Nirmala UI"/>
+        <a:font script="Osma" typeface="Ebrima"/>
+        <a:font script="Phag" typeface="Phagspa"/>
+        <a:font script="Syrn" typeface="Estrangelo Edessa"/>
+        <a:font script="Syrj" typeface="Estrangelo Edessa"/>
+        <a:font script="Syre" typeface="Estrangelo Edessa"/>
+        <a:font script="Sora" typeface="Nirmala UI"/>
+        <a:font script="Tale" typeface="Microsoft Tai Le"/>
+        <a:font script="Talu" typeface="Microsoft New Tai Lue"/>
+        <a:font script="Tfng" typeface="Ebrima"/>
+      </a:majorFont>
+      <a:minorFont>
+        <a:latin typeface="Calibri" panose="020F0502020204030204"/>
+        <a:ea typeface=""/>
+        <a:cs typeface=""/>
+        <a:font script="Jpan" typeface="游ゴシック"/>
+        <a:font script="Hang" typeface="맑은 고딕"/>
+        <a:font script="Hans" typeface="等线"/>
+        <a:font script="Hant" typeface="新細明體"/>
+        <a:font script="Arab" typeface="Arial"/>
+        <a:font script="Hebr" typeface="Arial"/>
+        <a:font script="Thai" typeface="Cordia New"/>
+        <a:font script="Ethi" typeface="Nyala"/>
+        <a:font script="Beng" typeface="Vrinda"/>
+        <a:font script="Gujr" typeface="Shruti"/>
+        <a:font script="Khmr" typeface="DaunPenh"/>
+        <a:font script="Knda" typeface="Tunga"/>
+        <a:font script="Guru" typeface="Raavi"/>
+        <a:font script="Cans" typeface="Euphemia"/>
+        <a:font script="Cher" typeface="Plantagenet Cherokee"/>
+        <a:font script="Yiii" typeface="Microsoft Yi Baiti"/>
+        <a:font script="Tibt" typeface="Microsoft Himalaya"/>
+        <a:font script="Thaa" typeface="MV Boli"/>
+        <a:font script="Deva" typeface="Mangal"/>
+        <a:font script="Telu" typeface="Gautami"/>
+        <a:font script="Taml" typeface="Latha"/>
+        <a:font script="Syrc" typeface="Estrangelo Edessa"/>
+        <a:font script="Orya" typeface="Kalinga"/>
+        <a:font script="Mlym" typeface="Kartika"/>
+        <a:font script="Laoo" typeface="DokChampa"/>
+        <a:font script="Sinh" typeface="Iskoola Pota"/>
+        <a:font script="Mong" typeface="Mongolian Baiti"/>
+        <a:font script="Viet" typeface="Arial"/>
+        <a:font script="Uigh" typeface="Microsoft Uighur"/>
+        <a:font script="Geor" typeface="Sylfaen"/>
+        <a:font script="Armn" typeface="Arial"/>
+        <a:font script="Bugi" typeface="Leelawadee UI"/>
+        <a:font script="Bopo" typeface="Microsoft JhengHei"/>
+        <a:font script="Java" typeface="Javanese Text"/>
+        <a:font script="Lisu" typeface="Segoe UI"/>
+        <a:font script="Mymr" typeface="Myanmar Text"/>
+        <a:font script="Nkoo" typeface="Ebrima"/>
+        <a:font script="Olck" typeface="Nirmala UI"/>
+        <a:font script="Osma" typeface="Ebrima"/>
+        <a:font script="Phag" typeface="Phagspa"/>
+        <a:font script="Syrn" typeface="Estrangelo Edessa"/>
+        <a:font script="Syrj" typeface="Estrangelo Edessa"/>
+        <a:font script="Syre" typeface="Estrangelo Edessa"/>
+        <a:font script="Sora" typeface="Nirmala UI"/>
+        <a:font script="Tale" typeface="Microsoft Tai Le"/>
+        <a:font script="Talu" typeface="Microsoft New Tai Lue"/>
+        <a:font script="Tfng" typeface="Ebrima"/>
+      </a:minorFont>
+    </a:fontScheme>
+    <a:fmtScheme name="Office">
+      <a:fillStyleLst>
+        <a:solidFill>
+          <a:schemeClr val="phClr"/>
+        </a:solidFill>
+        <a:gradFill rotWithShape="1">
+          <a:gsLst>
+            <a:gs pos="0">
+              <a:schemeClr val="phClr">
+                <a:lumMod val="110000"/>
+                <a:satMod val="105000"/>
+                <a:tint val="67000"/>
+              </a:schemeClr>
+            </a:gs>
+            <a:gs pos="50000">
+              <a:schemeClr val="phClr">
+                <a:lumMod val="105000"/>
+                <a:satMod val="103000"/>
+                <a:tint val="73000"/>
+              </a:schemeClr>
+            </a:gs>
+            <a:gs pos="100000">
+              <a:schemeClr val="phClr">
+                <a:lumMod val="105000"/>
+                <a:satMod val="109000"/>
+                <a:tint val="81000"/>
+              </a:schemeClr>
+            </a:gs>
+          </a:gsLst>
+          <a:lin ang="5400000" scaled="0"/>
+        </a:gradFill>
+        <a:gradFill rotWithShape="1">
+          <a:gsLst>
+            <a:gs pos="0">
+              <a:schemeClr val="phClr">
+                <a:satMod val="103000"/>
+                <a:lumMod val="102000"/>
+                <a:tint val="94000"/>
+              </a:schemeClr>
+            </a:gs>
+            <a:gs pos="50000">
+              <a:schemeClr val="phClr">
+                <a:satMod val="110000"/>
+                <a:lumMod val="100000"/>
+                <a:shade val="100000"/>
+              </a:schemeClr>
+            </a:gs>
+            <a:gs pos="100000">
+              <a:schemeClr val="phClr">
+                <a:lumMod val="99000"/>
+                <a:satMod val="120000"/>
+                <a:shade val="78000"/>
+              </a:schemeClr>
+            </a:gs>
+          </a:gsLst>
+          <a:lin ang="5400000" scaled="0"/>
+        </a:gradFill>
+      </a:fillStyleLst>
+      <a:lnStyleLst>
+        <a:ln w="6350" cap="flat" cmpd="sng" algn="ctr">
+          <a:solidFill>
+            <a:schemeClr val="phClr"/>
+          </a:solidFill>
+          <a:prstDash val="solid"/>
+          <a:miter lim="800000"/>
+        </a:ln>
+        <a:ln w="12700" cap="flat" cmpd="sng" algn="ctr">
+          <a:solidFill>
+            <a:schemeClr val="phClr"/>
+          </a:solidFill>
+          <a:prstDash val="solid"/>
+          <a:miter lim="800000"/>
+        </a:ln>
+        <a:ln w="19050" cap="flat" cmpd="sng" algn="ctr">
+          <a:solidFill>
+            <a:schemeClr val="phClr"/>
+          </a:solidFill>
+          <a:prstDash val="solid"/>
+          <a:miter lim="800000"/>
+        </a:ln>
+      </a:lnStyleLst>
+      <a:effectStyleLst>
+        <a:effectStyle>
+          <a:effectLst/>
+        </a:effectStyle>
+        <a:effectStyle>
+          <a:effectLst/>
+        </a:effectStyle>
+        <a:effectStyle>
+          <a:effectLst>
+            <a:outerShdw blurRad="57150" dist="19050" dir="5400000" algn="ctr" rotWithShape="0">
+              <a:srgbClr val="000000">
+                <a:alpha val="63000"/>
+              </a:srgbClr>
+            </a:outerShdw>
+          </a:effectLst>
+        </a:effectStyle>
+      </a:effectStyleLst>
+      <a:bgFillStyleLst>
+        <a:solidFill>
+          <a:schemeClr val="phClr"/>
+        </a:solidFill>
+        <a:solidFill>
+          <a:schemeClr val="phClr">
+            <a:tint val="95000"/>
+            <a:satMod val="170000"/>
+          </a:schemeClr>
+        </a:solidFill>
+        <a:gradFill rotWithShape="1">
+          <a:gsLst>
+            <a:gs pos="0">
+              <a:schemeClr val="phClr">
+                <a:tint val="93000"/>
+                <a:satMod val="150000"/>
+                <a:shade val="98000"/>
+                <a:lumMod val="102000"/>
+              </a:schemeClr>
+            </a:gs>
+            <a:gs pos="50000">
+              <a:schemeClr val="phClr">
+                <a:tint val="98000"/>
+                <a:satMod val="130000"/>
+                <a:shade val="90000"/>
+                <a:lumMod val="103000"/>
+              </a:schemeClr>
+            </a:gs>
+            <a:gs pos="100000">
+              <a:schemeClr val="phClr">
+                <a:shade val="63000"/>
+                <a:satMod val="120000"/>
+              </a:schemeClr>
+            </a:gs>
+          </a:gsLst>
+          <a:lin ang="5400000" scaled="0"/>
+        </a:gradFill>
+      </a:bgFillStyleLst>
+    </a:fmtScheme>
+  </a:themeElements>
+  <a:objectDefaults/>
+  <a:extraClrSchemeLst/>
+  <a:extLst>
+    <a:ext uri="{05A4C25C-085E-4340-85A3-A5531E510DB2}">
+      <thm15:themeFamily xmlns:thm15="http://schemas.microsoft.com/office/thememl/2012/main" name="Office Theme" id="{62F939B6-93AF-4DB8-9C6B-D6C7DFDC589F}" vid="{4A3C46E8-61CC-4603-A589-7422A47A8E4A}"/>
+    </a:ext>
+  </a:extLst>
+</a:theme>
 </file>
</xml_diff>